<commit_message>
Added some plots and observation
</commit_message>
<xml_diff>
--- a/case_study_02_presentation.pptx
+++ b/case_study_02_presentation.pptx
@@ -7,6 +7,7 @@
   <p:sldIdLst>
     <p:sldId id="256" r:id="rId2"/>
     <p:sldId id="257" r:id="rId3"/>
+    <p:sldId id="258" r:id="rId4"/>
   </p:sldIdLst>
   <p:sldSz cx="12192000" cy="6858000"/>
   <p:notesSz cx="6858000" cy="9144000"/>
@@ -105,6 +106,11 @@
       </a:defRPr>
     </a:lvl9pPr>
   </p:defaultTextStyle>
+  <p:extLst>
+    <p:ext uri="{EFAFB233-063F-42B5-8137-9DF3F51BA10A}">
+      <p15:sldGuideLst xmlns:p15="http://schemas.microsoft.com/office/powerpoint/2012/main"/>
+    </p:ext>
+  </p:extLst>
 </p:presentation>
 </file>
 
@@ -255,7 +261,7 @@
           <a:p>
             <a:fld id="{08B136E0-DE68-48F8-B9E2-21BBDA41EF35}" type="datetimeFigureOut">
               <a:rPr lang="en-US" smtClean="0"/>
-              <a:t>4/7/2019</a:t>
+              <a:t>4/10/2019</a:t>
             </a:fld>
             <a:endParaRPr lang="en-US"/>
           </a:p>
@@ -453,7 +459,7 @@
           <a:p>
             <a:fld id="{08B136E0-DE68-48F8-B9E2-21BBDA41EF35}" type="datetimeFigureOut">
               <a:rPr lang="en-US" smtClean="0"/>
-              <a:t>4/7/2019</a:t>
+              <a:t>4/10/2019</a:t>
             </a:fld>
             <a:endParaRPr lang="en-US"/>
           </a:p>
@@ -661,7 +667,7 @@
           <a:p>
             <a:fld id="{08B136E0-DE68-48F8-B9E2-21BBDA41EF35}" type="datetimeFigureOut">
               <a:rPr lang="en-US" smtClean="0"/>
-              <a:t>4/7/2019</a:t>
+              <a:t>4/10/2019</a:t>
             </a:fld>
             <a:endParaRPr lang="en-US"/>
           </a:p>
@@ -859,7 +865,7 @@
           <a:p>
             <a:fld id="{08B136E0-DE68-48F8-B9E2-21BBDA41EF35}" type="datetimeFigureOut">
               <a:rPr lang="en-US" smtClean="0"/>
-              <a:t>4/7/2019</a:t>
+              <a:t>4/10/2019</a:t>
             </a:fld>
             <a:endParaRPr lang="en-US"/>
           </a:p>
@@ -1134,7 +1140,7 @@
           <a:p>
             <a:fld id="{08B136E0-DE68-48F8-B9E2-21BBDA41EF35}" type="datetimeFigureOut">
               <a:rPr lang="en-US" smtClean="0"/>
-              <a:t>4/7/2019</a:t>
+              <a:t>4/10/2019</a:t>
             </a:fld>
             <a:endParaRPr lang="en-US"/>
           </a:p>
@@ -1399,7 +1405,7 @@
           <a:p>
             <a:fld id="{08B136E0-DE68-48F8-B9E2-21BBDA41EF35}" type="datetimeFigureOut">
               <a:rPr lang="en-US" smtClean="0"/>
-              <a:t>4/7/2019</a:t>
+              <a:t>4/10/2019</a:t>
             </a:fld>
             <a:endParaRPr lang="en-US"/>
           </a:p>
@@ -1811,7 +1817,7 @@
           <a:p>
             <a:fld id="{08B136E0-DE68-48F8-B9E2-21BBDA41EF35}" type="datetimeFigureOut">
               <a:rPr lang="en-US" smtClean="0"/>
-              <a:t>4/7/2019</a:t>
+              <a:t>4/10/2019</a:t>
             </a:fld>
             <a:endParaRPr lang="en-US"/>
           </a:p>
@@ -1952,7 +1958,7 @@
           <a:p>
             <a:fld id="{08B136E0-DE68-48F8-B9E2-21BBDA41EF35}" type="datetimeFigureOut">
               <a:rPr lang="en-US" smtClean="0"/>
-              <a:t>4/7/2019</a:t>
+              <a:t>4/10/2019</a:t>
             </a:fld>
             <a:endParaRPr lang="en-US"/>
           </a:p>
@@ -2065,7 +2071,7 @@
           <a:p>
             <a:fld id="{08B136E0-DE68-48F8-B9E2-21BBDA41EF35}" type="datetimeFigureOut">
               <a:rPr lang="en-US" smtClean="0"/>
-              <a:t>4/7/2019</a:t>
+              <a:t>4/10/2019</a:t>
             </a:fld>
             <a:endParaRPr lang="en-US"/>
           </a:p>
@@ -2376,7 +2382,7 @@
           <a:p>
             <a:fld id="{08B136E0-DE68-48F8-B9E2-21BBDA41EF35}" type="datetimeFigureOut">
               <a:rPr lang="en-US" smtClean="0"/>
-              <a:t>4/7/2019</a:t>
+              <a:t>4/10/2019</a:t>
             </a:fld>
             <a:endParaRPr lang="en-US"/>
           </a:p>
@@ -2664,7 +2670,7 @@
           <a:p>
             <a:fld id="{08B136E0-DE68-48F8-B9E2-21BBDA41EF35}" type="datetimeFigureOut">
               <a:rPr lang="en-US" smtClean="0"/>
-              <a:t>4/7/2019</a:t>
+              <a:t>4/10/2019</a:t>
             </a:fld>
             <a:endParaRPr lang="en-US"/>
           </a:p>
@@ -2905,7 +2911,7 @@
           <a:p>
             <a:fld id="{08B136E0-DE68-48F8-B9E2-21BBDA41EF35}" type="datetimeFigureOut">
               <a:rPr lang="en-US" smtClean="0"/>
-              <a:t>4/7/2019</a:t>
+              <a:t>4/10/2019</a:t>
             </a:fld>
             <a:endParaRPr lang="en-US"/>
           </a:p>
@@ -4906,6 +4912,74 @@
 </p:sld>
 </file>
 
+<file path=ppt/slides/slide3.xml><?xml version="1.0" encoding="utf-8"?>
+<p:sld xmlns:a="http://schemas.openxmlformats.org/drawingml/2006/main" xmlns:r="http://schemas.openxmlformats.org/officeDocument/2006/relationships" xmlns:p="http://schemas.openxmlformats.org/presentationml/2006/main">
+  <p:cSld>
+    <p:bg>
+      <p:bgPr>
+        <a:solidFill>
+          <a:schemeClr val="bg1"/>
+        </a:solidFill>
+        <a:effectLst/>
+      </p:bgPr>
+    </p:bg>
+    <p:spTree>
+      <p:nvGrpSpPr>
+        <p:cNvPr id="1" name=""/>
+        <p:cNvGrpSpPr/>
+        <p:nvPr/>
+      </p:nvGrpSpPr>
+      <p:grpSpPr>
+        <a:xfrm>
+          <a:off x="0" y="0"/>
+          <a:ext cx="0" cy="0"/>
+          <a:chOff x="0" y="0"/>
+          <a:chExt cx="0" cy="0"/>
+        </a:xfrm>
+      </p:grpSpPr>
+      <p:pic>
+        <p:nvPicPr>
+          <p:cNvPr id="4" name="Picture 3">
+            <a:extLst>
+              <a:ext uri="{FF2B5EF4-FFF2-40B4-BE49-F238E27FC236}">
+                <a16:creationId xmlns:a16="http://schemas.microsoft.com/office/drawing/2014/main" id="{618A2807-7FCB-4288-902A-4F243F2D5B1D}"/>
+              </a:ext>
+            </a:extLst>
+          </p:cNvPr>
+          <p:cNvPicPr>
+            <a:picLocks noChangeAspect="1"/>
+          </p:cNvPicPr>
+          <p:nvPr/>
+        </p:nvPicPr>
+        <p:blipFill>
+          <a:blip r:embed="rId2"/>
+          <a:stretch>
+            <a:fillRect/>
+          </a:stretch>
+        </p:blipFill>
+        <p:spPr>
+          <a:xfrm>
+            <a:off x="840275" y="643466"/>
+            <a:ext cx="10511450" cy="5571067"/>
+          </a:xfrm>
+          <a:prstGeom prst="rect">
+            <a:avLst/>
+          </a:prstGeom>
+        </p:spPr>
+      </p:pic>
+    </p:spTree>
+    <p:extLst>
+      <p:ext uri="{BB962C8B-B14F-4D97-AF65-F5344CB8AC3E}">
+        <p14:creationId xmlns:p14="http://schemas.microsoft.com/office/powerpoint/2010/main" val="759344408"/>
+      </p:ext>
+    </p:extLst>
+  </p:cSld>
+  <p:clrMapOvr>
+    <a:masterClrMapping/>
+  </p:clrMapOvr>
+</p:sld>
+</file>
+
 <file path=ppt/theme/theme1.xml><?xml version="1.0" encoding="utf-8"?>
 <a:theme xmlns:a="http://schemas.openxmlformats.org/drawingml/2006/main" name="Office Theme">
   <a:themeElements>

</xml_diff>

<commit_message>
produced some more plots
</commit_message>
<xml_diff>
--- a/case_study_02_presentation.pptx
+++ b/case_study_02_presentation.pptx
@@ -8,6 +8,11 @@
     <p:sldId id="256" r:id="rId2"/>
     <p:sldId id="257" r:id="rId3"/>
     <p:sldId id="258" r:id="rId4"/>
+    <p:sldId id="259" r:id="rId5"/>
+    <p:sldId id="260" r:id="rId6"/>
+    <p:sldId id="261" r:id="rId7"/>
+    <p:sldId id="262" r:id="rId8"/>
+    <p:sldId id="263" r:id="rId9"/>
   </p:sldIdLst>
   <p:sldSz cx="12192000" cy="6858000"/>
   <p:notesSz cx="6858000" cy="9144000"/>
@@ -261,7 +266,7 @@
           <a:p>
             <a:fld id="{08B136E0-DE68-48F8-B9E2-21BBDA41EF35}" type="datetimeFigureOut">
               <a:rPr lang="en-US" smtClean="0"/>
-              <a:t>4/10/2019</a:t>
+              <a:t>4/11/2019</a:t>
             </a:fld>
             <a:endParaRPr lang="en-US"/>
           </a:p>
@@ -459,7 +464,7 @@
           <a:p>
             <a:fld id="{08B136E0-DE68-48F8-B9E2-21BBDA41EF35}" type="datetimeFigureOut">
               <a:rPr lang="en-US" smtClean="0"/>
-              <a:t>4/10/2019</a:t>
+              <a:t>4/11/2019</a:t>
             </a:fld>
             <a:endParaRPr lang="en-US"/>
           </a:p>
@@ -667,7 +672,7 @@
           <a:p>
             <a:fld id="{08B136E0-DE68-48F8-B9E2-21BBDA41EF35}" type="datetimeFigureOut">
               <a:rPr lang="en-US" smtClean="0"/>
-              <a:t>4/10/2019</a:t>
+              <a:t>4/11/2019</a:t>
             </a:fld>
             <a:endParaRPr lang="en-US"/>
           </a:p>
@@ -865,7 +870,7 @@
           <a:p>
             <a:fld id="{08B136E0-DE68-48F8-B9E2-21BBDA41EF35}" type="datetimeFigureOut">
               <a:rPr lang="en-US" smtClean="0"/>
-              <a:t>4/10/2019</a:t>
+              <a:t>4/11/2019</a:t>
             </a:fld>
             <a:endParaRPr lang="en-US"/>
           </a:p>
@@ -1140,7 +1145,7 @@
           <a:p>
             <a:fld id="{08B136E0-DE68-48F8-B9E2-21BBDA41EF35}" type="datetimeFigureOut">
               <a:rPr lang="en-US" smtClean="0"/>
-              <a:t>4/10/2019</a:t>
+              <a:t>4/11/2019</a:t>
             </a:fld>
             <a:endParaRPr lang="en-US"/>
           </a:p>
@@ -1405,7 +1410,7 @@
           <a:p>
             <a:fld id="{08B136E0-DE68-48F8-B9E2-21BBDA41EF35}" type="datetimeFigureOut">
               <a:rPr lang="en-US" smtClean="0"/>
-              <a:t>4/10/2019</a:t>
+              <a:t>4/11/2019</a:t>
             </a:fld>
             <a:endParaRPr lang="en-US"/>
           </a:p>
@@ -1817,7 +1822,7 @@
           <a:p>
             <a:fld id="{08B136E0-DE68-48F8-B9E2-21BBDA41EF35}" type="datetimeFigureOut">
               <a:rPr lang="en-US" smtClean="0"/>
-              <a:t>4/10/2019</a:t>
+              <a:t>4/11/2019</a:t>
             </a:fld>
             <a:endParaRPr lang="en-US"/>
           </a:p>
@@ -1958,7 +1963,7 @@
           <a:p>
             <a:fld id="{08B136E0-DE68-48F8-B9E2-21BBDA41EF35}" type="datetimeFigureOut">
               <a:rPr lang="en-US" smtClean="0"/>
-              <a:t>4/10/2019</a:t>
+              <a:t>4/11/2019</a:t>
             </a:fld>
             <a:endParaRPr lang="en-US"/>
           </a:p>
@@ -2071,7 +2076,7 @@
           <a:p>
             <a:fld id="{08B136E0-DE68-48F8-B9E2-21BBDA41EF35}" type="datetimeFigureOut">
               <a:rPr lang="en-US" smtClean="0"/>
-              <a:t>4/10/2019</a:t>
+              <a:t>4/11/2019</a:t>
             </a:fld>
             <a:endParaRPr lang="en-US"/>
           </a:p>
@@ -2382,7 +2387,7 @@
           <a:p>
             <a:fld id="{08B136E0-DE68-48F8-B9E2-21BBDA41EF35}" type="datetimeFigureOut">
               <a:rPr lang="en-US" smtClean="0"/>
-              <a:t>4/10/2019</a:t>
+              <a:t>4/11/2019</a:t>
             </a:fld>
             <a:endParaRPr lang="en-US"/>
           </a:p>
@@ -2670,7 +2675,7 @@
           <a:p>
             <a:fld id="{08B136E0-DE68-48F8-B9E2-21BBDA41EF35}" type="datetimeFigureOut">
               <a:rPr lang="en-US" smtClean="0"/>
-              <a:t>4/10/2019</a:t>
+              <a:t>4/11/2019</a:t>
             </a:fld>
             <a:endParaRPr lang="en-US"/>
           </a:p>
@@ -2911,7 +2916,7 @@
           <a:p>
             <a:fld id="{08B136E0-DE68-48F8-B9E2-21BBDA41EF35}" type="datetimeFigureOut">
               <a:rPr lang="en-US" smtClean="0"/>
-              <a:t>4/10/2019</a:t>
+              <a:t>4/11/2019</a:t>
             </a:fld>
             <a:endParaRPr lang="en-US"/>
           </a:p>
@@ -4967,10 +4972,596 @@
           </a:prstGeom>
         </p:spPr>
       </p:pic>
+      <p:sp>
+        <p:nvSpPr>
+          <p:cNvPr id="2" name="Rectangle 1">
+            <a:extLst>
+              <a:ext uri="{FF2B5EF4-FFF2-40B4-BE49-F238E27FC236}">
+                <a16:creationId xmlns:a16="http://schemas.microsoft.com/office/drawing/2014/main" id="{C85397DA-750E-40EA-8740-9AE38E4991EF}"/>
+              </a:ext>
+            </a:extLst>
+          </p:cNvPr>
+          <p:cNvSpPr/>
+          <p:nvPr/>
+        </p:nvSpPr>
+        <p:spPr>
+          <a:xfrm>
+            <a:off x="3048000" y="2551837"/>
+            <a:ext cx="6096000" cy="1754326"/>
+          </a:xfrm>
+          <a:prstGeom prst="rect">
+            <a:avLst/>
+          </a:prstGeom>
+        </p:spPr>
+        <p:txBody>
+          <a:bodyPr>
+            <a:spAutoFit/>
+          </a:bodyPr>
+          <a:lstStyle/>
+          <a:p>
+            <a:r>
+              <a:rPr lang="en-US" dirty="0"/>
+              <a:t>pairs(~Attrition+DailyRate+Age+DistanceFromHome+EnvironmentSatisfaction+JobSatisfaction+MonthlyIncome+MonthlyRate+</a:t>
+            </a:r>
+          </a:p>
+          <a:p>
+            <a:r>
+              <a:rPr lang="en-US" dirty="0"/>
+              <a:t>        </a:t>
+            </a:r>
+            <a:r>
+              <a:rPr lang="en-US" dirty="0" err="1"/>
+              <a:t>YearsSinceLastPromotion+PerformanceRating+JobInvolvement,data</a:t>
+            </a:r>
+            <a:r>
+              <a:rPr lang="en-US" dirty="0"/>
+              <a:t>=</a:t>
+            </a:r>
+            <a:r>
+              <a:rPr lang="en-US" dirty="0" err="1"/>
+              <a:t>attritionData</a:t>
+            </a:r>
+            <a:r>
+              <a:rPr lang="en-US" dirty="0"/>
+              <a:t>, </a:t>
+            </a:r>
+          </a:p>
+          <a:p>
+            <a:r>
+              <a:rPr lang="en-US" dirty="0"/>
+              <a:t>   main="Simple Scatterplot Matrix")</a:t>
+            </a:r>
+          </a:p>
+        </p:txBody>
+      </p:sp>
     </p:spTree>
     <p:extLst>
       <p:ext uri="{BB962C8B-B14F-4D97-AF65-F5344CB8AC3E}">
         <p14:creationId xmlns:p14="http://schemas.microsoft.com/office/powerpoint/2010/main" val="759344408"/>
+      </p:ext>
+    </p:extLst>
+  </p:cSld>
+  <p:clrMapOvr>
+    <a:masterClrMapping/>
+  </p:clrMapOvr>
+</p:sld>
+</file>
+
+<file path=ppt/slides/slide4.xml><?xml version="1.0" encoding="utf-8"?>
+<p:sld xmlns:a="http://schemas.openxmlformats.org/drawingml/2006/main" xmlns:r="http://schemas.openxmlformats.org/officeDocument/2006/relationships" xmlns:p="http://schemas.openxmlformats.org/presentationml/2006/main">
+  <p:cSld>
+    <p:spTree>
+      <p:nvGrpSpPr>
+        <p:cNvPr id="1" name=""/>
+        <p:cNvGrpSpPr/>
+        <p:nvPr/>
+      </p:nvGrpSpPr>
+      <p:grpSpPr>
+        <a:xfrm>
+          <a:off x="0" y="0"/>
+          <a:ext cx="0" cy="0"/>
+          <a:chOff x="0" y="0"/>
+          <a:chExt cx="0" cy="0"/>
+        </a:xfrm>
+      </p:grpSpPr>
+      <p:pic>
+        <p:nvPicPr>
+          <p:cNvPr id="4" name="Picture 3">
+            <a:extLst>
+              <a:ext uri="{FF2B5EF4-FFF2-40B4-BE49-F238E27FC236}">
+                <a16:creationId xmlns:a16="http://schemas.microsoft.com/office/drawing/2014/main" id="{623BE546-FBD6-4550-819F-E2E846D5A641}"/>
+              </a:ext>
+            </a:extLst>
+          </p:cNvPr>
+          <p:cNvPicPr>
+            <a:picLocks noChangeAspect="1"/>
+          </p:cNvPicPr>
+          <p:nvPr/>
+        </p:nvPicPr>
+        <p:blipFill>
+          <a:blip r:embed="rId2"/>
+          <a:stretch>
+            <a:fillRect/>
+          </a:stretch>
+        </p:blipFill>
+        <p:spPr>
+          <a:xfrm>
+            <a:off x="0" y="197643"/>
+            <a:ext cx="12192000" cy="6462713"/>
+          </a:xfrm>
+          <a:prstGeom prst="rect">
+            <a:avLst/>
+          </a:prstGeom>
+        </p:spPr>
+      </p:pic>
+    </p:spTree>
+    <p:extLst>
+      <p:ext uri="{BB962C8B-B14F-4D97-AF65-F5344CB8AC3E}">
+        <p14:creationId xmlns:p14="http://schemas.microsoft.com/office/powerpoint/2010/main" val="370104894"/>
+      </p:ext>
+    </p:extLst>
+  </p:cSld>
+  <p:clrMapOvr>
+    <a:masterClrMapping/>
+  </p:clrMapOvr>
+</p:sld>
+</file>
+
+<file path=ppt/slides/slide5.xml><?xml version="1.0" encoding="utf-8"?>
+<p:sld xmlns:a="http://schemas.openxmlformats.org/drawingml/2006/main" xmlns:r="http://schemas.openxmlformats.org/officeDocument/2006/relationships" xmlns:p="http://schemas.openxmlformats.org/presentationml/2006/main">
+  <p:cSld>
+    <p:spTree>
+      <p:nvGrpSpPr>
+        <p:cNvPr id="1" name=""/>
+        <p:cNvGrpSpPr/>
+        <p:nvPr/>
+      </p:nvGrpSpPr>
+      <p:grpSpPr>
+        <a:xfrm>
+          <a:off x="0" y="0"/>
+          <a:ext cx="0" cy="0"/>
+          <a:chOff x="0" y="0"/>
+          <a:chExt cx="0" cy="0"/>
+        </a:xfrm>
+      </p:grpSpPr>
+      <p:pic>
+        <p:nvPicPr>
+          <p:cNvPr id="5" name="Picture 4">
+            <a:extLst>
+              <a:ext uri="{FF2B5EF4-FFF2-40B4-BE49-F238E27FC236}">
+                <a16:creationId xmlns:a16="http://schemas.microsoft.com/office/drawing/2014/main" id="{9B9CAB55-1222-4045-BC09-2994D6A36780}"/>
+              </a:ext>
+            </a:extLst>
+          </p:cNvPr>
+          <p:cNvPicPr>
+            <a:picLocks noChangeAspect="1"/>
+          </p:cNvPicPr>
+          <p:nvPr/>
+        </p:nvPicPr>
+        <p:blipFill>
+          <a:blip r:embed="rId2"/>
+          <a:stretch>
+            <a:fillRect/>
+          </a:stretch>
+        </p:blipFill>
+        <p:spPr>
+          <a:xfrm>
+            <a:off x="2238176" y="422120"/>
+            <a:ext cx="7715647" cy="6013759"/>
+          </a:xfrm>
+          <a:prstGeom prst="rect">
+            <a:avLst/>
+          </a:prstGeom>
+        </p:spPr>
+      </p:pic>
+    </p:spTree>
+    <p:extLst>
+      <p:ext uri="{BB962C8B-B14F-4D97-AF65-F5344CB8AC3E}">
+        <p14:creationId xmlns:p14="http://schemas.microsoft.com/office/powerpoint/2010/main" val="2690206312"/>
+      </p:ext>
+    </p:extLst>
+  </p:cSld>
+  <p:clrMapOvr>
+    <a:masterClrMapping/>
+  </p:clrMapOvr>
+</p:sld>
+</file>
+
+<file path=ppt/slides/slide6.xml><?xml version="1.0" encoding="utf-8"?>
+<p:sld xmlns:a="http://schemas.openxmlformats.org/drawingml/2006/main" xmlns:r="http://schemas.openxmlformats.org/officeDocument/2006/relationships" xmlns:p="http://schemas.openxmlformats.org/presentationml/2006/main">
+  <p:cSld>
+    <p:spTree>
+      <p:nvGrpSpPr>
+        <p:cNvPr id="1" name=""/>
+        <p:cNvGrpSpPr/>
+        <p:nvPr/>
+      </p:nvGrpSpPr>
+      <p:grpSpPr>
+        <a:xfrm>
+          <a:off x="0" y="0"/>
+          <a:ext cx="0" cy="0"/>
+          <a:chOff x="0" y="0"/>
+          <a:chExt cx="0" cy="0"/>
+        </a:xfrm>
+      </p:grpSpPr>
+      <p:sp>
+        <p:nvSpPr>
+          <p:cNvPr id="2" name="Title 1">
+            <a:extLst>
+              <a:ext uri="{FF2B5EF4-FFF2-40B4-BE49-F238E27FC236}">
+                <a16:creationId xmlns:a16="http://schemas.microsoft.com/office/drawing/2014/main" id="{D6968019-7CF3-4B5C-A4FE-4591AFAEECA0}"/>
+              </a:ext>
+            </a:extLst>
+          </p:cNvPr>
+          <p:cNvSpPr>
+            <a:spLocks noGrp="1"/>
+          </p:cNvSpPr>
+          <p:nvPr>
+            <p:ph type="title"/>
+          </p:nvPr>
+        </p:nvSpPr>
+        <p:spPr/>
+        <p:txBody>
+          <a:bodyPr/>
+          <a:lstStyle/>
+          <a:p>
+            <a:endParaRPr lang="en-US"/>
+          </a:p>
+        </p:txBody>
+      </p:sp>
+      <p:sp>
+        <p:nvSpPr>
+          <p:cNvPr id="3" name="Content Placeholder 2">
+            <a:extLst>
+              <a:ext uri="{FF2B5EF4-FFF2-40B4-BE49-F238E27FC236}">
+                <a16:creationId xmlns:a16="http://schemas.microsoft.com/office/drawing/2014/main" id="{218A9DEE-4D7D-4863-8BCF-3531064E46D3}"/>
+              </a:ext>
+            </a:extLst>
+          </p:cNvPr>
+          <p:cNvSpPr>
+            <a:spLocks noGrp="1"/>
+          </p:cNvSpPr>
+          <p:nvPr>
+            <p:ph idx="1"/>
+          </p:nvPr>
+        </p:nvSpPr>
+        <p:spPr/>
+        <p:txBody>
+          <a:bodyPr/>
+          <a:lstStyle/>
+          <a:p>
+            <a:endParaRPr lang="en-US"/>
+          </a:p>
+        </p:txBody>
+      </p:sp>
+      <p:pic>
+        <p:nvPicPr>
+          <p:cNvPr id="4" name="Picture 3">
+            <a:extLst>
+              <a:ext uri="{FF2B5EF4-FFF2-40B4-BE49-F238E27FC236}">
+                <a16:creationId xmlns:a16="http://schemas.microsoft.com/office/drawing/2014/main" id="{C19F6B8D-7033-4C0A-A089-A51551F9E006}"/>
+              </a:ext>
+            </a:extLst>
+          </p:cNvPr>
+          <p:cNvPicPr>
+            <a:picLocks noChangeAspect="1"/>
+          </p:cNvPicPr>
+          <p:nvPr/>
+        </p:nvPicPr>
+        <p:blipFill>
+          <a:blip r:embed="rId2"/>
+          <a:stretch>
+            <a:fillRect/>
+          </a:stretch>
+        </p:blipFill>
+        <p:spPr>
+          <a:xfrm>
+            <a:off x="164795" y="136525"/>
+            <a:ext cx="11862410" cy="6845652"/>
+          </a:xfrm>
+          <a:prstGeom prst="rect">
+            <a:avLst/>
+          </a:prstGeom>
+        </p:spPr>
+      </p:pic>
+    </p:spTree>
+    <p:extLst>
+      <p:ext uri="{BB962C8B-B14F-4D97-AF65-F5344CB8AC3E}">
+        <p14:creationId xmlns:p14="http://schemas.microsoft.com/office/powerpoint/2010/main" val="1549576465"/>
+      </p:ext>
+    </p:extLst>
+  </p:cSld>
+  <p:clrMapOvr>
+    <a:masterClrMapping/>
+  </p:clrMapOvr>
+</p:sld>
+</file>
+
+<file path=ppt/slides/slide7.xml><?xml version="1.0" encoding="utf-8"?>
+<p:sld xmlns:a="http://schemas.openxmlformats.org/drawingml/2006/main" xmlns:r="http://schemas.openxmlformats.org/officeDocument/2006/relationships" xmlns:p="http://schemas.openxmlformats.org/presentationml/2006/main">
+  <p:cSld>
+    <p:spTree>
+      <p:nvGrpSpPr>
+        <p:cNvPr id="1" name=""/>
+        <p:cNvGrpSpPr/>
+        <p:nvPr/>
+      </p:nvGrpSpPr>
+      <p:grpSpPr>
+        <a:xfrm>
+          <a:off x="0" y="0"/>
+          <a:ext cx="0" cy="0"/>
+          <a:chOff x="0" y="0"/>
+          <a:chExt cx="0" cy="0"/>
+        </a:xfrm>
+      </p:grpSpPr>
+      <p:sp>
+        <p:nvSpPr>
+          <p:cNvPr id="2" name="Title 1">
+            <a:extLst>
+              <a:ext uri="{FF2B5EF4-FFF2-40B4-BE49-F238E27FC236}">
+                <a16:creationId xmlns:a16="http://schemas.microsoft.com/office/drawing/2014/main" id="{239978CB-7DD6-40B8-9E4D-DB881DC724C8}"/>
+              </a:ext>
+            </a:extLst>
+          </p:cNvPr>
+          <p:cNvSpPr>
+            <a:spLocks noGrp="1"/>
+          </p:cNvSpPr>
+          <p:nvPr>
+            <p:ph type="title"/>
+          </p:nvPr>
+        </p:nvSpPr>
+        <p:spPr/>
+        <p:txBody>
+          <a:bodyPr/>
+          <a:lstStyle/>
+          <a:p>
+            <a:endParaRPr lang="en-US"/>
+          </a:p>
+        </p:txBody>
+      </p:sp>
+      <p:sp>
+        <p:nvSpPr>
+          <p:cNvPr id="3" name="Content Placeholder 2">
+            <a:extLst>
+              <a:ext uri="{FF2B5EF4-FFF2-40B4-BE49-F238E27FC236}">
+                <a16:creationId xmlns:a16="http://schemas.microsoft.com/office/drawing/2014/main" id="{35FECA7D-3A43-42AF-AF63-ED2F3EC0505F}"/>
+              </a:ext>
+            </a:extLst>
+          </p:cNvPr>
+          <p:cNvSpPr>
+            <a:spLocks noGrp="1"/>
+          </p:cNvSpPr>
+          <p:nvPr>
+            <p:ph idx="1"/>
+          </p:nvPr>
+        </p:nvSpPr>
+        <p:spPr/>
+        <p:txBody>
+          <a:bodyPr/>
+          <a:lstStyle/>
+          <a:p>
+            <a:endParaRPr lang="en-US"/>
+          </a:p>
+        </p:txBody>
+      </p:sp>
+      <p:pic>
+        <p:nvPicPr>
+          <p:cNvPr id="4" name="Picture 3">
+            <a:extLst>
+              <a:ext uri="{FF2B5EF4-FFF2-40B4-BE49-F238E27FC236}">
+                <a16:creationId xmlns:a16="http://schemas.microsoft.com/office/drawing/2014/main" id="{FE6BA3DE-3323-4E23-AB43-AC5712DFFCC7}"/>
+              </a:ext>
+            </a:extLst>
+          </p:cNvPr>
+          <p:cNvPicPr>
+            <a:picLocks noChangeAspect="1"/>
+          </p:cNvPicPr>
+          <p:nvPr/>
+        </p:nvPicPr>
+        <p:blipFill>
+          <a:blip r:embed="rId2"/>
+          <a:stretch>
+            <a:fillRect/>
+          </a:stretch>
+        </p:blipFill>
+        <p:spPr>
+          <a:xfrm>
+            <a:off x="164795" y="6174"/>
+            <a:ext cx="11862410" cy="6845652"/>
+          </a:xfrm>
+          <a:prstGeom prst="rect">
+            <a:avLst/>
+          </a:prstGeom>
+        </p:spPr>
+      </p:pic>
+      <p:cxnSp>
+        <p:nvCxnSpPr>
+          <p:cNvPr id="6" name="Straight Arrow Connector 5">
+            <a:extLst>
+              <a:ext uri="{FF2B5EF4-FFF2-40B4-BE49-F238E27FC236}">
+                <a16:creationId xmlns:a16="http://schemas.microsoft.com/office/drawing/2014/main" id="{5664B49D-412E-4479-B091-C44E01A21392}"/>
+              </a:ext>
+            </a:extLst>
+          </p:cNvPr>
+          <p:cNvCxnSpPr/>
+          <p:nvPr/>
+        </p:nvCxnSpPr>
+        <p:spPr>
+          <a:xfrm>
+            <a:off x="1866900" y="2000250"/>
+            <a:ext cx="2876550" cy="1136650"/>
+          </a:xfrm>
+          <a:prstGeom prst="straightConnector1">
+            <a:avLst/>
+          </a:prstGeom>
+          <a:ln>
+            <a:tailEnd type="triangle"/>
+          </a:ln>
+        </p:spPr>
+        <p:style>
+          <a:lnRef idx="1">
+            <a:schemeClr val="accent1"/>
+          </a:lnRef>
+          <a:fillRef idx="0">
+            <a:schemeClr val="accent1"/>
+          </a:fillRef>
+          <a:effectRef idx="0">
+            <a:schemeClr val="accent1"/>
+          </a:effectRef>
+          <a:fontRef idx="minor">
+            <a:schemeClr val="tx1"/>
+          </a:fontRef>
+        </p:style>
+      </p:cxnSp>
+      <p:sp>
+        <p:nvSpPr>
+          <p:cNvPr id="7" name="TextBox 6">
+            <a:extLst>
+              <a:ext uri="{FF2B5EF4-FFF2-40B4-BE49-F238E27FC236}">
+                <a16:creationId xmlns:a16="http://schemas.microsoft.com/office/drawing/2014/main" id="{45C41B2D-4438-43B3-8AB4-07F585659B75}"/>
+              </a:ext>
+            </a:extLst>
+          </p:cNvPr>
+          <p:cNvSpPr txBox="1"/>
+          <p:nvPr/>
+        </p:nvSpPr>
+        <p:spPr>
+          <a:xfrm>
+            <a:off x="234950" y="1295400"/>
+            <a:ext cx="1631950" cy="923330"/>
+          </a:xfrm>
+          <a:prstGeom prst="rect">
+            <a:avLst/>
+          </a:prstGeom>
+          <a:noFill/>
+        </p:spPr>
+        <p:txBody>
+          <a:bodyPr wrap="square" rtlCol="0">
+            <a:spAutoFit/>
+          </a:bodyPr>
+          <a:lstStyle/>
+          <a:p>
+            <a:r>
+              <a:rPr lang="en-US" dirty="0"/>
+              <a:t>Interesting, what age is this? </a:t>
+            </a:r>
+          </a:p>
+        </p:txBody>
+      </p:sp>
+    </p:spTree>
+    <p:extLst>
+      <p:ext uri="{BB962C8B-B14F-4D97-AF65-F5344CB8AC3E}">
+        <p14:creationId xmlns:p14="http://schemas.microsoft.com/office/powerpoint/2010/main" val="2096850138"/>
+      </p:ext>
+    </p:extLst>
+  </p:cSld>
+  <p:clrMapOvr>
+    <a:masterClrMapping/>
+  </p:clrMapOvr>
+</p:sld>
+</file>
+
+<file path=ppt/slides/slide8.xml><?xml version="1.0" encoding="utf-8"?>
+<p:sld xmlns:a="http://schemas.openxmlformats.org/drawingml/2006/main" xmlns:r="http://schemas.openxmlformats.org/officeDocument/2006/relationships" xmlns:p="http://schemas.openxmlformats.org/presentationml/2006/main">
+  <p:cSld>
+    <p:spTree>
+      <p:nvGrpSpPr>
+        <p:cNvPr id="1" name=""/>
+        <p:cNvGrpSpPr/>
+        <p:nvPr/>
+      </p:nvGrpSpPr>
+      <p:grpSpPr>
+        <a:xfrm>
+          <a:off x="0" y="0"/>
+          <a:ext cx="0" cy="0"/>
+          <a:chOff x="0" y="0"/>
+          <a:chExt cx="0" cy="0"/>
+        </a:xfrm>
+      </p:grpSpPr>
+      <p:sp>
+        <p:nvSpPr>
+          <p:cNvPr id="2" name="Title 1">
+            <a:extLst>
+              <a:ext uri="{FF2B5EF4-FFF2-40B4-BE49-F238E27FC236}">
+                <a16:creationId xmlns:a16="http://schemas.microsoft.com/office/drawing/2014/main" id="{BC104E05-66F4-4230-AB27-EF37DEC9CC84}"/>
+              </a:ext>
+            </a:extLst>
+          </p:cNvPr>
+          <p:cNvSpPr>
+            <a:spLocks noGrp="1"/>
+          </p:cNvSpPr>
+          <p:nvPr>
+            <p:ph type="title"/>
+          </p:nvPr>
+        </p:nvSpPr>
+        <p:spPr/>
+        <p:txBody>
+          <a:bodyPr/>
+          <a:lstStyle/>
+          <a:p>
+            <a:endParaRPr lang="en-US"/>
+          </a:p>
+        </p:txBody>
+      </p:sp>
+      <p:sp>
+        <p:nvSpPr>
+          <p:cNvPr id="3" name="Content Placeholder 2">
+            <a:extLst>
+              <a:ext uri="{FF2B5EF4-FFF2-40B4-BE49-F238E27FC236}">
+                <a16:creationId xmlns:a16="http://schemas.microsoft.com/office/drawing/2014/main" id="{48C58177-6C18-460E-8F5F-2126E32A3B76}"/>
+              </a:ext>
+            </a:extLst>
+          </p:cNvPr>
+          <p:cNvSpPr>
+            <a:spLocks noGrp="1"/>
+          </p:cNvSpPr>
+          <p:nvPr>
+            <p:ph idx="1"/>
+          </p:nvPr>
+        </p:nvSpPr>
+        <p:spPr/>
+        <p:txBody>
+          <a:bodyPr/>
+          <a:lstStyle/>
+          <a:p>
+            <a:endParaRPr lang="en-US"/>
+          </a:p>
+        </p:txBody>
+      </p:sp>
+      <p:pic>
+        <p:nvPicPr>
+          <p:cNvPr id="4" name="Picture 3">
+            <a:extLst>
+              <a:ext uri="{FF2B5EF4-FFF2-40B4-BE49-F238E27FC236}">
+                <a16:creationId xmlns:a16="http://schemas.microsoft.com/office/drawing/2014/main" id="{643B26D7-03EC-4442-B1E3-49337396B55D}"/>
+              </a:ext>
+            </a:extLst>
+          </p:cNvPr>
+          <p:cNvPicPr>
+            <a:picLocks noChangeAspect="1"/>
+          </p:cNvPicPr>
+          <p:nvPr/>
+        </p:nvPicPr>
+        <p:blipFill>
+          <a:blip r:embed="rId2"/>
+          <a:stretch>
+            <a:fillRect/>
+          </a:stretch>
+        </p:blipFill>
+        <p:spPr>
+          <a:xfrm>
+            <a:off x="164795" y="6174"/>
+            <a:ext cx="11862410" cy="6845652"/>
+          </a:xfrm>
+          <a:prstGeom prst="rect">
+            <a:avLst/>
+          </a:prstGeom>
+        </p:spPr>
+      </p:pic>
+    </p:spTree>
+    <p:extLst>
+      <p:ext uri="{BB962C8B-B14F-4D97-AF65-F5344CB8AC3E}">
+        <p14:creationId xmlns:p14="http://schemas.microsoft.com/office/powerpoint/2010/main" val="2479916901"/>
       </p:ext>
     </p:extLst>
   </p:cSld>

</xml_diff>

<commit_message>
updated powerpoint with plots. Updated rmarkdown with linear model and stepwise selection code
</commit_message>
<xml_diff>
--- a/case_study_02_presentation.pptx
+++ b/case_study_02_presentation.pptx
@@ -5,14 +5,25 @@
     <p:sldMasterId id="2147483648" r:id="rId1"/>
   </p:sldMasterIdLst>
   <p:sldIdLst>
-    <p:sldId id="256" r:id="rId2"/>
-    <p:sldId id="257" r:id="rId3"/>
-    <p:sldId id="258" r:id="rId4"/>
-    <p:sldId id="259" r:id="rId5"/>
-    <p:sldId id="260" r:id="rId6"/>
-    <p:sldId id="261" r:id="rId7"/>
-    <p:sldId id="262" r:id="rId8"/>
-    <p:sldId id="263" r:id="rId9"/>
+    <p:sldId id="264" r:id="rId2"/>
+    <p:sldId id="265" r:id="rId3"/>
+    <p:sldId id="266" r:id="rId4"/>
+    <p:sldId id="267" r:id="rId5"/>
+    <p:sldId id="268" r:id="rId6"/>
+    <p:sldId id="269" r:id="rId7"/>
+    <p:sldId id="256" r:id="rId8"/>
+    <p:sldId id="257" r:id="rId9"/>
+    <p:sldId id="270" r:id="rId10"/>
+    <p:sldId id="271" r:id="rId11"/>
+    <p:sldId id="272" r:id="rId12"/>
+    <p:sldId id="273" r:id="rId13"/>
+    <p:sldId id="274" r:id="rId14"/>
+    <p:sldId id="258" r:id="rId15"/>
+    <p:sldId id="259" r:id="rId16"/>
+    <p:sldId id="260" r:id="rId17"/>
+    <p:sldId id="261" r:id="rId18"/>
+    <p:sldId id="262" r:id="rId19"/>
+    <p:sldId id="263" r:id="rId20"/>
   </p:sldIdLst>
   <p:sldSz cx="12192000" cy="6858000"/>
   <p:notesSz cx="6858000" cy="9144000"/>
@@ -112,6 +123,45 @@
     </a:lvl9pPr>
   </p:defaultTextStyle>
   <p:extLst>
+    <p:ext uri="{521415D9-36F7-43E2-AB2F-B90AF26B5E84}">
+      <p14:sectionLst xmlns:p14="http://schemas.microsoft.com/office/powerpoint/2010/main">
+        <p14:section name="Introduction" id="{2F6788D6-CC27-40E0-AD76-A1D398242723}">
+          <p14:sldIdLst>
+            <p14:sldId id="264"/>
+            <p14:sldId id="265"/>
+            <p14:sldId id="266"/>
+          </p14:sldIdLst>
+        </p14:section>
+        <p14:section name="Story" id="{0D082006-2A04-495E-9CE1-8FEA757F5F91}">
+          <p14:sldIdLst>
+            <p14:sldId id="267"/>
+            <p14:sldId id="268"/>
+          </p14:sldIdLst>
+        </p14:section>
+        <p14:section name="Conclusion" id="{CC523660-F8A3-4597-8458-66C8365C0AE2}">
+          <p14:sldIdLst>
+            <p14:sldId id="269"/>
+          </p14:sldIdLst>
+        </p14:section>
+        <p14:section name="PLOTS" id="{DEADCFA1-F558-47F7-A383-774B4A1ACCF7}">
+          <p14:sldIdLst>
+            <p14:sldId id="256"/>
+            <p14:sldId id="257"/>
+            <p14:sldId id="270"/>
+            <p14:sldId id="271"/>
+            <p14:sldId id="272"/>
+            <p14:sldId id="273"/>
+            <p14:sldId id="274"/>
+            <p14:sldId id="258"/>
+            <p14:sldId id="259"/>
+            <p14:sldId id="260"/>
+            <p14:sldId id="261"/>
+            <p14:sldId id="262"/>
+            <p14:sldId id="263"/>
+          </p14:sldIdLst>
+        </p14:section>
+      </p14:sectionLst>
+    </p:ext>
     <p:ext uri="{EFAFB233-063F-42B5-8137-9DF3F51BA10A}">
       <p15:sldGuideLst xmlns:p15="http://schemas.microsoft.com/office/powerpoint/2012/main"/>
     </p:ext>
@@ -3338,15 +3388,15 @@
           <p:cNvPr id="2" name="Title 1">
             <a:extLst>
               <a:ext uri="{FF2B5EF4-FFF2-40B4-BE49-F238E27FC236}">
-                <a16:creationId xmlns:a16="http://schemas.microsoft.com/office/drawing/2014/main" id="{6F3EDFA2-3009-4284-AE03-FFF227999411}"/>
-              </a:ext>
-            </a:extLst>
-          </p:cNvPr>
-          <p:cNvSpPr>
-            <a:spLocks noGrp="1"/>
-          </p:cNvSpPr>
-          <p:nvPr>
-            <p:ph type="ctrTitle"/>
+                <a16:creationId xmlns:a16="http://schemas.microsoft.com/office/drawing/2014/main" id="{7B26A125-163D-4C7A-8335-DE8A39DA0BE4}"/>
+              </a:ext>
+            </a:extLst>
+          </p:cNvPr>
+          <p:cNvSpPr>
+            <a:spLocks noGrp="1"/>
+          </p:cNvSpPr>
+          <p:nvPr>
+            <p:ph type="title"/>
           </p:nvPr>
         </p:nvSpPr>
         <p:spPr/>
@@ -3356,25 +3406,25 @@
           <a:p>
             <a:r>
               <a:rPr lang="en-US" dirty="0"/>
-              <a:t>Imported data</a:t>
-            </a:r>
-          </a:p>
-        </p:txBody>
-      </p:sp>
-      <p:sp>
-        <p:nvSpPr>
-          <p:cNvPr id="3" name="Subtitle 2">
-            <a:extLst>
-              <a:ext uri="{FF2B5EF4-FFF2-40B4-BE49-F238E27FC236}">
-                <a16:creationId xmlns:a16="http://schemas.microsoft.com/office/drawing/2014/main" id="{C79B5F8E-EF01-4CAB-B44C-EEA14ED6DEB9}"/>
-              </a:ext>
-            </a:extLst>
-          </p:cNvPr>
-          <p:cNvSpPr>
-            <a:spLocks noGrp="1"/>
-          </p:cNvSpPr>
-          <p:nvPr>
-            <p:ph type="subTitle" idx="1"/>
+              <a:t>Introduction</a:t>
+            </a:r>
+          </a:p>
+        </p:txBody>
+      </p:sp>
+      <p:sp>
+        <p:nvSpPr>
+          <p:cNvPr id="3" name="Content Placeholder 2">
+            <a:extLst>
+              <a:ext uri="{FF2B5EF4-FFF2-40B4-BE49-F238E27FC236}">
+                <a16:creationId xmlns:a16="http://schemas.microsoft.com/office/drawing/2014/main" id="{0AD8FDF9-3071-4C93-92D9-926732942A30}"/>
+              </a:ext>
+            </a:extLst>
+          </p:cNvPr>
+          <p:cNvSpPr>
+            <a:spLocks noGrp="1"/>
+          </p:cNvSpPr>
+          <p:nvPr>
+            <p:ph idx="1"/>
           </p:nvPr>
         </p:nvSpPr>
         <p:spPr/>
@@ -3382,35 +3432,14 @@
           <a:bodyPr/>
           <a:lstStyle/>
           <a:p>
-            <a:r>
-              <a:rPr lang="en-US" dirty="0"/>
-              <a:t>library(</a:t>
-            </a:r>
-            <a:r>
-              <a:rPr lang="en-US" dirty="0" err="1"/>
-              <a:t>openxlsx</a:t>
-            </a:r>
-            <a:r>
-              <a:rPr lang="en-US" dirty="0"/>
-              <a:t>)</a:t>
-            </a:r>
-          </a:p>
-          <a:p>
-            <a:r>
-              <a:rPr lang="en-US" dirty="0" err="1"/>
-              <a:t>attritionData</a:t>
-            </a:r>
-            <a:r>
-              <a:rPr lang="en-US" dirty="0"/>
-              <a:t> &lt;- read.xlsx("CaseStudy2-data.xlsx")</a:t>
-            </a:r>
+            <a:endParaRPr lang="en-US" dirty="0"/>
           </a:p>
         </p:txBody>
       </p:sp>
     </p:spTree>
     <p:extLst>
       <p:ext uri="{BB962C8B-B14F-4D97-AF65-F5344CB8AC3E}">
-        <p14:creationId xmlns:p14="http://schemas.microsoft.com/office/powerpoint/2010/main" val="1951453925"/>
+        <p14:creationId xmlns:p14="http://schemas.microsoft.com/office/powerpoint/2010/main" val="1803650574"/>
       </p:ext>
     </p:extLst>
   </p:cSld>
@@ -3420,7 +3449,7 @@
 </p:sld>
 </file>
 
-<file path=ppt/slides/slide2.xml><?xml version="1.0" encoding="utf-8"?>
+<file path=ppt/slides/slide10.xml><?xml version="1.0" encoding="utf-8"?>
 <p:sld xmlns:a="http://schemas.openxmlformats.org/drawingml/2006/main" xmlns:r="http://schemas.openxmlformats.org/officeDocument/2006/relationships" xmlns:p="http://schemas.openxmlformats.org/presentationml/2006/main">
   <p:cSld>
     <p:spTree>
@@ -3437,1477 +3466,75 @@
           <a:chExt cx="0" cy="0"/>
         </a:xfrm>
       </p:grpSpPr>
-      <p:sp>
-        <p:nvSpPr>
-          <p:cNvPr id="2" name="Title 1">
-            <a:extLst>
-              <a:ext uri="{FF2B5EF4-FFF2-40B4-BE49-F238E27FC236}">
-                <a16:creationId xmlns:a16="http://schemas.microsoft.com/office/drawing/2014/main" id="{1700EF96-D0BC-4A91-983C-813B13359FA5}"/>
-              </a:ext>
-            </a:extLst>
-          </p:cNvPr>
-          <p:cNvSpPr>
-            <a:spLocks noGrp="1"/>
-          </p:cNvSpPr>
-          <p:nvPr>
-            <p:ph type="title"/>
-          </p:nvPr>
-        </p:nvSpPr>
-        <p:spPr/>
-        <p:txBody>
-          <a:bodyPr/>
-          <a:lstStyle/>
-          <a:p>
-            <a:r>
-              <a:rPr lang="en-US" dirty="0"/>
-              <a:t>Inspected Data</a:t>
-            </a:r>
-          </a:p>
-        </p:txBody>
-      </p:sp>
-      <p:sp>
-        <p:nvSpPr>
-          <p:cNvPr id="4" name="Content Placeholder 2">
-            <a:extLst>
-              <a:ext uri="{FF2B5EF4-FFF2-40B4-BE49-F238E27FC236}">
-                <a16:creationId xmlns:a16="http://schemas.microsoft.com/office/drawing/2014/main" id="{9BAB3DB7-62C2-4A2F-8D61-BC962C8DF26A}"/>
-              </a:ext>
-            </a:extLst>
-          </p:cNvPr>
-          <p:cNvSpPr txBox="1">
-            <a:spLocks/>
-          </p:cNvSpPr>
+      <p:pic>
+        <p:nvPicPr>
+          <p:cNvPr id="5" name="Picture 4">
+            <a:extLst>
+              <a:ext uri="{FF2B5EF4-FFF2-40B4-BE49-F238E27FC236}">
+                <a16:creationId xmlns:a16="http://schemas.microsoft.com/office/drawing/2014/main" id="{13DED279-D6D4-4397-A153-3F5D0C642BE7}"/>
+              </a:ext>
+            </a:extLst>
+          </p:cNvPr>
+          <p:cNvPicPr>
+            <a:picLocks noChangeAspect="1"/>
+          </p:cNvPicPr>
           <p:nvPr/>
-        </p:nvSpPr>
+        </p:nvPicPr>
+        <p:blipFill>
+          <a:blip r:embed="rId2"/>
+          <a:stretch>
+            <a:fillRect/>
+          </a:stretch>
+        </p:blipFill>
         <p:spPr>
           <a:xfrm>
-            <a:off x="787400" y="2946399"/>
-            <a:ext cx="10515600" cy="3546476"/>
+            <a:off x="3054193" y="228435"/>
+            <a:ext cx="6083613" cy="6401129"/>
           </a:xfrm>
           <a:prstGeom prst="rect">
             <a:avLst/>
           </a:prstGeom>
         </p:spPr>
-        <p:txBody>
-          <a:bodyPr vert="horz" lIns="91440" tIns="45720" rIns="91440" bIns="45720" rtlCol="0">
-            <a:normAutofit fontScale="47500" lnSpcReduction="20000"/>
-          </a:bodyPr>
-          <a:lstStyle>
-            <a:lvl1pPr marL="228600" indent="-228600" algn="l" defTabSz="914400" rtl="0" eaLnBrk="1" latinLnBrk="0" hangingPunct="1">
-              <a:lnSpc>
-                <a:spcPct val="90000"/>
-              </a:lnSpc>
-              <a:spcBef>
-                <a:spcPts val="1000"/>
-              </a:spcBef>
-              <a:buFont typeface="Arial" panose="020B0604020202020204" pitchFamily="34" charset="0"/>
-              <a:buChar char="•"/>
-              <a:defRPr sz="2800" kern="1200">
-                <a:solidFill>
-                  <a:schemeClr val="tx1"/>
-                </a:solidFill>
-                <a:latin typeface="+mn-lt"/>
-                <a:ea typeface="+mn-ea"/>
-                <a:cs typeface="+mn-cs"/>
-              </a:defRPr>
-            </a:lvl1pPr>
-            <a:lvl2pPr marL="685800" indent="-228600" algn="l" defTabSz="914400" rtl="0" eaLnBrk="1" latinLnBrk="0" hangingPunct="1">
-              <a:lnSpc>
-                <a:spcPct val="90000"/>
-              </a:lnSpc>
-              <a:spcBef>
-                <a:spcPts val="500"/>
-              </a:spcBef>
-              <a:buFont typeface="Arial" panose="020B0604020202020204" pitchFamily="34" charset="0"/>
-              <a:buChar char="•"/>
-              <a:defRPr sz="2400" kern="1200">
-                <a:solidFill>
-                  <a:schemeClr val="tx1"/>
-                </a:solidFill>
-                <a:latin typeface="+mn-lt"/>
-                <a:ea typeface="+mn-ea"/>
-                <a:cs typeface="+mn-cs"/>
-              </a:defRPr>
-            </a:lvl2pPr>
-            <a:lvl3pPr marL="1143000" indent="-228600" algn="l" defTabSz="914400" rtl="0" eaLnBrk="1" latinLnBrk="0" hangingPunct="1">
-              <a:lnSpc>
-                <a:spcPct val="90000"/>
-              </a:lnSpc>
-              <a:spcBef>
-                <a:spcPts val="500"/>
-              </a:spcBef>
-              <a:buFont typeface="Arial" panose="020B0604020202020204" pitchFamily="34" charset="0"/>
-              <a:buChar char="•"/>
-              <a:defRPr sz="2000" kern="1200">
-                <a:solidFill>
-                  <a:schemeClr val="tx1"/>
-                </a:solidFill>
-                <a:latin typeface="+mn-lt"/>
-                <a:ea typeface="+mn-ea"/>
-                <a:cs typeface="+mn-cs"/>
-              </a:defRPr>
-            </a:lvl3pPr>
-            <a:lvl4pPr marL="1600200" indent="-228600" algn="l" defTabSz="914400" rtl="0" eaLnBrk="1" latinLnBrk="0" hangingPunct="1">
-              <a:lnSpc>
-                <a:spcPct val="90000"/>
-              </a:lnSpc>
-              <a:spcBef>
-                <a:spcPts val="500"/>
-              </a:spcBef>
-              <a:buFont typeface="Arial" panose="020B0604020202020204" pitchFamily="34" charset="0"/>
-              <a:buChar char="•"/>
-              <a:defRPr sz="1800" kern="1200">
-                <a:solidFill>
-                  <a:schemeClr val="tx1"/>
-                </a:solidFill>
-                <a:latin typeface="+mn-lt"/>
-                <a:ea typeface="+mn-ea"/>
-                <a:cs typeface="+mn-cs"/>
-              </a:defRPr>
-            </a:lvl4pPr>
-            <a:lvl5pPr marL="2057400" indent="-228600" algn="l" defTabSz="914400" rtl="0" eaLnBrk="1" latinLnBrk="0" hangingPunct="1">
-              <a:lnSpc>
-                <a:spcPct val="90000"/>
-              </a:lnSpc>
-              <a:spcBef>
-                <a:spcPts val="500"/>
-              </a:spcBef>
-              <a:buFont typeface="Arial" panose="020B0604020202020204" pitchFamily="34" charset="0"/>
-              <a:buChar char="•"/>
-              <a:defRPr sz="1800" kern="1200">
-                <a:solidFill>
-                  <a:schemeClr val="tx1"/>
-                </a:solidFill>
-                <a:latin typeface="+mn-lt"/>
-                <a:ea typeface="+mn-ea"/>
-                <a:cs typeface="+mn-cs"/>
-              </a:defRPr>
-            </a:lvl5pPr>
-            <a:lvl6pPr marL="2514600" indent="-228600" algn="l" defTabSz="914400" rtl="0" eaLnBrk="1" latinLnBrk="0" hangingPunct="1">
-              <a:lnSpc>
-                <a:spcPct val="90000"/>
-              </a:lnSpc>
-              <a:spcBef>
-                <a:spcPts val="500"/>
-              </a:spcBef>
-              <a:buFont typeface="Arial" panose="020B0604020202020204" pitchFamily="34" charset="0"/>
-              <a:buChar char="•"/>
-              <a:defRPr sz="1800" kern="1200">
-                <a:solidFill>
-                  <a:schemeClr val="tx1"/>
-                </a:solidFill>
-                <a:latin typeface="+mn-lt"/>
-                <a:ea typeface="+mn-ea"/>
-                <a:cs typeface="+mn-cs"/>
-              </a:defRPr>
-            </a:lvl6pPr>
-            <a:lvl7pPr marL="2971800" indent="-228600" algn="l" defTabSz="914400" rtl="0" eaLnBrk="1" latinLnBrk="0" hangingPunct="1">
-              <a:lnSpc>
-                <a:spcPct val="90000"/>
-              </a:lnSpc>
-              <a:spcBef>
-                <a:spcPts val="500"/>
-              </a:spcBef>
-              <a:buFont typeface="Arial" panose="020B0604020202020204" pitchFamily="34" charset="0"/>
-              <a:buChar char="•"/>
-              <a:defRPr sz="1800" kern="1200">
-                <a:solidFill>
-                  <a:schemeClr val="tx1"/>
-                </a:solidFill>
-                <a:latin typeface="+mn-lt"/>
-                <a:ea typeface="+mn-ea"/>
-                <a:cs typeface="+mn-cs"/>
-              </a:defRPr>
-            </a:lvl7pPr>
-            <a:lvl8pPr marL="3429000" indent="-228600" algn="l" defTabSz="914400" rtl="0" eaLnBrk="1" latinLnBrk="0" hangingPunct="1">
-              <a:lnSpc>
-                <a:spcPct val="90000"/>
-              </a:lnSpc>
-              <a:spcBef>
-                <a:spcPts val="500"/>
-              </a:spcBef>
-              <a:buFont typeface="Arial" panose="020B0604020202020204" pitchFamily="34" charset="0"/>
-              <a:buChar char="•"/>
-              <a:defRPr sz="1800" kern="1200">
-                <a:solidFill>
-                  <a:schemeClr val="tx1"/>
-                </a:solidFill>
-                <a:latin typeface="+mn-lt"/>
-                <a:ea typeface="+mn-ea"/>
-                <a:cs typeface="+mn-cs"/>
-              </a:defRPr>
-            </a:lvl8pPr>
-            <a:lvl9pPr marL="3886200" indent="-228600" algn="l" defTabSz="914400" rtl="0" eaLnBrk="1" latinLnBrk="0" hangingPunct="1">
-              <a:lnSpc>
-                <a:spcPct val="90000"/>
-              </a:lnSpc>
-              <a:spcBef>
-                <a:spcPts val="500"/>
-              </a:spcBef>
-              <a:buFont typeface="Arial" panose="020B0604020202020204" pitchFamily="34" charset="0"/>
-              <a:buChar char="•"/>
-              <a:defRPr sz="1800" kern="1200">
-                <a:solidFill>
-                  <a:schemeClr val="tx1"/>
-                </a:solidFill>
-                <a:latin typeface="+mn-lt"/>
-                <a:ea typeface="+mn-ea"/>
-                <a:cs typeface="+mn-cs"/>
-              </a:defRPr>
-            </a:lvl9pPr>
-          </a:lstStyle>
-          <a:p>
-            <a:r>
-              <a:rPr lang="en-US" dirty="0"/>
-              <a:t>Potential Trends related to attrition:</a:t>
-            </a:r>
-          </a:p>
-          <a:p>
-            <a:pPr lvl="1"/>
-            <a:r>
-              <a:rPr lang="en-US" dirty="0"/>
-              <a:t>Age related to Attrition</a:t>
-            </a:r>
-          </a:p>
-          <a:p>
-            <a:pPr lvl="2"/>
-            <a:r>
-              <a:rPr lang="en-US" dirty="0"/>
-              <a:t>People retire, midlife crisis?</a:t>
-            </a:r>
-          </a:p>
-          <a:p>
-            <a:pPr lvl="1"/>
-            <a:r>
-              <a:rPr lang="en-US" dirty="0" err="1"/>
-              <a:t>WorklifeBalance</a:t>
-            </a:r>
-            <a:endParaRPr lang="en-US" dirty="0"/>
-          </a:p>
-          <a:p>
-            <a:pPr lvl="2"/>
-            <a:r>
-              <a:rPr lang="en-US" dirty="0"/>
-              <a:t>People retire, midlife crisis?</a:t>
-            </a:r>
-          </a:p>
-          <a:p>
-            <a:pPr lvl="1"/>
-            <a:r>
-              <a:rPr lang="en-US" dirty="0" err="1"/>
-              <a:t>JobInvolvment</a:t>
-            </a:r>
-            <a:r>
-              <a:rPr lang="en-US" dirty="0"/>
-              <a:t>/</a:t>
-            </a:r>
-            <a:r>
-              <a:rPr lang="en-US" dirty="0" err="1"/>
-              <a:t>JobSatisfaction</a:t>
-            </a:r>
-            <a:endParaRPr lang="en-US" dirty="0"/>
-          </a:p>
-          <a:p>
-            <a:pPr lvl="2"/>
-            <a:r>
-              <a:rPr lang="en-US" dirty="0"/>
-              <a:t>Are people bored? Are they engaged? Too much work?</a:t>
-            </a:r>
-          </a:p>
-          <a:p>
-            <a:pPr lvl="1"/>
-            <a:r>
-              <a:rPr lang="en-US" dirty="0"/>
-              <a:t>Years at company</a:t>
-            </a:r>
-          </a:p>
-          <a:p>
-            <a:pPr lvl="2"/>
-            <a:r>
-              <a:rPr lang="en-US" dirty="0"/>
-              <a:t>Do the longer people work at company deter them more from leaving?</a:t>
-            </a:r>
-          </a:p>
-          <a:p>
-            <a:pPr lvl="1"/>
-            <a:r>
-              <a:rPr lang="en-US" dirty="0"/>
-              <a:t>Job Role</a:t>
-            </a:r>
-          </a:p>
-          <a:p>
-            <a:pPr lvl="2"/>
-            <a:r>
-              <a:rPr lang="en-US" dirty="0"/>
-              <a:t>What jobs have the most people leaving? </a:t>
-            </a:r>
-          </a:p>
-          <a:p>
-            <a:pPr lvl="1"/>
-            <a:r>
-              <a:rPr lang="en-US" dirty="0"/>
-              <a:t>Monthly Income</a:t>
-            </a:r>
-          </a:p>
-          <a:p>
-            <a:pPr lvl="2"/>
-            <a:r>
-              <a:rPr lang="en-US" dirty="0"/>
-              <a:t>Is there an average wage that causes people to leave?</a:t>
-            </a:r>
-          </a:p>
-          <a:p>
-            <a:pPr lvl="1"/>
-            <a:r>
-              <a:rPr lang="en-US" dirty="0"/>
-              <a:t>Gender</a:t>
-            </a:r>
-          </a:p>
-          <a:p>
-            <a:pPr lvl="2"/>
-            <a:r>
-              <a:rPr lang="en-US" dirty="0"/>
-              <a:t>Which gender is leaving more? </a:t>
-            </a:r>
-          </a:p>
-          <a:p>
-            <a:pPr marL="914400" lvl="2" indent="0">
-              <a:buNone/>
-            </a:pPr>
-            <a:endParaRPr lang="en-US" dirty="0"/>
-          </a:p>
-          <a:p>
-            <a:pPr lvl="2"/>
-            <a:endParaRPr lang="en-US" dirty="0"/>
-          </a:p>
-          <a:p>
-            <a:pPr marL="914400" lvl="2" indent="0">
-              <a:buNone/>
-            </a:pPr>
-            <a:endParaRPr lang="en-US" dirty="0"/>
-          </a:p>
-          <a:p>
-            <a:pPr marL="914400" lvl="2" indent="0">
-              <a:buNone/>
-            </a:pPr>
-            <a:r>
-              <a:rPr lang="en-US" dirty="0"/>
-              <a:t> </a:t>
-            </a:r>
-          </a:p>
-          <a:p>
-            <a:pPr marL="914400" lvl="2" indent="0">
-              <a:buNone/>
-            </a:pPr>
-            <a:endParaRPr lang="en-US" dirty="0"/>
-          </a:p>
-        </p:txBody>
-      </p:sp>
-      <p:sp>
-        <p:nvSpPr>
-          <p:cNvPr id="6" name="Rectangle 2">
-            <a:extLst>
-              <a:ext uri="{FF2B5EF4-FFF2-40B4-BE49-F238E27FC236}">
-                <a16:creationId xmlns:a16="http://schemas.microsoft.com/office/drawing/2014/main" id="{37ED1D22-0F4E-4AA1-8713-8B09CC1F07BB}"/>
-              </a:ext>
-            </a:extLst>
-          </p:cNvPr>
-          <p:cNvSpPr>
-            <a:spLocks noGrp="1" noChangeArrowheads="1"/>
-          </p:cNvSpPr>
-          <p:nvPr>
-            <p:ph idx="1"/>
-          </p:nvPr>
-        </p:nvSpPr>
-        <p:spPr bwMode="auto">
+      </p:pic>
+      <p:sp>
+        <p:nvSpPr>
+          <p:cNvPr id="6" name="TextBox 5">
+            <a:extLst>
+              <a:ext uri="{FF2B5EF4-FFF2-40B4-BE49-F238E27FC236}">
+                <a16:creationId xmlns:a16="http://schemas.microsoft.com/office/drawing/2014/main" id="{61C61FA3-85A4-4E0A-A9C0-F361A756102D}"/>
+              </a:ext>
+            </a:extLst>
+          </p:cNvPr>
+          <p:cNvSpPr txBox="1"/>
+          <p:nvPr/>
+        </p:nvSpPr>
+        <p:spPr>
           <a:xfrm>
-            <a:off x="963693" y="1562100"/>
-            <a:ext cx="8771632" cy="1231106"/>
+            <a:off x="203200" y="1257300"/>
+            <a:ext cx="2489200" cy="369332"/>
           </a:xfrm>
           <a:prstGeom prst="rect">
             <a:avLst/>
           </a:prstGeom>
-          <a:solidFill>
-            <a:srgbClr val="FFFFFF"/>
-          </a:solidFill>
-          <a:ln>
-            <a:noFill/>
-          </a:ln>
-          <a:effectLst/>
-          <a:extLst>
-            <a:ext uri="{91240B29-F687-4F45-9708-019B960494DF}">
-              <a14:hiddenLine xmlns:a14="http://schemas.microsoft.com/office/drawing/2010/main" w="9525">
-                <a:solidFill>
-                  <a:schemeClr val="tx1"/>
-                </a:solidFill>
-                <a:miter lim="800000"/>
-                <a:headEnd/>
-                <a:tailEnd/>
-              </a14:hiddenLine>
-            </a:ext>
-            <a:ext uri="{AF507438-7753-43E0-B8FC-AC1667EBCBE1}">
-              <a14:hiddenEffects xmlns:a14="http://schemas.microsoft.com/office/drawing/2010/main">
-                <a:effectLst>
-                  <a:outerShdw dist="35921" dir="2700000" algn="ctr" rotWithShape="0">
-                    <a:schemeClr val="bg2"/>
-                  </a:outerShdw>
-                </a:effectLst>
-              </a14:hiddenEffects>
-            </a:ext>
-          </a:extLst>
+          <a:noFill/>
         </p:spPr>
         <p:txBody>
-          <a:bodyPr vert="horz" wrap="none" lIns="0" tIns="0" rIns="0" bIns="0" numCol="1" anchor="ctr" anchorCtr="0" compatLnSpc="1">
-            <a:prstTxWarp prst="textNoShape">
-              <a:avLst/>
-            </a:prstTxWarp>
+          <a:bodyPr wrap="square" rtlCol="0">
             <a:spAutoFit/>
           </a:bodyPr>
           <a:lstStyle/>
           <a:p>
-            <a:pPr marR="0" lvl="0" algn="l" defTabSz="914400" rtl="0" eaLnBrk="0" fontAlgn="base" latinLnBrk="0" hangingPunct="0">
-              <a:lnSpc>
-                <a:spcPct val="100000"/>
-              </a:lnSpc>
-              <a:spcBef>
-                <a:spcPct val="0"/>
-              </a:spcBef>
-              <a:spcAft>
-                <a:spcPct val="0"/>
-              </a:spcAft>
-              <a:buClrTx/>
-              <a:buSzTx/>
-              <a:buFont typeface="Wingdings" panose="05000000000000000000" pitchFamily="2" charset="2"/>
-              <a:buChar char="Ø"/>
-              <a:tabLst/>
-            </a:pPr>
-            <a:r>
-              <a:rPr kumimoji="0" lang="en-US" altLang="en-US" sz="1000" b="0" i="0" u="none" strike="noStrike" cap="none" normalizeH="0" baseline="0" dirty="0">
-                <a:ln>
-                  <a:noFill/>
-                </a:ln>
-                <a:solidFill>
-                  <a:srgbClr val="0000FF"/>
-                </a:solidFill>
-                <a:effectLst/>
-                <a:latin typeface="Lucida Console" panose="020B0609040504020204" pitchFamily="49" charset="0"/>
-              </a:rPr>
-              <a:t>names(</a:t>
-            </a:r>
-            <a:r>
-              <a:rPr kumimoji="0" lang="en-US" altLang="en-US" sz="1000" b="0" i="0" u="none" strike="noStrike" cap="none" normalizeH="0" baseline="0" dirty="0" err="1">
-                <a:ln>
-                  <a:noFill/>
-                </a:ln>
-                <a:solidFill>
-                  <a:srgbClr val="0000FF"/>
-                </a:solidFill>
-                <a:effectLst/>
-                <a:latin typeface="Lucida Console" panose="020B0609040504020204" pitchFamily="49" charset="0"/>
-              </a:rPr>
-              <a:t>attritionData</a:t>
-            </a:r>
-            <a:r>
-              <a:rPr kumimoji="0" lang="en-US" altLang="en-US" sz="1000" b="0" i="0" u="none" strike="noStrike" cap="none" normalizeH="0" baseline="0" dirty="0">
-                <a:ln>
-                  <a:noFill/>
-                </a:ln>
-                <a:solidFill>
-                  <a:srgbClr val="0000FF"/>
-                </a:solidFill>
-                <a:effectLst/>
-                <a:latin typeface="Lucida Console" panose="020B0609040504020204" pitchFamily="49" charset="0"/>
-              </a:rPr>
-              <a:t>) </a:t>
-            </a:r>
-          </a:p>
-          <a:p>
-            <a:pPr marR="0" lvl="0" algn="l" defTabSz="914400" rtl="0" eaLnBrk="0" fontAlgn="base" latinLnBrk="0" hangingPunct="0">
-              <a:lnSpc>
-                <a:spcPct val="100000"/>
-              </a:lnSpc>
-              <a:spcBef>
-                <a:spcPct val="0"/>
-              </a:spcBef>
-              <a:spcAft>
-                <a:spcPct val="0"/>
-              </a:spcAft>
-              <a:buClrTx/>
-              <a:buSzTx/>
-              <a:buFont typeface="Wingdings" panose="05000000000000000000" pitchFamily="2" charset="2"/>
-              <a:buChar char="Ø"/>
-              <a:tabLst/>
-            </a:pPr>
-            <a:r>
-              <a:rPr kumimoji="0" lang="en-US" altLang="en-US" sz="1000" b="0" i="0" u="none" strike="noStrike" cap="none" normalizeH="0" baseline="0" dirty="0">
-                <a:ln>
-                  <a:noFill/>
-                </a:ln>
-                <a:solidFill>
-                  <a:srgbClr val="000000"/>
-                </a:solidFill>
-                <a:effectLst/>
-                <a:latin typeface="Lucida Console" panose="020B0609040504020204" pitchFamily="49" charset="0"/>
-              </a:rPr>
-              <a:t>[1] "Age" "Attrition" "</a:t>
-            </a:r>
-            <a:r>
-              <a:rPr kumimoji="0" lang="en-US" altLang="en-US" sz="1000" b="0" i="0" u="none" strike="noStrike" cap="none" normalizeH="0" baseline="0" dirty="0" err="1">
-                <a:ln>
-                  <a:noFill/>
-                </a:ln>
-                <a:solidFill>
-                  <a:srgbClr val="000000"/>
-                </a:solidFill>
-                <a:effectLst/>
-                <a:latin typeface="Lucida Console" panose="020B0609040504020204" pitchFamily="49" charset="0"/>
-              </a:rPr>
-              <a:t>BusinessTravel</a:t>
-            </a:r>
-            <a:r>
-              <a:rPr kumimoji="0" lang="en-US" altLang="en-US" sz="1000" b="0" i="0" u="none" strike="noStrike" cap="none" normalizeH="0" baseline="0" dirty="0">
-                <a:ln>
-                  <a:noFill/>
-                </a:ln>
-                <a:solidFill>
-                  <a:srgbClr val="000000"/>
-                </a:solidFill>
-                <a:effectLst/>
-                <a:latin typeface="Lucida Console" panose="020B0609040504020204" pitchFamily="49" charset="0"/>
-              </a:rPr>
-              <a:t>" "</a:t>
-            </a:r>
-            <a:r>
-              <a:rPr kumimoji="0" lang="en-US" altLang="en-US" sz="1000" b="0" i="0" u="none" strike="noStrike" cap="none" normalizeH="0" baseline="0" dirty="0" err="1">
-                <a:ln>
-                  <a:noFill/>
-                </a:ln>
-                <a:solidFill>
-                  <a:srgbClr val="000000"/>
-                </a:solidFill>
-                <a:effectLst/>
-                <a:latin typeface="Lucida Console" panose="020B0609040504020204" pitchFamily="49" charset="0"/>
-              </a:rPr>
-              <a:t>DailyRate</a:t>
-            </a:r>
-            <a:r>
-              <a:rPr kumimoji="0" lang="en-US" altLang="en-US" sz="1000" b="0" i="0" u="none" strike="noStrike" cap="none" normalizeH="0" baseline="0" dirty="0">
-                <a:ln>
-                  <a:noFill/>
-                </a:ln>
-                <a:solidFill>
-                  <a:srgbClr val="000000"/>
-                </a:solidFill>
-                <a:effectLst/>
-                <a:latin typeface="Lucida Console" panose="020B0609040504020204" pitchFamily="49" charset="0"/>
-              </a:rPr>
-              <a:t>" "Department" </a:t>
-            </a:r>
-          </a:p>
-          <a:p>
-            <a:pPr marR="0" lvl="0" algn="l" defTabSz="914400" rtl="0" eaLnBrk="0" fontAlgn="base" latinLnBrk="0" hangingPunct="0">
-              <a:lnSpc>
-                <a:spcPct val="100000"/>
-              </a:lnSpc>
-              <a:spcBef>
-                <a:spcPct val="0"/>
-              </a:spcBef>
-              <a:spcAft>
-                <a:spcPct val="0"/>
-              </a:spcAft>
-              <a:buClrTx/>
-              <a:buSzTx/>
-              <a:buFont typeface="Wingdings" panose="05000000000000000000" pitchFamily="2" charset="2"/>
-              <a:buChar char="Ø"/>
-              <a:tabLst/>
-            </a:pPr>
-            <a:r>
-              <a:rPr kumimoji="0" lang="en-US" altLang="en-US" sz="1000" b="0" i="0" u="none" strike="noStrike" cap="none" normalizeH="0" baseline="0" dirty="0">
-                <a:ln>
-                  <a:noFill/>
-                </a:ln>
-                <a:solidFill>
-                  <a:srgbClr val="000000"/>
-                </a:solidFill>
-                <a:effectLst/>
-                <a:latin typeface="Lucida Console" panose="020B0609040504020204" pitchFamily="49" charset="0"/>
-              </a:rPr>
-              <a:t>[6] "</a:t>
-            </a:r>
-            <a:r>
-              <a:rPr kumimoji="0" lang="en-US" altLang="en-US" sz="1000" b="0" i="0" u="none" strike="noStrike" cap="none" normalizeH="0" baseline="0" dirty="0" err="1">
-                <a:ln>
-                  <a:noFill/>
-                </a:ln>
-                <a:solidFill>
-                  <a:srgbClr val="000000"/>
-                </a:solidFill>
-                <a:effectLst/>
-                <a:latin typeface="Lucida Console" panose="020B0609040504020204" pitchFamily="49" charset="0"/>
-              </a:rPr>
-              <a:t>DistanceFromHome</a:t>
-            </a:r>
-            <a:r>
-              <a:rPr kumimoji="0" lang="en-US" altLang="en-US" sz="1000" b="0" i="0" u="none" strike="noStrike" cap="none" normalizeH="0" baseline="0" dirty="0">
-                <a:ln>
-                  <a:noFill/>
-                </a:ln>
-                <a:solidFill>
-                  <a:srgbClr val="000000"/>
-                </a:solidFill>
-                <a:effectLst/>
-                <a:latin typeface="Lucida Console" panose="020B0609040504020204" pitchFamily="49" charset="0"/>
-              </a:rPr>
-              <a:t>" "Education" "</a:t>
-            </a:r>
-            <a:r>
-              <a:rPr kumimoji="0" lang="en-US" altLang="en-US" sz="1000" b="0" i="0" u="none" strike="noStrike" cap="none" normalizeH="0" baseline="0" dirty="0" err="1">
-                <a:ln>
-                  <a:noFill/>
-                </a:ln>
-                <a:solidFill>
-                  <a:srgbClr val="000000"/>
-                </a:solidFill>
-                <a:effectLst/>
-                <a:latin typeface="Lucida Console" panose="020B0609040504020204" pitchFamily="49" charset="0"/>
-              </a:rPr>
-              <a:t>EducationField</a:t>
-            </a:r>
-            <a:r>
-              <a:rPr kumimoji="0" lang="en-US" altLang="en-US" sz="1000" b="0" i="0" u="none" strike="noStrike" cap="none" normalizeH="0" baseline="0" dirty="0">
-                <a:ln>
-                  <a:noFill/>
-                </a:ln>
-                <a:solidFill>
-                  <a:srgbClr val="000000"/>
-                </a:solidFill>
-                <a:effectLst/>
-                <a:latin typeface="Lucida Console" panose="020B0609040504020204" pitchFamily="49" charset="0"/>
-              </a:rPr>
-              <a:t>" "</a:t>
-            </a:r>
-            <a:r>
-              <a:rPr kumimoji="0" lang="en-US" altLang="en-US" sz="1000" b="0" i="0" u="none" strike="noStrike" cap="none" normalizeH="0" baseline="0" dirty="0" err="1">
-                <a:ln>
-                  <a:noFill/>
-                </a:ln>
-                <a:solidFill>
-                  <a:srgbClr val="000000"/>
-                </a:solidFill>
-                <a:effectLst/>
-                <a:latin typeface="Lucida Console" panose="020B0609040504020204" pitchFamily="49" charset="0"/>
-              </a:rPr>
-              <a:t>EmployeeCount</a:t>
-            </a:r>
-            <a:r>
-              <a:rPr kumimoji="0" lang="en-US" altLang="en-US" sz="1000" b="0" i="0" u="none" strike="noStrike" cap="none" normalizeH="0" baseline="0" dirty="0">
-                <a:ln>
-                  <a:noFill/>
-                </a:ln>
-                <a:solidFill>
-                  <a:srgbClr val="000000"/>
-                </a:solidFill>
-                <a:effectLst/>
-                <a:latin typeface="Lucida Console" panose="020B0609040504020204" pitchFamily="49" charset="0"/>
-              </a:rPr>
-              <a:t>" "</a:t>
-            </a:r>
-            <a:r>
-              <a:rPr kumimoji="0" lang="en-US" altLang="en-US" sz="1000" b="0" i="0" u="none" strike="noStrike" cap="none" normalizeH="0" baseline="0" dirty="0" err="1">
-                <a:ln>
-                  <a:noFill/>
-                </a:ln>
-                <a:solidFill>
-                  <a:srgbClr val="000000"/>
-                </a:solidFill>
-                <a:effectLst/>
-                <a:latin typeface="Lucida Console" panose="020B0609040504020204" pitchFamily="49" charset="0"/>
-              </a:rPr>
-              <a:t>EmployeeNumber</a:t>
-            </a:r>
-            <a:r>
-              <a:rPr kumimoji="0" lang="en-US" altLang="en-US" sz="1000" b="0" i="0" u="none" strike="noStrike" cap="none" normalizeH="0" baseline="0" dirty="0">
-                <a:ln>
-                  <a:noFill/>
-                </a:ln>
-                <a:solidFill>
-                  <a:srgbClr val="000000"/>
-                </a:solidFill>
-                <a:effectLst/>
-                <a:latin typeface="Lucida Console" panose="020B0609040504020204" pitchFamily="49" charset="0"/>
-              </a:rPr>
-              <a:t>" </a:t>
-            </a:r>
-          </a:p>
-          <a:p>
-            <a:pPr marR="0" lvl="0" algn="l" defTabSz="914400" rtl="0" eaLnBrk="0" fontAlgn="base" latinLnBrk="0" hangingPunct="0">
-              <a:lnSpc>
-                <a:spcPct val="100000"/>
-              </a:lnSpc>
-              <a:spcBef>
-                <a:spcPct val="0"/>
-              </a:spcBef>
-              <a:spcAft>
-                <a:spcPct val="0"/>
-              </a:spcAft>
-              <a:buClrTx/>
-              <a:buSzTx/>
-              <a:buFont typeface="Wingdings" panose="05000000000000000000" pitchFamily="2" charset="2"/>
-              <a:buChar char="Ø"/>
-              <a:tabLst/>
-            </a:pPr>
-            <a:r>
-              <a:rPr kumimoji="0" lang="en-US" altLang="en-US" sz="1000" b="0" i="0" u="none" strike="noStrike" cap="none" normalizeH="0" baseline="0" dirty="0">
-                <a:ln>
-                  <a:noFill/>
-                </a:ln>
-                <a:solidFill>
-                  <a:srgbClr val="000000"/>
-                </a:solidFill>
-                <a:effectLst/>
-                <a:latin typeface="Lucida Console" panose="020B0609040504020204" pitchFamily="49" charset="0"/>
-              </a:rPr>
-              <a:t>[11] "</a:t>
-            </a:r>
-            <a:r>
-              <a:rPr kumimoji="0" lang="en-US" altLang="en-US" sz="1000" b="0" i="0" u="none" strike="noStrike" cap="none" normalizeH="0" baseline="0" dirty="0" err="1">
-                <a:ln>
-                  <a:noFill/>
-                </a:ln>
-                <a:solidFill>
-                  <a:srgbClr val="000000"/>
-                </a:solidFill>
-                <a:effectLst/>
-                <a:latin typeface="Lucida Console" panose="020B0609040504020204" pitchFamily="49" charset="0"/>
-              </a:rPr>
-              <a:t>EnvironmentSatisfaction</a:t>
-            </a:r>
-            <a:r>
-              <a:rPr kumimoji="0" lang="en-US" altLang="en-US" sz="1000" b="0" i="0" u="none" strike="noStrike" cap="none" normalizeH="0" baseline="0" dirty="0">
-                <a:ln>
-                  <a:noFill/>
-                </a:ln>
-                <a:solidFill>
-                  <a:srgbClr val="000000"/>
-                </a:solidFill>
-                <a:effectLst/>
-                <a:latin typeface="Lucida Console" panose="020B0609040504020204" pitchFamily="49" charset="0"/>
-              </a:rPr>
-              <a:t>" "Gender" "</a:t>
-            </a:r>
-            <a:r>
-              <a:rPr kumimoji="0" lang="en-US" altLang="en-US" sz="1000" b="0" i="0" u="none" strike="noStrike" cap="none" normalizeH="0" baseline="0" dirty="0" err="1">
-                <a:ln>
-                  <a:noFill/>
-                </a:ln>
-                <a:solidFill>
-                  <a:srgbClr val="000000"/>
-                </a:solidFill>
-                <a:effectLst/>
-                <a:latin typeface="Lucida Console" panose="020B0609040504020204" pitchFamily="49" charset="0"/>
-              </a:rPr>
-              <a:t>HourlyRate</a:t>
-            </a:r>
-            <a:r>
-              <a:rPr kumimoji="0" lang="en-US" altLang="en-US" sz="1000" b="0" i="0" u="none" strike="noStrike" cap="none" normalizeH="0" baseline="0" dirty="0">
-                <a:ln>
-                  <a:noFill/>
-                </a:ln>
-                <a:solidFill>
-                  <a:srgbClr val="000000"/>
-                </a:solidFill>
-                <a:effectLst/>
-                <a:latin typeface="Lucida Console" panose="020B0609040504020204" pitchFamily="49" charset="0"/>
-              </a:rPr>
-              <a:t>" "</a:t>
-            </a:r>
-            <a:r>
-              <a:rPr kumimoji="0" lang="en-US" altLang="en-US" sz="1000" b="0" i="0" u="none" strike="noStrike" cap="none" normalizeH="0" baseline="0" dirty="0" err="1">
-                <a:ln>
-                  <a:noFill/>
-                </a:ln>
-                <a:solidFill>
-                  <a:srgbClr val="000000"/>
-                </a:solidFill>
-                <a:effectLst/>
-                <a:latin typeface="Lucida Console" panose="020B0609040504020204" pitchFamily="49" charset="0"/>
-              </a:rPr>
-              <a:t>JobInvolvement</a:t>
-            </a:r>
-            <a:r>
-              <a:rPr kumimoji="0" lang="en-US" altLang="en-US" sz="1000" b="0" i="0" u="none" strike="noStrike" cap="none" normalizeH="0" baseline="0" dirty="0">
-                <a:ln>
-                  <a:noFill/>
-                </a:ln>
-                <a:solidFill>
-                  <a:srgbClr val="000000"/>
-                </a:solidFill>
-                <a:effectLst/>
-                <a:latin typeface="Lucida Console" panose="020B0609040504020204" pitchFamily="49" charset="0"/>
-              </a:rPr>
-              <a:t>" "</a:t>
-            </a:r>
-            <a:r>
-              <a:rPr kumimoji="0" lang="en-US" altLang="en-US" sz="1000" b="0" i="0" u="none" strike="noStrike" cap="none" normalizeH="0" baseline="0" dirty="0" err="1">
-                <a:ln>
-                  <a:noFill/>
-                </a:ln>
-                <a:solidFill>
-                  <a:srgbClr val="000000"/>
-                </a:solidFill>
-                <a:effectLst/>
-                <a:latin typeface="Lucida Console" panose="020B0609040504020204" pitchFamily="49" charset="0"/>
-              </a:rPr>
-              <a:t>JobLevel</a:t>
-            </a:r>
-            <a:r>
-              <a:rPr kumimoji="0" lang="en-US" altLang="en-US" sz="1000" b="0" i="0" u="none" strike="noStrike" cap="none" normalizeH="0" baseline="0" dirty="0">
-                <a:ln>
-                  <a:noFill/>
-                </a:ln>
-                <a:solidFill>
-                  <a:srgbClr val="000000"/>
-                </a:solidFill>
-                <a:effectLst/>
-                <a:latin typeface="Lucida Console" panose="020B0609040504020204" pitchFamily="49" charset="0"/>
-              </a:rPr>
-              <a:t>" </a:t>
-            </a:r>
-          </a:p>
-          <a:p>
-            <a:pPr marR="0" lvl="0" algn="l" defTabSz="914400" rtl="0" eaLnBrk="0" fontAlgn="base" latinLnBrk="0" hangingPunct="0">
-              <a:lnSpc>
-                <a:spcPct val="100000"/>
-              </a:lnSpc>
-              <a:spcBef>
-                <a:spcPct val="0"/>
-              </a:spcBef>
-              <a:spcAft>
-                <a:spcPct val="0"/>
-              </a:spcAft>
-              <a:buClrTx/>
-              <a:buSzTx/>
-              <a:buFont typeface="Wingdings" panose="05000000000000000000" pitchFamily="2" charset="2"/>
-              <a:buChar char="Ø"/>
-              <a:tabLst/>
-            </a:pPr>
-            <a:r>
-              <a:rPr kumimoji="0" lang="en-US" altLang="en-US" sz="1000" b="0" i="0" u="none" strike="noStrike" cap="none" normalizeH="0" baseline="0" dirty="0">
-                <a:ln>
-                  <a:noFill/>
-                </a:ln>
-                <a:solidFill>
-                  <a:srgbClr val="000000"/>
-                </a:solidFill>
-                <a:effectLst/>
-                <a:latin typeface="Lucida Console" panose="020B0609040504020204" pitchFamily="49" charset="0"/>
-              </a:rPr>
-              <a:t>[16] "</a:t>
-            </a:r>
-            <a:r>
-              <a:rPr kumimoji="0" lang="en-US" altLang="en-US" sz="1000" b="0" i="0" u="none" strike="noStrike" cap="none" normalizeH="0" baseline="0" dirty="0" err="1">
-                <a:ln>
-                  <a:noFill/>
-                </a:ln>
-                <a:solidFill>
-                  <a:srgbClr val="000000"/>
-                </a:solidFill>
-                <a:effectLst/>
-                <a:latin typeface="Lucida Console" panose="020B0609040504020204" pitchFamily="49" charset="0"/>
-              </a:rPr>
-              <a:t>JobRole</a:t>
-            </a:r>
-            <a:r>
-              <a:rPr kumimoji="0" lang="en-US" altLang="en-US" sz="1000" b="0" i="0" u="none" strike="noStrike" cap="none" normalizeH="0" baseline="0" dirty="0">
-                <a:ln>
-                  <a:noFill/>
-                </a:ln>
-                <a:solidFill>
-                  <a:srgbClr val="000000"/>
-                </a:solidFill>
-                <a:effectLst/>
-                <a:latin typeface="Lucida Console" panose="020B0609040504020204" pitchFamily="49" charset="0"/>
-              </a:rPr>
-              <a:t>" "</a:t>
-            </a:r>
-            <a:r>
-              <a:rPr kumimoji="0" lang="en-US" altLang="en-US" sz="1000" b="0" i="0" u="none" strike="noStrike" cap="none" normalizeH="0" baseline="0" dirty="0" err="1">
-                <a:ln>
-                  <a:noFill/>
-                </a:ln>
-                <a:solidFill>
-                  <a:srgbClr val="000000"/>
-                </a:solidFill>
-                <a:effectLst/>
-                <a:latin typeface="Lucida Console" panose="020B0609040504020204" pitchFamily="49" charset="0"/>
-              </a:rPr>
-              <a:t>JobSatisfaction</a:t>
-            </a:r>
-            <a:r>
-              <a:rPr kumimoji="0" lang="en-US" altLang="en-US" sz="1000" b="0" i="0" u="none" strike="noStrike" cap="none" normalizeH="0" baseline="0" dirty="0">
-                <a:ln>
-                  <a:noFill/>
-                </a:ln>
-                <a:solidFill>
-                  <a:srgbClr val="000000"/>
-                </a:solidFill>
-                <a:effectLst/>
-                <a:latin typeface="Lucida Console" panose="020B0609040504020204" pitchFamily="49" charset="0"/>
-              </a:rPr>
-              <a:t>" "</a:t>
-            </a:r>
-            <a:r>
-              <a:rPr kumimoji="0" lang="en-US" altLang="en-US" sz="1000" b="0" i="0" u="none" strike="noStrike" cap="none" normalizeH="0" baseline="0" dirty="0" err="1">
-                <a:ln>
-                  <a:noFill/>
-                </a:ln>
-                <a:solidFill>
-                  <a:srgbClr val="000000"/>
-                </a:solidFill>
-                <a:effectLst/>
-                <a:latin typeface="Lucida Console" panose="020B0609040504020204" pitchFamily="49" charset="0"/>
-              </a:rPr>
-              <a:t>MaritalStatus</a:t>
-            </a:r>
-            <a:r>
-              <a:rPr kumimoji="0" lang="en-US" altLang="en-US" sz="1000" b="0" i="0" u="none" strike="noStrike" cap="none" normalizeH="0" baseline="0" dirty="0">
-                <a:ln>
-                  <a:noFill/>
-                </a:ln>
-                <a:solidFill>
-                  <a:srgbClr val="000000"/>
-                </a:solidFill>
-                <a:effectLst/>
-                <a:latin typeface="Lucida Console" panose="020B0609040504020204" pitchFamily="49" charset="0"/>
-              </a:rPr>
-              <a:t>" "</a:t>
-            </a:r>
-            <a:r>
-              <a:rPr kumimoji="0" lang="en-US" altLang="en-US" sz="1000" b="0" i="0" u="none" strike="noStrike" cap="none" normalizeH="0" baseline="0" dirty="0" err="1">
-                <a:ln>
-                  <a:noFill/>
-                </a:ln>
-                <a:solidFill>
-                  <a:srgbClr val="000000"/>
-                </a:solidFill>
-                <a:effectLst/>
-                <a:latin typeface="Lucida Console" panose="020B0609040504020204" pitchFamily="49" charset="0"/>
-              </a:rPr>
-              <a:t>MonthlyIncome</a:t>
-            </a:r>
-            <a:r>
-              <a:rPr kumimoji="0" lang="en-US" altLang="en-US" sz="1000" b="0" i="0" u="none" strike="noStrike" cap="none" normalizeH="0" baseline="0" dirty="0">
-                <a:ln>
-                  <a:noFill/>
-                </a:ln>
-                <a:solidFill>
-                  <a:srgbClr val="000000"/>
-                </a:solidFill>
-                <a:effectLst/>
-                <a:latin typeface="Lucida Console" panose="020B0609040504020204" pitchFamily="49" charset="0"/>
-              </a:rPr>
-              <a:t>" "</a:t>
-            </a:r>
-            <a:r>
-              <a:rPr kumimoji="0" lang="en-US" altLang="en-US" sz="1000" b="0" i="0" u="none" strike="noStrike" cap="none" normalizeH="0" baseline="0" dirty="0" err="1">
-                <a:ln>
-                  <a:noFill/>
-                </a:ln>
-                <a:solidFill>
-                  <a:srgbClr val="000000"/>
-                </a:solidFill>
-                <a:effectLst/>
-                <a:latin typeface="Lucida Console" panose="020B0609040504020204" pitchFamily="49" charset="0"/>
-              </a:rPr>
-              <a:t>MonthlyRate</a:t>
-            </a:r>
-            <a:r>
-              <a:rPr kumimoji="0" lang="en-US" altLang="en-US" sz="1000" b="0" i="0" u="none" strike="noStrike" cap="none" normalizeH="0" baseline="0" dirty="0">
-                <a:ln>
-                  <a:noFill/>
-                </a:ln>
-                <a:solidFill>
-                  <a:srgbClr val="000000"/>
-                </a:solidFill>
-                <a:effectLst/>
-                <a:latin typeface="Lucida Console" panose="020B0609040504020204" pitchFamily="49" charset="0"/>
-              </a:rPr>
-              <a:t>" </a:t>
-            </a:r>
-          </a:p>
-          <a:p>
-            <a:pPr marR="0" lvl="0" algn="l" defTabSz="914400" rtl="0" eaLnBrk="0" fontAlgn="base" latinLnBrk="0" hangingPunct="0">
-              <a:lnSpc>
-                <a:spcPct val="100000"/>
-              </a:lnSpc>
-              <a:spcBef>
-                <a:spcPct val="0"/>
-              </a:spcBef>
-              <a:spcAft>
-                <a:spcPct val="0"/>
-              </a:spcAft>
-              <a:buClrTx/>
-              <a:buSzTx/>
-              <a:buFont typeface="Wingdings" panose="05000000000000000000" pitchFamily="2" charset="2"/>
-              <a:buChar char="Ø"/>
-              <a:tabLst/>
-            </a:pPr>
-            <a:r>
-              <a:rPr kumimoji="0" lang="en-US" altLang="en-US" sz="1000" b="0" i="0" u="none" strike="noStrike" cap="none" normalizeH="0" baseline="0" dirty="0">
-                <a:ln>
-                  <a:noFill/>
-                </a:ln>
-                <a:solidFill>
-                  <a:srgbClr val="000000"/>
-                </a:solidFill>
-                <a:effectLst/>
-                <a:latin typeface="Lucida Console" panose="020B0609040504020204" pitchFamily="49" charset="0"/>
-              </a:rPr>
-              <a:t>[21] "</a:t>
-            </a:r>
-            <a:r>
-              <a:rPr kumimoji="0" lang="en-US" altLang="en-US" sz="1000" b="0" i="0" u="none" strike="noStrike" cap="none" normalizeH="0" baseline="0" dirty="0" err="1">
-                <a:ln>
-                  <a:noFill/>
-                </a:ln>
-                <a:solidFill>
-                  <a:srgbClr val="000000"/>
-                </a:solidFill>
-                <a:effectLst/>
-                <a:latin typeface="Lucida Console" panose="020B0609040504020204" pitchFamily="49" charset="0"/>
-              </a:rPr>
-              <a:t>NumCompaniesWorked</a:t>
-            </a:r>
-            <a:r>
-              <a:rPr kumimoji="0" lang="en-US" altLang="en-US" sz="1000" b="0" i="0" u="none" strike="noStrike" cap="none" normalizeH="0" baseline="0" dirty="0">
-                <a:ln>
-                  <a:noFill/>
-                </a:ln>
-                <a:solidFill>
-                  <a:srgbClr val="000000"/>
-                </a:solidFill>
-                <a:effectLst/>
-                <a:latin typeface="Lucida Console" panose="020B0609040504020204" pitchFamily="49" charset="0"/>
-              </a:rPr>
-              <a:t>" "Over18" "</a:t>
-            </a:r>
-            <a:r>
-              <a:rPr kumimoji="0" lang="en-US" altLang="en-US" sz="1000" b="0" i="0" u="none" strike="noStrike" cap="none" normalizeH="0" baseline="0" dirty="0" err="1">
-                <a:ln>
-                  <a:noFill/>
-                </a:ln>
-                <a:solidFill>
-                  <a:srgbClr val="000000"/>
-                </a:solidFill>
-                <a:effectLst/>
-                <a:latin typeface="Lucida Console" panose="020B0609040504020204" pitchFamily="49" charset="0"/>
-              </a:rPr>
-              <a:t>OverTime</a:t>
-            </a:r>
-            <a:r>
-              <a:rPr kumimoji="0" lang="en-US" altLang="en-US" sz="1000" b="0" i="0" u="none" strike="noStrike" cap="none" normalizeH="0" baseline="0" dirty="0">
-                <a:ln>
-                  <a:noFill/>
-                </a:ln>
-                <a:solidFill>
-                  <a:srgbClr val="000000"/>
-                </a:solidFill>
-                <a:effectLst/>
-                <a:latin typeface="Lucida Console" panose="020B0609040504020204" pitchFamily="49" charset="0"/>
-              </a:rPr>
-              <a:t>" "</a:t>
-            </a:r>
-            <a:r>
-              <a:rPr kumimoji="0" lang="en-US" altLang="en-US" sz="1000" b="0" i="0" u="none" strike="noStrike" cap="none" normalizeH="0" baseline="0" dirty="0" err="1">
-                <a:ln>
-                  <a:noFill/>
-                </a:ln>
-                <a:solidFill>
-                  <a:srgbClr val="000000"/>
-                </a:solidFill>
-                <a:effectLst/>
-                <a:latin typeface="Lucida Console" panose="020B0609040504020204" pitchFamily="49" charset="0"/>
-              </a:rPr>
-              <a:t>PercentSalaryHike</a:t>
-            </a:r>
-            <a:r>
-              <a:rPr kumimoji="0" lang="en-US" altLang="en-US" sz="1000" b="0" i="0" u="none" strike="noStrike" cap="none" normalizeH="0" baseline="0" dirty="0">
-                <a:ln>
-                  <a:noFill/>
-                </a:ln>
-                <a:solidFill>
-                  <a:srgbClr val="000000"/>
-                </a:solidFill>
-                <a:effectLst/>
-                <a:latin typeface="Lucida Console" panose="020B0609040504020204" pitchFamily="49" charset="0"/>
-              </a:rPr>
-              <a:t>" "</a:t>
-            </a:r>
-            <a:r>
-              <a:rPr kumimoji="0" lang="en-US" altLang="en-US" sz="1000" b="0" i="0" u="none" strike="noStrike" cap="none" normalizeH="0" baseline="0" dirty="0" err="1">
-                <a:ln>
-                  <a:noFill/>
-                </a:ln>
-                <a:solidFill>
-                  <a:srgbClr val="000000"/>
-                </a:solidFill>
-                <a:effectLst/>
-                <a:latin typeface="Lucida Console" panose="020B0609040504020204" pitchFamily="49" charset="0"/>
-              </a:rPr>
-              <a:t>PerformanceRating</a:t>
-            </a:r>
-            <a:r>
-              <a:rPr kumimoji="0" lang="en-US" altLang="en-US" sz="1000" b="0" i="0" u="none" strike="noStrike" cap="none" normalizeH="0" baseline="0" dirty="0">
-                <a:ln>
-                  <a:noFill/>
-                </a:ln>
-                <a:solidFill>
-                  <a:srgbClr val="000000"/>
-                </a:solidFill>
-                <a:effectLst/>
-                <a:latin typeface="Lucida Console" panose="020B0609040504020204" pitchFamily="49" charset="0"/>
-              </a:rPr>
-              <a:t>" </a:t>
-            </a:r>
-          </a:p>
-          <a:p>
-            <a:pPr marR="0" lvl="0" algn="l" defTabSz="914400" rtl="0" eaLnBrk="0" fontAlgn="base" latinLnBrk="0" hangingPunct="0">
-              <a:lnSpc>
-                <a:spcPct val="100000"/>
-              </a:lnSpc>
-              <a:spcBef>
-                <a:spcPct val="0"/>
-              </a:spcBef>
-              <a:spcAft>
-                <a:spcPct val="0"/>
-              </a:spcAft>
-              <a:buClrTx/>
-              <a:buSzTx/>
-              <a:buFont typeface="Wingdings" panose="05000000000000000000" pitchFamily="2" charset="2"/>
-              <a:buChar char="Ø"/>
-              <a:tabLst/>
-            </a:pPr>
-            <a:r>
-              <a:rPr kumimoji="0" lang="en-US" altLang="en-US" sz="1000" b="0" i="0" u="none" strike="noStrike" cap="none" normalizeH="0" baseline="0" dirty="0">
-                <a:ln>
-                  <a:noFill/>
-                </a:ln>
-                <a:solidFill>
-                  <a:srgbClr val="000000"/>
-                </a:solidFill>
-                <a:effectLst/>
-                <a:latin typeface="Lucida Console" panose="020B0609040504020204" pitchFamily="49" charset="0"/>
-              </a:rPr>
-              <a:t>[26] "</a:t>
-            </a:r>
-            <a:r>
-              <a:rPr kumimoji="0" lang="en-US" altLang="en-US" sz="1000" b="0" i="0" u="none" strike="noStrike" cap="none" normalizeH="0" baseline="0" dirty="0" err="1">
-                <a:ln>
-                  <a:noFill/>
-                </a:ln>
-                <a:solidFill>
-                  <a:srgbClr val="000000"/>
-                </a:solidFill>
-                <a:effectLst/>
-                <a:latin typeface="Lucida Console" panose="020B0609040504020204" pitchFamily="49" charset="0"/>
-              </a:rPr>
-              <a:t>RelationshipSatisfaction</a:t>
-            </a:r>
-            <a:r>
-              <a:rPr kumimoji="0" lang="en-US" altLang="en-US" sz="1000" b="0" i="0" u="none" strike="noStrike" cap="none" normalizeH="0" baseline="0" dirty="0">
-                <a:ln>
-                  <a:noFill/>
-                </a:ln>
-                <a:solidFill>
-                  <a:srgbClr val="000000"/>
-                </a:solidFill>
-                <a:effectLst/>
-                <a:latin typeface="Lucida Console" panose="020B0609040504020204" pitchFamily="49" charset="0"/>
-              </a:rPr>
-              <a:t>" "</a:t>
-            </a:r>
-            <a:r>
-              <a:rPr kumimoji="0" lang="en-US" altLang="en-US" sz="1000" b="0" i="0" u="none" strike="noStrike" cap="none" normalizeH="0" baseline="0" dirty="0" err="1">
-                <a:ln>
-                  <a:noFill/>
-                </a:ln>
-                <a:solidFill>
-                  <a:srgbClr val="000000"/>
-                </a:solidFill>
-                <a:effectLst/>
-                <a:latin typeface="Lucida Console" panose="020B0609040504020204" pitchFamily="49" charset="0"/>
-              </a:rPr>
-              <a:t>StandardHours</a:t>
-            </a:r>
-            <a:r>
-              <a:rPr kumimoji="0" lang="en-US" altLang="en-US" sz="1000" b="0" i="0" u="none" strike="noStrike" cap="none" normalizeH="0" baseline="0" dirty="0">
-                <a:ln>
-                  <a:noFill/>
-                </a:ln>
-                <a:solidFill>
-                  <a:srgbClr val="000000"/>
-                </a:solidFill>
-                <a:effectLst/>
-                <a:latin typeface="Lucida Console" panose="020B0609040504020204" pitchFamily="49" charset="0"/>
-              </a:rPr>
-              <a:t>" "</a:t>
-            </a:r>
-            <a:r>
-              <a:rPr kumimoji="0" lang="en-US" altLang="en-US" sz="1000" b="0" i="0" u="none" strike="noStrike" cap="none" normalizeH="0" baseline="0" dirty="0" err="1">
-                <a:ln>
-                  <a:noFill/>
-                </a:ln>
-                <a:solidFill>
-                  <a:srgbClr val="000000"/>
-                </a:solidFill>
-                <a:effectLst/>
-                <a:latin typeface="Lucida Console" panose="020B0609040504020204" pitchFamily="49" charset="0"/>
-              </a:rPr>
-              <a:t>StockOptionLevel</a:t>
-            </a:r>
-            <a:r>
-              <a:rPr kumimoji="0" lang="en-US" altLang="en-US" sz="1000" b="0" i="0" u="none" strike="noStrike" cap="none" normalizeH="0" baseline="0" dirty="0">
-                <a:ln>
-                  <a:noFill/>
-                </a:ln>
-                <a:solidFill>
-                  <a:srgbClr val="000000"/>
-                </a:solidFill>
-                <a:effectLst/>
-                <a:latin typeface="Lucida Console" panose="020B0609040504020204" pitchFamily="49" charset="0"/>
-              </a:rPr>
-              <a:t>" "</a:t>
-            </a:r>
-            <a:r>
-              <a:rPr kumimoji="0" lang="en-US" altLang="en-US" sz="1000" b="0" i="0" u="none" strike="noStrike" cap="none" normalizeH="0" baseline="0" dirty="0" err="1">
-                <a:ln>
-                  <a:noFill/>
-                </a:ln>
-                <a:solidFill>
-                  <a:srgbClr val="000000"/>
-                </a:solidFill>
-                <a:effectLst/>
-                <a:latin typeface="Lucida Console" panose="020B0609040504020204" pitchFamily="49" charset="0"/>
-              </a:rPr>
-              <a:t>TotalWorkingYears</a:t>
-            </a:r>
-            <a:r>
-              <a:rPr kumimoji="0" lang="en-US" altLang="en-US" sz="1000" b="0" i="0" u="none" strike="noStrike" cap="none" normalizeH="0" baseline="0" dirty="0">
-                <a:ln>
-                  <a:noFill/>
-                </a:ln>
-                <a:solidFill>
-                  <a:srgbClr val="000000"/>
-                </a:solidFill>
-                <a:effectLst/>
-                <a:latin typeface="Lucida Console" panose="020B0609040504020204" pitchFamily="49" charset="0"/>
-              </a:rPr>
-              <a:t>" "</a:t>
-            </a:r>
-            <a:r>
-              <a:rPr kumimoji="0" lang="en-US" altLang="en-US" sz="1000" b="0" i="0" u="none" strike="noStrike" cap="none" normalizeH="0" baseline="0" dirty="0" err="1">
-                <a:ln>
-                  <a:noFill/>
-                </a:ln>
-                <a:solidFill>
-                  <a:srgbClr val="000000"/>
-                </a:solidFill>
-                <a:effectLst/>
-                <a:latin typeface="Lucida Console" panose="020B0609040504020204" pitchFamily="49" charset="0"/>
-              </a:rPr>
-              <a:t>TrainingTimesLastYear</a:t>
-            </a:r>
-            <a:r>
-              <a:rPr kumimoji="0" lang="en-US" altLang="en-US" sz="1000" b="0" i="0" u="none" strike="noStrike" cap="none" normalizeH="0" baseline="0" dirty="0">
-                <a:ln>
-                  <a:noFill/>
-                </a:ln>
-                <a:solidFill>
-                  <a:srgbClr val="000000"/>
-                </a:solidFill>
-                <a:effectLst/>
-                <a:latin typeface="Lucida Console" panose="020B0609040504020204" pitchFamily="49" charset="0"/>
-              </a:rPr>
-              <a:t>" </a:t>
-            </a:r>
-          </a:p>
-          <a:p>
-            <a:pPr marR="0" lvl="0" algn="l" defTabSz="914400" rtl="0" eaLnBrk="0" fontAlgn="base" latinLnBrk="0" hangingPunct="0">
-              <a:lnSpc>
-                <a:spcPct val="100000"/>
-              </a:lnSpc>
-              <a:spcBef>
-                <a:spcPct val="0"/>
-              </a:spcBef>
-              <a:spcAft>
-                <a:spcPct val="0"/>
-              </a:spcAft>
-              <a:buClrTx/>
-              <a:buSzTx/>
-              <a:buFont typeface="Wingdings" panose="05000000000000000000" pitchFamily="2" charset="2"/>
-              <a:buChar char="Ø"/>
-              <a:tabLst/>
-            </a:pPr>
-            <a:r>
-              <a:rPr kumimoji="0" lang="en-US" altLang="en-US" sz="1000" b="0" i="0" u="none" strike="noStrike" cap="none" normalizeH="0" baseline="0" dirty="0">
-                <a:ln>
-                  <a:noFill/>
-                </a:ln>
-                <a:solidFill>
-                  <a:srgbClr val="000000"/>
-                </a:solidFill>
-                <a:effectLst/>
-                <a:latin typeface="Lucida Console" panose="020B0609040504020204" pitchFamily="49" charset="0"/>
-              </a:rPr>
-              <a:t>[31] "</a:t>
-            </a:r>
-            <a:r>
-              <a:rPr kumimoji="0" lang="en-US" altLang="en-US" sz="1000" b="0" i="0" u="none" strike="noStrike" cap="none" normalizeH="0" baseline="0" dirty="0" err="1">
-                <a:ln>
-                  <a:noFill/>
-                </a:ln>
-                <a:solidFill>
-                  <a:srgbClr val="000000"/>
-                </a:solidFill>
-                <a:effectLst/>
-                <a:latin typeface="Lucida Console" panose="020B0609040504020204" pitchFamily="49" charset="0"/>
-              </a:rPr>
-              <a:t>WorkLifeBalance</a:t>
-            </a:r>
-            <a:r>
-              <a:rPr kumimoji="0" lang="en-US" altLang="en-US" sz="1000" b="0" i="0" u="none" strike="noStrike" cap="none" normalizeH="0" baseline="0" dirty="0">
-                <a:ln>
-                  <a:noFill/>
-                </a:ln>
-                <a:solidFill>
-                  <a:srgbClr val="000000"/>
-                </a:solidFill>
-                <a:effectLst/>
-                <a:latin typeface="Lucida Console" panose="020B0609040504020204" pitchFamily="49" charset="0"/>
-              </a:rPr>
-              <a:t>" "</a:t>
-            </a:r>
-            <a:r>
-              <a:rPr kumimoji="0" lang="en-US" altLang="en-US" sz="1000" b="0" i="0" u="none" strike="noStrike" cap="none" normalizeH="0" baseline="0" dirty="0" err="1">
-                <a:ln>
-                  <a:noFill/>
-                </a:ln>
-                <a:solidFill>
-                  <a:srgbClr val="000000"/>
-                </a:solidFill>
-                <a:effectLst/>
-                <a:latin typeface="Lucida Console" panose="020B0609040504020204" pitchFamily="49" charset="0"/>
-              </a:rPr>
-              <a:t>YearsAtCompany</a:t>
-            </a:r>
-            <a:r>
-              <a:rPr kumimoji="0" lang="en-US" altLang="en-US" sz="1000" b="0" i="0" u="none" strike="noStrike" cap="none" normalizeH="0" baseline="0" dirty="0">
-                <a:ln>
-                  <a:noFill/>
-                </a:ln>
-                <a:solidFill>
-                  <a:srgbClr val="000000"/>
-                </a:solidFill>
-                <a:effectLst/>
-                <a:latin typeface="Lucida Console" panose="020B0609040504020204" pitchFamily="49" charset="0"/>
-              </a:rPr>
-              <a:t>" "</a:t>
-            </a:r>
-            <a:r>
-              <a:rPr kumimoji="0" lang="en-US" altLang="en-US" sz="1000" b="0" i="0" u="none" strike="noStrike" cap="none" normalizeH="0" baseline="0" dirty="0" err="1">
-                <a:ln>
-                  <a:noFill/>
-                </a:ln>
-                <a:solidFill>
-                  <a:srgbClr val="000000"/>
-                </a:solidFill>
-                <a:effectLst/>
-                <a:latin typeface="Lucida Console" panose="020B0609040504020204" pitchFamily="49" charset="0"/>
-              </a:rPr>
-              <a:t>YearsInCurrentRole</a:t>
-            </a:r>
-            <a:r>
-              <a:rPr kumimoji="0" lang="en-US" altLang="en-US" sz="1000" b="0" i="0" u="none" strike="noStrike" cap="none" normalizeH="0" baseline="0" dirty="0">
-                <a:ln>
-                  <a:noFill/>
-                </a:ln>
-                <a:solidFill>
-                  <a:srgbClr val="000000"/>
-                </a:solidFill>
-                <a:effectLst/>
-                <a:latin typeface="Lucida Console" panose="020B0609040504020204" pitchFamily="49" charset="0"/>
-              </a:rPr>
-              <a:t>" "</a:t>
-            </a:r>
-            <a:r>
-              <a:rPr kumimoji="0" lang="en-US" altLang="en-US" sz="1000" b="0" i="0" u="none" strike="noStrike" cap="none" normalizeH="0" baseline="0" dirty="0" err="1">
-                <a:ln>
-                  <a:noFill/>
-                </a:ln>
-                <a:solidFill>
-                  <a:srgbClr val="000000"/>
-                </a:solidFill>
-                <a:effectLst/>
-                <a:latin typeface="Lucida Console" panose="020B0609040504020204" pitchFamily="49" charset="0"/>
-              </a:rPr>
-              <a:t>YearsSinceLastPromotion</a:t>
-            </a:r>
-            <a:r>
-              <a:rPr kumimoji="0" lang="en-US" altLang="en-US" sz="1000" b="0" i="0" u="none" strike="noStrike" cap="none" normalizeH="0" baseline="0" dirty="0">
-                <a:ln>
-                  <a:noFill/>
-                </a:ln>
-                <a:solidFill>
-                  <a:srgbClr val="000000"/>
-                </a:solidFill>
-                <a:effectLst/>
-                <a:latin typeface="Lucida Console" panose="020B0609040504020204" pitchFamily="49" charset="0"/>
-              </a:rPr>
-              <a:t>" "</a:t>
-            </a:r>
-            <a:r>
-              <a:rPr kumimoji="0" lang="en-US" altLang="en-US" sz="1000" b="0" i="0" u="none" strike="noStrike" cap="none" normalizeH="0" baseline="0" dirty="0" err="1">
-                <a:ln>
-                  <a:noFill/>
-                </a:ln>
-                <a:solidFill>
-                  <a:srgbClr val="000000"/>
-                </a:solidFill>
-                <a:effectLst/>
-                <a:latin typeface="Lucida Console" panose="020B0609040504020204" pitchFamily="49" charset="0"/>
-              </a:rPr>
-              <a:t>YearsWithCurrManager</a:t>
-            </a:r>
-            <a:r>
-              <a:rPr kumimoji="0" lang="en-US" altLang="en-US" sz="1000" b="0" i="0" u="none" strike="noStrike" cap="none" normalizeH="0" baseline="0" dirty="0">
-                <a:ln>
-                  <a:noFill/>
-                </a:ln>
-                <a:solidFill>
-                  <a:srgbClr val="000000"/>
-                </a:solidFill>
-                <a:effectLst/>
-                <a:latin typeface="Lucida Console" panose="020B0609040504020204" pitchFamily="49" charset="0"/>
-              </a:rPr>
-              <a:t>" </a:t>
-            </a:r>
-            <a:endParaRPr kumimoji="0" lang="en-US" altLang="en-US" sz="1800" b="0" i="0" u="none" strike="noStrike" cap="none" normalizeH="0" baseline="0" dirty="0">
-              <a:ln>
-                <a:noFill/>
-              </a:ln>
-              <a:solidFill>
-                <a:schemeClr val="tx1"/>
-              </a:solidFill>
-              <a:effectLst/>
-              <a:latin typeface="Arial" panose="020B0604020202020204" pitchFamily="34" charset="0"/>
-            </a:endParaRPr>
+            <a:r>
+              <a:rPr lang="en-US" dirty="0"/>
+              <a:t>I suspect these are </a:t>
+            </a:r>
           </a:p>
         </p:txBody>
       </p:sp>
     </p:spTree>
     <p:extLst>
       <p:ext uri="{BB962C8B-B14F-4D97-AF65-F5344CB8AC3E}">
-        <p14:creationId xmlns:p14="http://schemas.microsoft.com/office/powerpoint/2010/main" val="2852773575"/>
+        <p14:creationId xmlns:p14="http://schemas.microsoft.com/office/powerpoint/2010/main" val="1021290166"/>
       </p:ext>
     </p:extLst>
   </p:cSld>
@@ -4917,7 +3544,187 @@
 </p:sld>
 </file>
 
-<file path=ppt/slides/slide3.xml><?xml version="1.0" encoding="utf-8"?>
+<file path=ppt/slides/slide11.xml><?xml version="1.0" encoding="utf-8"?>
+<p:sld xmlns:a="http://schemas.openxmlformats.org/drawingml/2006/main" xmlns:r="http://schemas.openxmlformats.org/officeDocument/2006/relationships" xmlns:p="http://schemas.openxmlformats.org/presentationml/2006/main">
+  <p:cSld>
+    <p:spTree>
+      <p:nvGrpSpPr>
+        <p:cNvPr id="1" name=""/>
+        <p:cNvGrpSpPr/>
+        <p:nvPr/>
+      </p:nvGrpSpPr>
+      <p:grpSpPr>
+        <a:xfrm>
+          <a:off x="0" y="0"/>
+          <a:ext cx="0" cy="0"/>
+          <a:chOff x="0" y="0"/>
+          <a:chExt cx="0" cy="0"/>
+        </a:xfrm>
+      </p:grpSpPr>
+      <p:pic>
+        <p:nvPicPr>
+          <p:cNvPr id="4" name="Picture 3">
+            <a:extLst>
+              <a:ext uri="{FF2B5EF4-FFF2-40B4-BE49-F238E27FC236}">
+                <a16:creationId xmlns:a16="http://schemas.microsoft.com/office/drawing/2014/main" id="{5CAD30AE-DF50-4242-AEF6-98EFF5823855}"/>
+              </a:ext>
+            </a:extLst>
+          </p:cNvPr>
+          <p:cNvPicPr>
+            <a:picLocks noChangeAspect="1"/>
+          </p:cNvPicPr>
+          <p:nvPr/>
+        </p:nvPicPr>
+        <p:blipFill>
+          <a:blip r:embed="rId2"/>
+          <a:stretch>
+            <a:fillRect/>
+          </a:stretch>
+        </p:blipFill>
+        <p:spPr>
+          <a:xfrm>
+            <a:off x="3054193" y="228435"/>
+            <a:ext cx="6083613" cy="6401129"/>
+          </a:xfrm>
+          <a:prstGeom prst="rect">
+            <a:avLst/>
+          </a:prstGeom>
+        </p:spPr>
+      </p:pic>
+    </p:spTree>
+    <p:extLst>
+      <p:ext uri="{BB962C8B-B14F-4D97-AF65-F5344CB8AC3E}">
+        <p14:creationId xmlns:p14="http://schemas.microsoft.com/office/powerpoint/2010/main" val="4098183219"/>
+      </p:ext>
+    </p:extLst>
+  </p:cSld>
+  <p:clrMapOvr>
+    <a:masterClrMapping/>
+  </p:clrMapOvr>
+</p:sld>
+</file>
+
+<file path=ppt/slides/slide12.xml><?xml version="1.0" encoding="utf-8"?>
+<p:sld xmlns:a="http://schemas.openxmlformats.org/drawingml/2006/main" xmlns:r="http://schemas.openxmlformats.org/officeDocument/2006/relationships" xmlns:p="http://schemas.openxmlformats.org/presentationml/2006/main">
+  <p:cSld>
+    <p:spTree>
+      <p:nvGrpSpPr>
+        <p:cNvPr id="1" name=""/>
+        <p:cNvGrpSpPr/>
+        <p:nvPr/>
+      </p:nvGrpSpPr>
+      <p:grpSpPr>
+        <a:xfrm>
+          <a:off x="0" y="0"/>
+          <a:ext cx="0" cy="0"/>
+          <a:chOff x="0" y="0"/>
+          <a:chExt cx="0" cy="0"/>
+        </a:xfrm>
+      </p:grpSpPr>
+      <p:pic>
+        <p:nvPicPr>
+          <p:cNvPr id="4" name="Picture 3">
+            <a:extLst>
+              <a:ext uri="{FF2B5EF4-FFF2-40B4-BE49-F238E27FC236}">
+                <a16:creationId xmlns:a16="http://schemas.microsoft.com/office/drawing/2014/main" id="{BAB2CD9A-BAD6-4B41-8A4D-237F3661CA4E}"/>
+              </a:ext>
+            </a:extLst>
+          </p:cNvPr>
+          <p:cNvPicPr>
+            <a:picLocks noChangeAspect="1"/>
+          </p:cNvPicPr>
+          <p:nvPr/>
+        </p:nvPicPr>
+        <p:blipFill>
+          <a:blip r:embed="rId2"/>
+          <a:stretch>
+            <a:fillRect/>
+          </a:stretch>
+        </p:blipFill>
+        <p:spPr>
+          <a:xfrm>
+            <a:off x="3054193" y="228435"/>
+            <a:ext cx="6083613" cy="6401129"/>
+          </a:xfrm>
+          <a:prstGeom prst="rect">
+            <a:avLst/>
+          </a:prstGeom>
+        </p:spPr>
+      </p:pic>
+    </p:spTree>
+    <p:extLst>
+      <p:ext uri="{BB962C8B-B14F-4D97-AF65-F5344CB8AC3E}">
+        <p14:creationId xmlns:p14="http://schemas.microsoft.com/office/powerpoint/2010/main" val="3761961582"/>
+      </p:ext>
+    </p:extLst>
+  </p:cSld>
+  <p:clrMapOvr>
+    <a:masterClrMapping/>
+  </p:clrMapOvr>
+</p:sld>
+</file>
+
+<file path=ppt/slides/slide13.xml><?xml version="1.0" encoding="utf-8"?>
+<p:sld xmlns:a="http://schemas.openxmlformats.org/drawingml/2006/main" xmlns:r="http://schemas.openxmlformats.org/officeDocument/2006/relationships" xmlns:p="http://schemas.openxmlformats.org/presentationml/2006/main">
+  <p:cSld>
+    <p:spTree>
+      <p:nvGrpSpPr>
+        <p:cNvPr id="1" name=""/>
+        <p:cNvGrpSpPr/>
+        <p:nvPr/>
+      </p:nvGrpSpPr>
+      <p:grpSpPr>
+        <a:xfrm>
+          <a:off x="0" y="0"/>
+          <a:ext cx="0" cy="0"/>
+          <a:chOff x="0" y="0"/>
+          <a:chExt cx="0" cy="0"/>
+        </a:xfrm>
+      </p:grpSpPr>
+      <p:pic>
+        <p:nvPicPr>
+          <p:cNvPr id="4" name="Picture 3">
+            <a:extLst>
+              <a:ext uri="{FF2B5EF4-FFF2-40B4-BE49-F238E27FC236}">
+                <a16:creationId xmlns:a16="http://schemas.microsoft.com/office/drawing/2014/main" id="{F12AEFAC-8EDA-4E29-8AB9-5255FDD6E52C}"/>
+              </a:ext>
+            </a:extLst>
+          </p:cNvPr>
+          <p:cNvPicPr>
+            <a:picLocks noChangeAspect="1"/>
+          </p:cNvPicPr>
+          <p:nvPr/>
+        </p:nvPicPr>
+        <p:blipFill>
+          <a:blip r:embed="rId2"/>
+          <a:stretch>
+            <a:fillRect/>
+          </a:stretch>
+        </p:blipFill>
+        <p:spPr>
+          <a:xfrm>
+            <a:off x="1561867" y="504674"/>
+            <a:ext cx="9068266" cy="5848651"/>
+          </a:xfrm>
+          <a:prstGeom prst="rect">
+            <a:avLst/>
+          </a:prstGeom>
+        </p:spPr>
+      </p:pic>
+    </p:spTree>
+    <p:extLst>
+      <p:ext uri="{BB962C8B-B14F-4D97-AF65-F5344CB8AC3E}">
+        <p14:creationId xmlns:p14="http://schemas.microsoft.com/office/powerpoint/2010/main" val="3442542927"/>
+      </p:ext>
+    </p:extLst>
+  </p:cSld>
+  <p:clrMapOvr>
+    <a:masterClrMapping/>
+  </p:clrMapOvr>
+</p:sld>
+</file>
+
+<file path=ppt/slides/slide14.xml><?xml version="1.0" encoding="utf-8"?>
 <p:sld xmlns:a="http://schemas.openxmlformats.org/drawingml/2006/main" xmlns:r="http://schemas.openxmlformats.org/officeDocument/2006/relationships" xmlns:p="http://schemas.openxmlformats.org/presentationml/2006/main">
   <p:cSld>
     <p:bg>
@@ -4972,68 +3779,6 @@
           </a:prstGeom>
         </p:spPr>
       </p:pic>
-      <p:sp>
-        <p:nvSpPr>
-          <p:cNvPr id="2" name="Rectangle 1">
-            <a:extLst>
-              <a:ext uri="{FF2B5EF4-FFF2-40B4-BE49-F238E27FC236}">
-                <a16:creationId xmlns:a16="http://schemas.microsoft.com/office/drawing/2014/main" id="{C85397DA-750E-40EA-8740-9AE38E4991EF}"/>
-              </a:ext>
-            </a:extLst>
-          </p:cNvPr>
-          <p:cNvSpPr/>
-          <p:nvPr/>
-        </p:nvSpPr>
-        <p:spPr>
-          <a:xfrm>
-            <a:off x="3048000" y="2551837"/>
-            <a:ext cx="6096000" cy="1754326"/>
-          </a:xfrm>
-          <a:prstGeom prst="rect">
-            <a:avLst/>
-          </a:prstGeom>
-        </p:spPr>
-        <p:txBody>
-          <a:bodyPr>
-            <a:spAutoFit/>
-          </a:bodyPr>
-          <a:lstStyle/>
-          <a:p>
-            <a:r>
-              <a:rPr lang="en-US" dirty="0"/>
-              <a:t>pairs(~Attrition+DailyRate+Age+DistanceFromHome+EnvironmentSatisfaction+JobSatisfaction+MonthlyIncome+MonthlyRate+</a:t>
-            </a:r>
-          </a:p>
-          <a:p>
-            <a:r>
-              <a:rPr lang="en-US" dirty="0"/>
-              <a:t>        </a:t>
-            </a:r>
-            <a:r>
-              <a:rPr lang="en-US" dirty="0" err="1"/>
-              <a:t>YearsSinceLastPromotion+PerformanceRating+JobInvolvement,data</a:t>
-            </a:r>
-            <a:r>
-              <a:rPr lang="en-US" dirty="0"/>
-              <a:t>=</a:t>
-            </a:r>
-            <a:r>
-              <a:rPr lang="en-US" dirty="0" err="1"/>
-              <a:t>attritionData</a:t>
-            </a:r>
-            <a:r>
-              <a:rPr lang="en-US" dirty="0"/>
-              <a:t>, </a:t>
-            </a:r>
-          </a:p>
-          <a:p>
-            <a:r>
-              <a:rPr lang="en-US" dirty="0"/>
-              <a:t>   main="Simple Scatterplot Matrix")</a:t>
-            </a:r>
-          </a:p>
-        </p:txBody>
-      </p:sp>
     </p:spTree>
     <p:extLst>
       <p:ext uri="{BB962C8B-B14F-4D97-AF65-F5344CB8AC3E}">
@@ -5047,7 +3792,7 @@
 </p:sld>
 </file>
 
-<file path=ppt/slides/slide4.xml><?xml version="1.0" encoding="utf-8"?>
+<file path=ppt/slides/slide15.xml><?xml version="1.0" encoding="utf-8"?>
 <p:sld xmlns:a="http://schemas.openxmlformats.org/drawingml/2006/main" xmlns:r="http://schemas.openxmlformats.org/officeDocument/2006/relationships" xmlns:p="http://schemas.openxmlformats.org/presentationml/2006/main">
   <p:cSld>
     <p:spTree>
@@ -5107,7 +3852,7 @@
 </p:sld>
 </file>
 
-<file path=ppt/slides/slide5.xml><?xml version="1.0" encoding="utf-8"?>
+<file path=ppt/slides/slide16.xml><?xml version="1.0" encoding="utf-8"?>
 <p:sld xmlns:a="http://schemas.openxmlformats.org/drawingml/2006/main" xmlns:r="http://schemas.openxmlformats.org/officeDocument/2006/relationships" xmlns:p="http://schemas.openxmlformats.org/presentationml/2006/main">
   <p:cSld>
     <p:spTree>
@@ -5167,7 +3912,7 @@
 </p:sld>
 </file>
 
-<file path=ppt/slides/slide6.xml><?xml version="1.0" encoding="utf-8"?>
+<file path=ppt/slides/slide17.xml><?xml version="1.0" encoding="utf-8"?>
 <p:sld xmlns:a="http://schemas.openxmlformats.org/drawingml/2006/main" xmlns:r="http://schemas.openxmlformats.org/officeDocument/2006/relationships" xmlns:p="http://schemas.openxmlformats.org/presentationml/2006/main">
   <p:cSld>
     <p:spTree>
@@ -5277,7 +4022,7 @@
 </p:sld>
 </file>
 
-<file path=ppt/slides/slide7.xml><?xml version="1.0" encoding="utf-8"?>
+<file path=ppt/slides/slide18.xml><?xml version="1.0" encoding="utf-8"?>
 <p:sld xmlns:a="http://schemas.openxmlformats.org/drawingml/2006/main" xmlns:r="http://schemas.openxmlformats.org/officeDocument/2006/relationships" xmlns:p="http://schemas.openxmlformats.org/presentationml/2006/main">
   <p:cSld>
     <p:spTree>
@@ -5461,7 +4206,7 @@
 </p:sld>
 </file>
 
-<file path=ppt/slides/slide8.xml><?xml version="1.0" encoding="utf-8"?>
+<file path=ppt/slides/slide19.xml><?xml version="1.0" encoding="utf-8"?>
 <p:sld xmlns:a="http://schemas.openxmlformats.org/drawingml/2006/main" xmlns:r="http://schemas.openxmlformats.org/officeDocument/2006/relationships" xmlns:p="http://schemas.openxmlformats.org/presentationml/2006/main">
   <p:cSld>
     <p:spTree>
@@ -5562,6 +4307,2133 @@
     <p:extLst>
       <p:ext uri="{BB962C8B-B14F-4D97-AF65-F5344CB8AC3E}">
         <p14:creationId xmlns:p14="http://schemas.microsoft.com/office/powerpoint/2010/main" val="2479916901"/>
+      </p:ext>
+    </p:extLst>
+  </p:cSld>
+  <p:clrMapOvr>
+    <a:masterClrMapping/>
+  </p:clrMapOvr>
+</p:sld>
+</file>
+
+<file path=ppt/slides/slide2.xml><?xml version="1.0" encoding="utf-8"?>
+<p:sld xmlns:a="http://schemas.openxmlformats.org/drawingml/2006/main" xmlns:r="http://schemas.openxmlformats.org/officeDocument/2006/relationships" xmlns:p="http://schemas.openxmlformats.org/presentationml/2006/main">
+  <p:cSld>
+    <p:spTree>
+      <p:nvGrpSpPr>
+        <p:cNvPr id="1" name=""/>
+        <p:cNvGrpSpPr/>
+        <p:nvPr/>
+      </p:nvGrpSpPr>
+      <p:grpSpPr>
+        <a:xfrm>
+          <a:off x="0" y="0"/>
+          <a:ext cx="0" cy="0"/>
+          <a:chOff x="0" y="0"/>
+          <a:chExt cx="0" cy="0"/>
+        </a:xfrm>
+      </p:grpSpPr>
+      <p:sp>
+        <p:nvSpPr>
+          <p:cNvPr id="2" name="Title 1">
+            <a:extLst>
+              <a:ext uri="{FF2B5EF4-FFF2-40B4-BE49-F238E27FC236}">
+                <a16:creationId xmlns:a16="http://schemas.microsoft.com/office/drawing/2014/main" id="{0588550F-DE99-4C13-BCBF-E3B09C06C526}"/>
+              </a:ext>
+            </a:extLst>
+          </p:cNvPr>
+          <p:cNvSpPr>
+            <a:spLocks noGrp="1"/>
+          </p:cNvSpPr>
+          <p:nvPr>
+            <p:ph type="title"/>
+          </p:nvPr>
+        </p:nvSpPr>
+        <p:spPr/>
+        <p:txBody>
+          <a:bodyPr/>
+          <a:lstStyle/>
+          <a:p>
+            <a:r>
+              <a:rPr lang="en-US" dirty="0"/>
+              <a:t>Describe Data</a:t>
+            </a:r>
+          </a:p>
+        </p:txBody>
+      </p:sp>
+      <p:sp>
+        <p:nvSpPr>
+          <p:cNvPr id="3" name="Content Placeholder 2">
+            <a:extLst>
+              <a:ext uri="{FF2B5EF4-FFF2-40B4-BE49-F238E27FC236}">
+                <a16:creationId xmlns:a16="http://schemas.microsoft.com/office/drawing/2014/main" id="{D33BB1BC-41BE-4F62-A599-7DD5A19150C5}"/>
+              </a:ext>
+            </a:extLst>
+          </p:cNvPr>
+          <p:cNvSpPr>
+            <a:spLocks noGrp="1"/>
+          </p:cNvSpPr>
+          <p:nvPr>
+            <p:ph idx="1"/>
+          </p:nvPr>
+        </p:nvSpPr>
+        <p:spPr/>
+        <p:txBody>
+          <a:bodyPr/>
+          <a:lstStyle/>
+          <a:p>
+            <a:endParaRPr lang="en-US"/>
+          </a:p>
+        </p:txBody>
+      </p:sp>
+    </p:spTree>
+    <p:extLst>
+      <p:ext uri="{BB962C8B-B14F-4D97-AF65-F5344CB8AC3E}">
+        <p14:creationId xmlns:p14="http://schemas.microsoft.com/office/powerpoint/2010/main" val="3800497767"/>
+      </p:ext>
+    </p:extLst>
+  </p:cSld>
+  <p:clrMapOvr>
+    <a:masterClrMapping/>
+  </p:clrMapOvr>
+</p:sld>
+</file>
+
+<file path=ppt/slides/slide3.xml><?xml version="1.0" encoding="utf-8"?>
+<p:sld xmlns:a="http://schemas.openxmlformats.org/drawingml/2006/main" xmlns:r="http://schemas.openxmlformats.org/officeDocument/2006/relationships" xmlns:p="http://schemas.openxmlformats.org/presentationml/2006/main">
+  <p:cSld>
+    <p:spTree>
+      <p:nvGrpSpPr>
+        <p:cNvPr id="1" name=""/>
+        <p:cNvGrpSpPr/>
+        <p:nvPr/>
+      </p:nvGrpSpPr>
+      <p:grpSpPr>
+        <a:xfrm>
+          <a:off x="0" y="0"/>
+          <a:ext cx="0" cy="0"/>
+          <a:chOff x="0" y="0"/>
+          <a:chExt cx="0" cy="0"/>
+        </a:xfrm>
+      </p:grpSpPr>
+      <p:sp>
+        <p:nvSpPr>
+          <p:cNvPr id="2" name="Title 1">
+            <a:extLst>
+              <a:ext uri="{FF2B5EF4-FFF2-40B4-BE49-F238E27FC236}">
+                <a16:creationId xmlns:a16="http://schemas.microsoft.com/office/drawing/2014/main" id="{B06C5B85-D07C-4B02-B2DC-7EC0DF9A459C}"/>
+              </a:ext>
+            </a:extLst>
+          </p:cNvPr>
+          <p:cNvSpPr>
+            <a:spLocks noGrp="1"/>
+          </p:cNvSpPr>
+          <p:nvPr>
+            <p:ph type="title"/>
+          </p:nvPr>
+        </p:nvSpPr>
+        <p:spPr/>
+        <p:txBody>
+          <a:bodyPr/>
+          <a:lstStyle/>
+          <a:p>
+            <a:r>
+              <a:rPr lang="en-US" dirty="0"/>
+              <a:t>Describe Objectives</a:t>
+            </a:r>
+          </a:p>
+        </p:txBody>
+      </p:sp>
+      <p:sp>
+        <p:nvSpPr>
+          <p:cNvPr id="3" name="Content Placeholder 2">
+            <a:extLst>
+              <a:ext uri="{FF2B5EF4-FFF2-40B4-BE49-F238E27FC236}">
+                <a16:creationId xmlns:a16="http://schemas.microsoft.com/office/drawing/2014/main" id="{26E9781E-B349-4C81-B64B-4C0CEE415123}"/>
+              </a:ext>
+            </a:extLst>
+          </p:cNvPr>
+          <p:cNvSpPr>
+            <a:spLocks noGrp="1"/>
+          </p:cNvSpPr>
+          <p:nvPr>
+            <p:ph idx="1"/>
+          </p:nvPr>
+        </p:nvSpPr>
+        <p:spPr/>
+        <p:txBody>
+          <a:bodyPr/>
+          <a:lstStyle/>
+          <a:p>
+            <a:endParaRPr lang="en-US"/>
+          </a:p>
+        </p:txBody>
+      </p:sp>
+    </p:spTree>
+    <p:extLst>
+      <p:ext uri="{BB962C8B-B14F-4D97-AF65-F5344CB8AC3E}">
+        <p14:creationId xmlns:p14="http://schemas.microsoft.com/office/powerpoint/2010/main" val="3466138596"/>
+      </p:ext>
+    </p:extLst>
+  </p:cSld>
+  <p:clrMapOvr>
+    <a:masterClrMapping/>
+  </p:clrMapOvr>
+</p:sld>
+</file>
+
+<file path=ppt/slides/slide4.xml><?xml version="1.0" encoding="utf-8"?>
+<p:sld xmlns:a="http://schemas.openxmlformats.org/drawingml/2006/main" xmlns:r="http://schemas.openxmlformats.org/officeDocument/2006/relationships" xmlns:p="http://schemas.openxmlformats.org/presentationml/2006/main">
+  <p:cSld>
+    <p:spTree>
+      <p:nvGrpSpPr>
+        <p:cNvPr id="1" name=""/>
+        <p:cNvGrpSpPr/>
+        <p:nvPr/>
+      </p:nvGrpSpPr>
+      <p:grpSpPr>
+        <a:xfrm>
+          <a:off x="0" y="0"/>
+          <a:ext cx="0" cy="0"/>
+          <a:chOff x="0" y="0"/>
+          <a:chExt cx="0" cy="0"/>
+        </a:xfrm>
+      </p:grpSpPr>
+      <p:sp>
+        <p:nvSpPr>
+          <p:cNvPr id="4" name="TextBox 3">
+            <a:extLst>
+              <a:ext uri="{FF2B5EF4-FFF2-40B4-BE49-F238E27FC236}">
+                <a16:creationId xmlns:a16="http://schemas.microsoft.com/office/drawing/2014/main" id="{DC4E2D60-2CF0-4F20-8AAF-A234BD6C85C5}"/>
+              </a:ext>
+            </a:extLst>
+          </p:cNvPr>
+          <p:cNvSpPr txBox="1"/>
+          <p:nvPr/>
+        </p:nvSpPr>
+        <p:spPr>
+          <a:xfrm>
+            <a:off x="730250" y="679450"/>
+            <a:ext cx="10896600" cy="646331"/>
+          </a:xfrm>
+          <a:prstGeom prst="rect">
+            <a:avLst/>
+          </a:prstGeom>
+          <a:noFill/>
+        </p:spPr>
+        <p:txBody>
+          <a:bodyPr wrap="square" rtlCol="0">
+            <a:spAutoFit/>
+          </a:bodyPr>
+          <a:lstStyle/>
+          <a:p>
+            <a:r>
+              <a:rPr lang="en-US" dirty="0"/>
+              <a:t>After much </a:t>
+            </a:r>
+            <a:r>
+              <a:rPr lang="en-US" dirty="0" err="1"/>
+              <a:t>explaratory</a:t>
+            </a:r>
+            <a:r>
+              <a:rPr lang="en-US" dirty="0"/>
+              <a:t> analysis, we’ve concluded that the top three attributes for discerning potential </a:t>
+            </a:r>
+            <a:r>
+              <a:rPr lang="en-US" dirty="0" err="1"/>
+              <a:t>exmployee</a:t>
+            </a:r>
+            <a:r>
+              <a:rPr lang="en-US" dirty="0"/>
+              <a:t> attrition are…</a:t>
+            </a:r>
+          </a:p>
+        </p:txBody>
+      </p:sp>
+      <p:sp>
+        <p:nvSpPr>
+          <p:cNvPr id="6" name="TextBox 5">
+            <a:extLst>
+              <a:ext uri="{FF2B5EF4-FFF2-40B4-BE49-F238E27FC236}">
+                <a16:creationId xmlns:a16="http://schemas.microsoft.com/office/drawing/2014/main" id="{9962BC75-AAFC-41B1-A95E-508B1775E584}"/>
+              </a:ext>
+            </a:extLst>
+          </p:cNvPr>
+          <p:cNvSpPr txBox="1"/>
+          <p:nvPr/>
+        </p:nvSpPr>
+        <p:spPr>
+          <a:xfrm>
+            <a:off x="647700" y="5537200"/>
+            <a:ext cx="10896600" cy="369332"/>
+          </a:xfrm>
+          <a:prstGeom prst="rect">
+            <a:avLst/>
+          </a:prstGeom>
+          <a:noFill/>
+        </p:spPr>
+        <p:txBody>
+          <a:bodyPr wrap="square" rtlCol="0">
+            <a:spAutoFit/>
+          </a:bodyPr>
+          <a:lstStyle/>
+          <a:p>
+            <a:r>
+              <a:rPr lang="en-US" dirty="0"/>
+              <a:t>There were many paths traveled that led us to this conclusion.  These are the paths we took…</a:t>
+            </a:r>
+          </a:p>
+        </p:txBody>
+      </p:sp>
+    </p:spTree>
+    <p:extLst>
+      <p:ext uri="{BB962C8B-B14F-4D97-AF65-F5344CB8AC3E}">
+        <p14:creationId xmlns:p14="http://schemas.microsoft.com/office/powerpoint/2010/main" val="3440744934"/>
+      </p:ext>
+    </p:extLst>
+  </p:cSld>
+  <p:clrMapOvr>
+    <a:masterClrMapping/>
+  </p:clrMapOvr>
+</p:sld>
+</file>
+
+<file path=ppt/slides/slide5.xml><?xml version="1.0" encoding="utf-8"?>
+<p:sld xmlns:a="http://schemas.openxmlformats.org/drawingml/2006/main" xmlns:r="http://schemas.openxmlformats.org/officeDocument/2006/relationships" xmlns:p="http://schemas.openxmlformats.org/presentationml/2006/main">
+  <p:cSld>
+    <p:spTree>
+      <p:nvGrpSpPr>
+        <p:cNvPr id="1" name=""/>
+        <p:cNvGrpSpPr/>
+        <p:nvPr/>
+      </p:nvGrpSpPr>
+      <p:grpSpPr>
+        <a:xfrm>
+          <a:off x="0" y="0"/>
+          <a:ext cx="0" cy="0"/>
+          <a:chOff x="0" y="0"/>
+          <a:chExt cx="0" cy="0"/>
+        </a:xfrm>
+      </p:grpSpPr>
+      <p:sp>
+        <p:nvSpPr>
+          <p:cNvPr id="2" name="Title 1">
+            <a:extLst>
+              <a:ext uri="{FF2B5EF4-FFF2-40B4-BE49-F238E27FC236}">
+                <a16:creationId xmlns:a16="http://schemas.microsoft.com/office/drawing/2014/main" id="{0091E0EF-61A9-43EA-8B81-EF72B6DA1AB2}"/>
+              </a:ext>
+            </a:extLst>
+          </p:cNvPr>
+          <p:cNvSpPr>
+            <a:spLocks noGrp="1"/>
+          </p:cNvSpPr>
+          <p:nvPr>
+            <p:ph type="title"/>
+          </p:nvPr>
+        </p:nvSpPr>
+        <p:spPr/>
+        <p:txBody>
+          <a:bodyPr/>
+          <a:lstStyle/>
+          <a:p>
+            <a:r>
+              <a:rPr lang="en-US" dirty="0"/>
+              <a:t>Path Title (* Figure a bunch of these type of slides to pass time and highlight insights)</a:t>
+            </a:r>
+          </a:p>
+        </p:txBody>
+      </p:sp>
+      <p:sp>
+        <p:nvSpPr>
+          <p:cNvPr id="3" name="Content Placeholder 2">
+            <a:extLst>
+              <a:ext uri="{FF2B5EF4-FFF2-40B4-BE49-F238E27FC236}">
+                <a16:creationId xmlns:a16="http://schemas.microsoft.com/office/drawing/2014/main" id="{D1FFD01A-B4E4-4435-9CBE-00A3FB334D07}"/>
+              </a:ext>
+            </a:extLst>
+          </p:cNvPr>
+          <p:cNvSpPr>
+            <a:spLocks noGrp="1"/>
+          </p:cNvSpPr>
+          <p:nvPr>
+            <p:ph idx="1"/>
+          </p:nvPr>
+        </p:nvSpPr>
+        <p:spPr/>
+        <p:txBody>
+          <a:bodyPr/>
+          <a:lstStyle/>
+          <a:p>
+            <a:r>
+              <a:rPr lang="en-US" dirty="0"/>
+              <a:t>Notion/Idea behind test or plot analysis</a:t>
+            </a:r>
+          </a:p>
+          <a:p>
+            <a:r>
+              <a:rPr lang="en-US" dirty="0"/>
+              <a:t>GRAPH/T-TEST proving/disproving point</a:t>
+            </a:r>
+          </a:p>
+          <a:p>
+            <a:r>
+              <a:rPr lang="en-US" dirty="0"/>
+              <a:t>Insight from test/plot</a:t>
+            </a:r>
+          </a:p>
+        </p:txBody>
+      </p:sp>
+    </p:spTree>
+    <p:extLst>
+      <p:ext uri="{BB962C8B-B14F-4D97-AF65-F5344CB8AC3E}">
+        <p14:creationId xmlns:p14="http://schemas.microsoft.com/office/powerpoint/2010/main" val="2279870972"/>
+      </p:ext>
+    </p:extLst>
+  </p:cSld>
+  <p:clrMapOvr>
+    <a:masterClrMapping/>
+  </p:clrMapOvr>
+</p:sld>
+</file>
+
+<file path=ppt/slides/slide6.xml><?xml version="1.0" encoding="utf-8"?>
+<p:sld xmlns:a="http://schemas.openxmlformats.org/drawingml/2006/main" xmlns:r="http://schemas.openxmlformats.org/officeDocument/2006/relationships" xmlns:p="http://schemas.openxmlformats.org/presentationml/2006/main">
+  <p:cSld>
+    <p:spTree>
+      <p:nvGrpSpPr>
+        <p:cNvPr id="1" name=""/>
+        <p:cNvGrpSpPr/>
+        <p:nvPr/>
+      </p:nvGrpSpPr>
+      <p:grpSpPr>
+        <a:xfrm>
+          <a:off x="0" y="0"/>
+          <a:ext cx="0" cy="0"/>
+          <a:chOff x="0" y="0"/>
+          <a:chExt cx="0" cy="0"/>
+        </a:xfrm>
+      </p:grpSpPr>
+      <p:sp>
+        <p:nvSpPr>
+          <p:cNvPr id="2" name="Title 1">
+            <a:extLst>
+              <a:ext uri="{FF2B5EF4-FFF2-40B4-BE49-F238E27FC236}">
+                <a16:creationId xmlns:a16="http://schemas.microsoft.com/office/drawing/2014/main" id="{E1832BE2-B24E-4D87-82AE-E0A24F19B9CA}"/>
+              </a:ext>
+            </a:extLst>
+          </p:cNvPr>
+          <p:cNvSpPr>
+            <a:spLocks noGrp="1"/>
+          </p:cNvSpPr>
+          <p:nvPr>
+            <p:ph type="title"/>
+          </p:nvPr>
+        </p:nvSpPr>
+        <p:spPr/>
+        <p:txBody>
+          <a:bodyPr/>
+          <a:lstStyle/>
+          <a:p>
+            <a:r>
+              <a:rPr lang="en-US" dirty="0"/>
+              <a:t>Conclusion</a:t>
+            </a:r>
+          </a:p>
+        </p:txBody>
+      </p:sp>
+      <p:sp>
+        <p:nvSpPr>
+          <p:cNvPr id="3" name="Content Placeholder 2">
+            <a:extLst>
+              <a:ext uri="{FF2B5EF4-FFF2-40B4-BE49-F238E27FC236}">
+                <a16:creationId xmlns:a16="http://schemas.microsoft.com/office/drawing/2014/main" id="{A4FA69BC-815E-47B8-8300-270A52A235E3}"/>
+              </a:ext>
+            </a:extLst>
+          </p:cNvPr>
+          <p:cNvSpPr>
+            <a:spLocks noGrp="1"/>
+          </p:cNvSpPr>
+          <p:nvPr>
+            <p:ph idx="1"/>
+          </p:nvPr>
+        </p:nvSpPr>
+        <p:spPr/>
+        <p:txBody>
+          <a:bodyPr/>
+          <a:lstStyle/>
+          <a:p>
+            <a:r>
+              <a:rPr lang="en-US" dirty="0"/>
+              <a:t>From graphs, reiterate the variables we’ve chosen and the trends we find most interesting.</a:t>
+            </a:r>
+          </a:p>
+        </p:txBody>
+      </p:sp>
+    </p:spTree>
+    <p:extLst>
+      <p:ext uri="{BB962C8B-B14F-4D97-AF65-F5344CB8AC3E}">
+        <p14:creationId xmlns:p14="http://schemas.microsoft.com/office/powerpoint/2010/main" val="1279829978"/>
+      </p:ext>
+    </p:extLst>
+  </p:cSld>
+  <p:clrMapOvr>
+    <a:masterClrMapping/>
+  </p:clrMapOvr>
+</p:sld>
+</file>
+
+<file path=ppt/slides/slide7.xml><?xml version="1.0" encoding="utf-8"?>
+<p:sld xmlns:a="http://schemas.openxmlformats.org/drawingml/2006/main" xmlns:r="http://schemas.openxmlformats.org/officeDocument/2006/relationships" xmlns:p="http://schemas.openxmlformats.org/presentationml/2006/main">
+  <p:cSld>
+    <p:spTree>
+      <p:nvGrpSpPr>
+        <p:cNvPr id="1" name=""/>
+        <p:cNvGrpSpPr/>
+        <p:nvPr/>
+      </p:nvGrpSpPr>
+      <p:grpSpPr>
+        <a:xfrm>
+          <a:off x="0" y="0"/>
+          <a:ext cx="0" cy="0"/>
+          <a:chOff x="0" y="0"/>
+          <a:chExt cx="0" cy="0"/>
+        </a:xfrm>
+      </p:grpSpPr>
+      <p:sp>
+        <p:nvSpPr>
+          <p:cNvPr id="2" name="Title 1">
+            <a:extLst>
+              <a:ext uri="{FF2B5EF4-FFF2-40B4-BE49-F238E27FC236}">
+                <a16:creationId xmlns:a16="http://schemas.microsoft.com/office/drawing/2014/main" id="{6F3EDFA2-3009-4284-AE03-FFF227999411}"/>
+              </a:ext>
+            </a:extLst>
+          </p:cNvPr>
+          <p:cNvSpPr>
+            <a:spLocks noGrp="1"/>
+          </p:cNvSpPr>
+          <p:nvPr>
+            <p:ph type="ctrTitle"/>
+          </p:nvPr>
+        </p:nvSpPr>
+        <p:spPr/>
+        <p:txBody>
+          <a:bodyPr/>
+          <a:lstStyle/>
+          <a:p>
+            <a:r>
+              <a:rPr lang="en-US" dirty="0"/>
+              <a:t>Imported data</a:t>
+            </a:r>
+          </a:p>
+        </p:txBody>
+      </p:sp>
+      <p:sp>
+        <p:nvSpPr>
+          <p:cNvPr id="3" name="Subtitle 2">
+            <a:extLst>
+              <a:ext uri="{FF2B5EF4-FFF2-40B4-BE49-F238E27FC236}">
+                <a16:creationId xmlns:a16="http://schemas.microsoft.com/office/drawing/2014/main" id="{C79B5F8E-EF01-4CAB-B44C-EEA14ED6DEB9}"/>
+              </a:ext>
+            </a:extLst>
+          </p:cNvPr>
+          <p:cNvSpPr>
+            <a:spLocks noGrp="1"/>
+          </p:cNvSpPr>
+          <p:nvPr>
+            <p:ph type="subTitle" idx="1"/>
+          </p:nvPr>
+        </p:nvSpPr>
+        <p:spPr/>
+        <p:txBody>
+          <a:bodyPr/>
+          <a:lstStyle/>
+          <a:p>
+            <a:r>
+              <a:rPr lang="en-US" dirty="0"/>
+              <a:t>library(</a:t>
+            </a:r>
+            <a:r>
+              <a:rPr lang="en-US" dirty="0" err="1"/>
+              <a:t>openxlsx</a:t>
+            </a:r>
+            <a:r>
+              <a:rPr lang="en-US" dirty="0"/>
+              <a:t>)</a:t>
+            </a:r>
+          </a:p>
+          <a:p>
+            <a:r>
+              <a:rPr lang="en-US" dirty="0" err="1"/>
+              <a:t>attritionData</a:t>
+            </a:r>
+            <a:r>
+              <a:rPr lang="en-US" dirty="0"/>
+              <a:t> &lt;- read.xlsx("CaseStudy2-data.xlsx")</a:t>
+            </a:r>
+          </a:p>
+        </p:txBody>
+      </p:sp>
+    </p:spTree>
+    <p:extLst>
+      <p:ext uri="{BB962C8B-B14F-4D97-AF65-F5344CB8AC3E}">
+        <p14:creationId xmlns:p14="http://schemas.microsoft.com/office/powerpoint/2010/main" val="1951453925"/>
+      </p:ext>
+    </p:extLst>
+  </p:cSld>
+  <p:clrMapOvr>
+    <a:masterClrMapping/>
+  </p:clrMapOvr>
+</p:sld>
+</file>
+
+<file path=ppt/slides/slide8.xml><?xml version="1.0" encoding="utf-8"?>
+<p:sld xmlns:a="http://schemas.openxmlformats.org/drawingml/2006/main" xmlns:r="http://schemas.openxmlformats.org/officeDocument/2006/relationships" xmlns:p="http://schemas.openxmlformats.org/presentationml/2006/main">
+  <p:cSld>
+    <p:spTree>
+      <p:nvGrpSpPr>
+        <p:cNvPr id="1" name=""/>
+        <p:cNvGrpSpPr/>
+        <p:nvPr/>
+      </p:nvGrpSpPr>
+      <p:grpSpPr>
+        <a:xfrm>
+          <a:off x="0" y="0"/>
+          <a:ext cx="0" cy="0"/>
+          <a:chOff x="0" y="0"/>
+          <a:chExt cx="0" cy="0"/>
+        </a:xfrm>
+      </p:grpSpPr>
+      <p:sp>
+        <p:nvSpPr>
+          <p:cNvPr id="2" name="Title 1">
+            <a:extLst>
+              <a:ext uri="{FF2B5EF4-FFF2-40B4-BE49-F238E27FC236}">
+                <a16:creationId xmlns:a16="http://schemas.microsoft.com/office/drawing/2014/main" id="{1700EF96-D0BC-4A91-983C-813B13359FA5}"/>
+              </a:ext>
+            </a:extLst>
+          </p:cNvPr>
+          <p:cNvSpPr>
+            <a:spLocks noGrp="1"/>
+          </p:cNvSpPr>
+          <p:nvPr>
+            <p:ph type="title"/>
+          </p:nvPr>
+        </p:nvSpPr>
+        <p:spPr/>
+        <p:txBody>
+          <a:bodyPr/>
+          <a:lstStyle/>
+          <a:p>
+            <a:r>
+              <a:rPr lang="en-US" dirty="0"/>
+              <a:t>Inspected Data</a:t>
+            </a:r>
+          </a:p>
+        </p:txBody>
+      </p:sp>
+      <p:sp>
+        <p:nvSpPr>
+          <p:cNvPr id="4" name="Content Placeholder 2">
+            <a:extLst>
+              <a:ext uri="{FF2B5EF4-FFF2-40B4-BE49-F238E27FC236}">
+                <a16:creationId xmlns:a16="http://schemas.microsoft.com/office/drawing/2014/main" id="{9BAB3DB7-62C2-4A2F-8D61-BC962C8DF26A}"/>
+              </a:ext>
+            </a:extLst>
+          </p:cNvPr>
+          <p:cNvSpPr txBox="1">
+            <a:spLocks/>
+          </p:cNvSpPr>
+          <p:nvPr/>
+        </p:nvSpPr>
+        <p:spPr>
+          <a:xfrm>
+            <a:off x="787400" y="2946399"/>
+            <a:ext cx="10515600" cy="3546476"/>
+          </a:xfrm>
+          <a:prstGeom prst="rect">
+            <a:avLst/>
+          </a:prstGeom>
+        </p:spPr>
+        <p:txBody>
+          <a:bodyPr vert="horz" lIns="91440" tIns="45720" rIns="91440" bIns="45720" rtlCol="0">
+            <a:normAutofit fontScale="47500" lnSpcReduction="20000"/>
+          </a:bodyPr>
+          <a:lstStyle>
+            <a:lvl1pPr marL="228600" indent="-228600" algn="l" defTabSz="914400" rtl="0" eaLnBrk="1" latinLnBrk="0" hangingPunct="1">
+              <a:lnSpc>
+                <a:spcPct val="90000"/>
+              </a:lnSpc>
+              <a:spcBef>
+                <a:spcPts val="1000"/>
+              </a:spcBef>
+              <a:buFont typeface="Arial" panose="020B0604020202020204" pitchFamily="34" charset="0"/>
+              <a:buChar char="•"/>
+              <a:defRPr sz="2800" kern="1200">
+                <a:solidFill>
+                  <a:schemeClr val="tx1"/>
+                </a:solidFill>
+                <a:latin typeface="+mn-lt"/>
+                <a:ea typeface="+mn-ea"/>
+                <a:cs typeface="+mn-cs"/>
+              </a:defRPr>
+            </a:lvl1pPr>
+            <a:lvl2pPr marL="685800" indent="-228600" algn="l" defTabSz="914400" rtl="0" eaLnBrk="1" latinLnBrk="0" hangingPunct="1">
+              <a:lnSpc>
+                <a:spcPct val="90000"/>
+              </a:lnSpc>
+              <a:spcBef>
+                <a:spcPts val="500"/>
+              </a:spcBef>
+              <a:buFont typeface="Arial" panose="020B0604020202020204" pitchFamily="34" charset="0"/>
+              <a:buChar char="•"/>
+              <a:defRPr sz="2400" kern="1200">
+                <a:solidFill>
+                  <a:schemeClr val="tx1"/>
+                </a:solidFill>
+                <a:latin typeface="+mn-lt"/>
+                <a:ea typeface="+mn-ea"/>
+                <a:cs typeface="+mn-cs"/>
+              </a:defRPr>
+            </a:lvl2pPr>
+            <a:lvl3pPr marL="1143000" indent="-228600" algn="l" defTabSz="914400" rtl="0" eaLnBrk="1" latinLnBrk="0" hangingPunct="1">
+              <a:lnSpc>
+                <a:spcPct val="90000"/>
+              </a:lnSpc>
+              <a:spcBef>
+                <a:spcPts val="500"/>
+              </a:spcBef>
+              <a:buFont typeface="Arial" panose="020B0604020202020204" pitchFamily="34" charset="0"/>
+              <a:buChar char="•"/>
+              <a:defRPr sz="2000" kern="1200">
+                <a:solidFill>
+                  <a:schemeClr val="tx1"/>
+                </a:solidFill>
+                <a:latin typeface="+mn-lt"/>
+                <a:ea typeface="+mn-ea"/>
+                <a:cs typeface="+mn-cs"/>
+              </a:defRPr>
+            </a:lvl3pPr>
+            <a:lvl4pPr marL="1600200" indent="-228600" algn="l" defTabSz="914400" rtl="0" eaLnBrk="1" latinLnBrk="0" hangingPunct="1">
+              <a:lnSpc>
+                <a:spcPct val="90000"/>
+              </a:lnSpc>
+              <a:spcBef>
+                <a:spcPts val="500"/>
+              </a:spcBef>
+              <a:buFont typeface="Arial" panose="020B0604020202020204" pitchFamily="34" charset="0"/>
+              <a:buChar char="•"/>
+              <a:defRPr sz="1800" kern="1200">
+                <a:solidFill>
+                  <a:schemeClr val="tx1"/>
+                </a:solidFill>
+                <a:latin typeface="+mn-lt"/>
+                <a:ea typeface="+mn-ea"/>
+                <a:cs typeface="+mn-cs"/>
+              </a:defRPr>
+            </a:lvl4pPr>
+            <a:lvl5pPr marL="2057400" indent="-228600" algn="l" defTabSz="914400" rtl="0" eaLnBrk="1" latinLnBrk="0" hangingPunct="1">
+              <a:lnSpc>
+                <a:spcPct val="90000"/>
+              </a:lnSpc>
+              <a:spcBef>
+                <a:spcPts val="500"/>
+              </a:spcBef>
+              <a:buFont typeface="Arial" panose="020B0604020202020204" pitchFamily="34" charset="0"/>
+              <a:buChar char="•"/>
+              <a:defRPr sz="1800" kern="1200">
+                <a:solidFill>
+                  <a:schemeClr val="tx1"/>
+                </a:solidFill>
+                <a:latin typeface="+mn-lt"/>
+                <a:ea typeface="+mn-ea"/>
+                <a:cs typeface="+mn-cs"/>
+              </a:defRPr>
+            </a:lvl5pPr>
+            <a:lvl6pPr marL="2514600" indent="-228600" algn="l" defTabSz="914400" rtl="0" eaLnBrk="1" latinLnBrk="0" hangingPunct="1">
+              <a:lnSpc>
+                <a:spcPct val="90000"/>
+              </a:lnSpc>
+              <a:spcBef>
+                <a:spcPts val="500"/>
+              </a:spcBef>
+              <a:buFont typeface="Arial" panose="020B0604020202020204" pitchFamily="34" charset="0"/>
+              <a:buChar char="•"/>
+              <a:defRPr sz="1800" kern="1200">
+                <a:solidFill>
+                  <a:schemeClr val="tx1"/>
+                </a:solidFill>
+                <a:latin typeface="+mn-lt"/>
+                <a:ea typeface="+mn-ea"/>
+                <a:cs typeface="+mn-cs"/>
+              </a:defRPr>
+            </a:lvl6pPr>
+            <a:lvl7pPr marL="2971800" indent="-228600" algn="l" defTabSz="914400" rtl="0" eaLnBrk="1" latinLnBrk="0" hangingPunct="1">
+              <a:lnSpc>
+                <a:spcPct val="90000"/>
+              </a:lnSpc>
+              <a:spcBef>
+                <a:spcPts val="500"/>
+              </a:spcBef>
+              <a:buFont typeface="Arial" panose="020B0604020202020204" pitchFamily="34" charset="0"/>
+              <a:buChar char="•"/>
+              <a:defRPr sz="1800" kern="1200">
+                <a:solidFill>
+                  <a:schemeClr val="tx1"/>
+                </a:solidFill>
+                <a:latin typeface="+mn-lt"/>
+                <a:ea typeface="+mn-ea"/>
+                <a:cs typeface="+mn-cs"/>
+              </a:defRPr>
+            </a:lvl7pPr>
+            <a:lvl8pPr marL="3429000" indent="-228600" algn="l" defTabSz="914400" rtl="0" eaLnBrk="1" latinLnBrk="0" hangingPunct="1">
+              <a:lnSpc>
+                <a:spcPct val="90000"/>
+              </a:lnSpc>
+              <a:spcBef>
+                <a:spcPts val="500"/>
+              </a:spcBef>
+              <a:buFont typeface="Arial" panose="020B0604020202020204" pitchFamily="34" charset="0"/>
+              <a:buChar char="•"/>
+              <a:defRPr sz="1800" kern="1200">
+                <a:solidFill>
+                  <a:schemeClr val="tx1"/>
+                </a:solidFill>
+                <a:latin typeface="+mn-lt"/>
+                <a:ea typeface="+mn-ea"/>
+                <a:cs typeface="+mn-cs"/>
+              </a:defRPr>
+            </a:lvl8pPr>
+            <a:lvl9pPr marL="3886200" indent="-228600" algn="l" defTabSz="914400" rtl="0" eaLnBrk="1" latinLnBrk="0" hangingPunct="1">
+              <a:lnSpc>
+                <a:spcPct val="90000"/>
+              </a:lnSpc>
+              <a:spcBef>
+                <a:spcPts val="500"/>
+              </a:spcBef>
+              <a:buFont typeface="Arial" panose="020B0604020202020204" pitchFamily="34" charset="0"/>
+              <a:buChar char="•"/>
+              <a:defRPr sz="1800" kern="1200">
+                <a:solidFill>
+                  <a:schemeClr val="tx1"/>
+                </a:solidFill>
+                <a:latin typeface="+mn-lt"/>
+                <a:ea typeface="+mn-ea"/>
+                <a:cs typeface="+mn-cs"/>
+              </a:defRPr>
+            </a:lvl9pPr>
+          </a:lstStyle>
+          <a:p>
+            <a:r>
+              <a:rPr lang="en-US" dirty="0"/>
+              <a:t>Potential Trends related to attrition:</a:t>
+            </a:r>
+          </a:p>
+          <a:p>
+            <a:pPr lvl="1"/>
+            <a:r>
+              <a:rPr lang="en-US" dirty="0"/>
+              <a:t>Age related to Attrition</a:t>
+            </a:r>
+          </a:p>
+          <a:p>
+            <a:pPr lvl="2"/>
+            <a:r>
+              <a:rPr lang="en-US" dirty="0"/>
+              <a:t>People retire, midlife crisis?</a:t>
+            </a:r>
+          </a:p>
+          <a:p>
+            <a:pPr lvl="1"/>
+            <a:r>
+              <a:rPr lang="en-US" dirty="0" err="1"/>
+              <a:t>WorklifeBalance</a:t>
+            </a:r>
+            <a:endParaRPr lang="en-US" dirty="0"/>
+          </a:p>
+          <a:p>
+            <a:pPr lvl="2"/>
+            <a:r>
+              <a:rPr lang="en-US" dirty="0"/>
+              <a:t>People retire, midlife crisis?</a:t>
+            </a:r>
+          </a:p>
+          <a:p>
+            <a:pPr lvl="1"/>
+            <a:r>
+              <a:rPr lang="en-US" dirty="0" err="1"/>
+              <a:t>JobInvolvment</a:t>
+            </a:r>
+            <a:r>
+              <a:rPr lang="en-US" dirty="0"/>
+              <a:t>/</a:t>
+            </a:r>
+            <a:r>
+              <a:rPr lang="en-US" dirty="0" err="1"/>
+              <a:t>JobSatisfaction</a:t>
+            </a:r>
+            <a:endParaRPr lang="en-US" dirty="0"/>
+          </a:p>
+          <a:p>
+            <a:pPr lvl="2"/>
+            <a:r>
+              <a:rPr lang="en-US" dirty="0"/>
+              <a:t>Are people bored? Are they engaged? Too much work?</a:t>
+            </a:r>
+          </a:p>
+          <a:p>
+            <a:pPr lvl="1"/>
+            <a:r>
+              <a:rPr lang="en-US" dirty="0"/>
+              <a:t>Years at company</a:t>
+            </a:r>
+          </a:p>
+          <a:p>
+            <a:pPr lvl="2"/>
+            <a:r>
+              <a:rPr lang="en-US" dirty="0"/>
+              <a:t>Do the longer people work at company deter them more from leaving?</a:t>
+            </a:r>
+          </a:p>
+          <a:p>
+            <a:pPr lvl="1"/>
+            <a:r>
+              <a:rPr lang="en-US" dirty="0"/>
+              <a:t>Job Role</a:t>
+            </a:r>
+          </a:p>
+          <a:p>
+            <a:pPr lvl="2"/>
+            <a:r>
+              <a:rPr lang="en-US" dirty="0"/>
+              <a:t>What jobs have the most people leaving? </a:t>
+            </a:r>
+          </a:p>
+          <a:p>
+            <a:pPr lvl="1"/>
+            <a:r>
+              <a:rPr lang="en-US" dirty="0"/>
+              <a:t>Monthly Income</a:t>
+            </a:r>
+          </a:p>
+          <a:p>
+            <a:pPr lvl="2"/>
+            <a:r>
+              <a:rPr lang="en-US" dirty="0"/>
+              <a:t>Is there an average wage that causes people to leave?</a:t>
+            </a:r>
+          </a:p>
+          <a:p>
+            <a:pPr lvl="1"/>
+            <a:r>
+              <a:rPr lang="en-US" dirty="0"/>
+              <a:t>Gender</a:t>
+            </a:r>
+          </a:p>
+          <a:p>
+            <a:pPr lvl="2"/>
+            <a:r>
+              <a:rPr lang="en-US" dirty="0"/>
+              <a:t>Which gender is leaving more? </a:t>
+            </a:r>
+          </a:p>
+          <a:p>
+            <a:pPr marL="914400" lvl="2" indent="0">
+              <a:buNone/>
+            </a:pPr>
+            <a:endParaRPr lang="en-US" dirty="0"/>
+          </a:p>
+          <a:p>
+            <a:pPr lvl="2"/>
+            <a:endParaRPr lang="en-US" dirty="0"/>
+          </a:p>
+          <a:p>
+            <a:pPr marL="914400" lvl="2" indent="0">
+              <a:buNone/>
+            </a:pPr>
+            <a:endParaRPr lang="en-US" dirty="0"/>
+          </a:p>
+          <a:p>
+            <a:pPr marL="914400" lvl="2" indent="0">
+              <a:buNone/>
+            </a:pPr>
+            <a:r>
+              <a:rPr lang="en-US" dirty="0"/>
+              <a:t> </a:t>
+            </a:r>
+          </a:p>
+          <a:p>
+            <a:pPr marL="914400" lvl="2" indent="0">
+              <a:buNone/>
+            </a:pPr>
+            <a:endParaRPr lang="en-US" dirty="0"/>
+          </a:p>
+        </p:txBody>
+      </p:sp>
+      <p:sp>
+        <p:nvSpPr>
+          <p:cNvPr id="6" name="Rectangle 2">
+            <a:extLst>
+              <a:ext uri="{FF2B5EF4-FFF2-40B4-BE49-F238E27FC236}">
+                <a16:creationId xmlns:a16="http://schemas.microsoft.com/office/drawing/2014/main" id="{37ED1D22-0F4E-4AA1-8713-8B09CC1F07BB}"/>
+              </a:ext>
+            </a:extLst>
+          </p:cNvPr>
+          <p:cNvSpPr>
+            <a:spLocks noGrp="1" noChangeArrowheads="1"/>
+          </p:cNvSpPr>
+          <p:nvPr>
+            <p:ph idx="1"/>
+          </p:nvPr>
+        </p:nvSpPr>
+        <p:spPr bwMode="auto">
+          <a:xfrm>
+            <a:off x="963693" y="1562100"/>
+            <a:ext cx="8771632" cy="1231106"/>
+          </a:xfrm>
+          <a:prstGeom prst="rect">
+            <a:avLst/>
+          </a:prstGeom>
+          <a:solidFill>
+            <a:srgbClr val="FFFFFF"/>
+          </a:solidFill>
+          <a:ln>
+            <a:noFill/>
+          </a:ln>
+          <a:effectLst/>
+          <a:extLst>
+            <a:ext uri="{91240B29-F687-4F45-9708-019B960494DF}">
+              <a14:hiddenLine xmlns:a14="http://schemas.microsoft.com/office/drawing/2010/main" w="9525">
+                <a:solidFill>
+                  <a:schemeClr val="tx1"/>
+                </a:solidFill>
+                <a:miter lim="800000"/>
+                <a:headEnd/>
+                <a:tailEnd/>
+              </a14:hiddenLine>
+            </a:ext>
+            <a:ext uri="{AF507438-7753-43E0-B8FC-AC1667EBCBE1}">
+              <a14:hiddenEffects xmlns:a14="http://schemas.microsoft.com/office/drawing/2010/main">
+                <a:effectLst>
+                  <a:outerShdw dist="35921" dir="2700000" algn="ctr" rotWithShape="0">
+                    <a:schemeClr val="bg2"/>
+                  </a:outerShdw>
+                </a:effectLst>
+              </a14:hiddenEffects>
+            </a:ext>
+          </a:extLst>
+        </p:spPr>
+        <p:txBody>
+          <a:bodyPr vert="horz" wrap="none" lIns="0" tIns="0" rIns="0" bIns="0" numCol="1" anchor="ctr" anchorCtr="0" compatLnSpc="1">
+            <a:prstTxWarp prst="textNoShape">
+              <a:avLst/>
+            </a:prstTxWarp>
+            <a:spAutoFit/>
+          </a:bodyPr>
+          <a:lstStyle/>
+          <a:p>
+            <a:pPr marR="0" lvl="0" algn="l" defTabSz="914400" rtl="0" eaLnBrk="0" fontAlgn="base" latinLnBrk="0" hangingPunct="0">
+              <a:lnSpc>
+                <a:spcPct val="100000"/>
+              </a:lnSpc>
+              <a:spcBef>
+                <a:spcPct val="0"/>
+              </a:spcBef>
+              <a:spcAft>
+                <a:spcPct val="0"/>
+              </a:spcAft>
+              <a:buClrTx/>
+              <a:buSzTx/>
+              <a:buFont typeface="Wingdings" panose="05000000000000000000" pitchFamily="2" charset="2"/>
+              <a:buChar char="Ø"/>
+              <a:tabLst/>
+            </a:pPr>
+            <a:r>
+              <a:rPr kumimoji="0" lang="en-US" altLang="en-US" sz="1000" b="0" i="0" u="none" strike="noStrike" cap="none" normalizeH="0" baseline="0" dirty="0">
+                <a:ln>
+                  <a:noFill/>
+                </a:ln>
+                <a:solidFill>
+                  <a:srgbClr val="0000FF"/>
+                </a:solidFill>
+                <a:effectLst/>
+                <a:latin typeface="Lucida Console" panose="020B0609040504020204" pitchFamily="49" charset="0"/>
+              </a:rPr>
+              <a:t>names(</a:t>
+            </a:r>
+            <a:r>
+              <a:rPr kumimoji="0" lang="en-US" altLang="en-US" sz="1000" b="0" i="0" u="none" strike="noStrike" cap="none" normalizeH="0" baseline="0" dirty="0" err="1">
+                <a:ln>
+                  <a:noFill/>
+                </a:ln>
+                <a:solidFill>
+                  <a:srgbClr val="0000FF"/>
+                </a:solidFill>
+                <a:effectLst/>
+                <a:latin typeface="Lucida Console" panose="020B0609040504020204" pitchFamily="49" charset="0"/>
+              </a:rPr>
+              <a:t>attritionData</a:t>
+            </a:r>
+            <a:r>
+              <a:rPr kumimoji="0" lang="en-US" altLang="en-US" sz="1000" b="0" i="0" u="none" strike="noStrike" cap="none" normalizeH="0" baseline="0" dirty="0">
+                <a:ln>
+                  <a:noFill/>
+                </a:ln>
+                <a:solidFill>
+                  <a:srgbClr val="0000FF"/>
+                </a:solidFill>
+                <a:effectLst/>
+                <a:latin typeface="Lucida Console" panose="020B0609040504020204" pitchFamily="49" charset="0"/>
+              </a:rPr>
+              <a:t>) </a:t>
+            </a:r>
+          </a:p>
+          <a:p>
+            <a:pPr marR="0" lvl="0" algn="l" defTabSz="914400" rtl="0" eaLnBrk="0" fontAlgn="base" latinLnBrk="0" hangingPunct="0">
+              <a:lnSpc>
+                <a:spcPct val="100000"/>
+              </a:lnSpc>
+              <a:spcBef>
+                <a:spcPct val="0"/>
+              </a:spcBef>
+              <a:spcAft>
+                <a:spcPct val="0"/>
+              </a:spcAft>
+              <a:buClrTx/>
+              <a:buSzTx/>
+              <a:buFont typeface="Wingdings" panose="05000000000000000000" pitchFamily="2" charset="2"/>
+              <a:buChar char="Ø"/>
+              <a:tabLst/>
+            </a:pPr>
+            <a:r>
+              <a:rPr kumimoji="0" lang="en-US" altLang="en-US" sz="1000" b="0" i="0" u="none" strike="noStrike" cap="none" normalizeH="0" baseline="0" dirty="0">
+                <a:ln>
+                  <a:noFill/>
+                </a:ln>
+                <a:solidFill>
+                  <a:srgbClr val="000000"/>
+                </a:solidFill>
+                <a:effectLst/>
+                <a:latin typeface="Lucida Console" panose="020B0609040504020204" pitchFamily="49" charset="0"/>
+              </a:rPr>
+              <a:t>[1] "Age" "Attrition" "</a:t>
+            </a:r>
+            <a:r>
+              <a:rPr kumimoji="0" lang="en-US" altLang="en-US" sz="1000" b="0" i="0" u="none" strike="noStrike" cap="none" normalizeH="0" baseline="0" dirty="0" err="1">
+                <a:ln>
+                  <a:noFill/>
+                </a:ln>
+                <a:solidFill>
+                  <a:srgbClr val="000000"/>
+                </a:solidFill>
+                <a:effectLst/>
+                <a:latin typeface="Lucida Console" panose="020B0609040504020204" pitchFamily="49" charset="0"/>
+              </a:rPr>
+              <a:t>BusinessTravel</a:t>
+            </a:r>
+            <a:r>
+              <a:rPr kumimoji="0" lang="en-US" altLang="en-US" sz="1000" b="0" i="0" u="none" strike="noStrike" cap="none" normalizeH="0" baseline="0" dirty="0">
+                <a:ln>
+                  <a:noFill/>
+                </a:ln>
+                <a:solidFill>
+                  <a:srgbClr val="000000"/>
+                </a:solidFill>
+                <a:effectLst/>
+                <a:latin typeface="Lucida Console" panose="020B0609040504020204" pitchFamily="49" charset="0"/>
+              </a:rPr>
+              <a:t>" "</a:t>
+            </a:r>
+            <a:r>
+              <a:rPr kumimoji="0" lang="en-US" altLang="en-US" sz="1000" b="0" i="0" u="none" strike="noStrike" cap="none" normalizeH="0" baseline="0" dirty="0" err="1">
+                <a:ln>
+                  <a:noFill/>
+                </a:ln>
+                <a:solidFill>
+                  <a:srgbClr val="000000"/>
+                </a:solidFill>
+                <a:effectLst/>
+                <a:latin typeface="Lucida Console" panose="020B0609040504020204" pitchFamily="49" charset="0"/>
+              </a:rPr>
+              <a:t>DailyRate</a:t>
+            </a:r>
+            <a:r>
+              <a:rPr kumimoji="0" lang="en-US" altLang="en-US" sz="1000" b="0" i="0" u="none" strike="noStrike" cap="none" normalizeH="0" baseline="0" dirty="0">
+                <a:ln>
+                  <a:noFill/>
+                </a:ln>
+                <a:solidFill>
+                  <a:srgbClr val="000000"/>
+                </a:solidFill>
+                <a:effectLst/>
+                <a:latin typeface="Lucida Console" panose="020B0609040504020204" pitchFamily="49" charset="0"/>
+              </a:rPr>
+              <a:t>" "Department" </a:t>
+            </a:r>
+          </a:p>
+          <a:p>
+            <a:pPr marR="0" lvl="0" algn="l" defTabSz="914400" rtl="0" eaLnBrk="0" fontAlgn="base" latinLnBrk="0" hangingPunct="0">
+              <a:lnSpc>
+                <a:spcPct val="100000"/>
+              </a:lnSpc>
+              <a:spcBef>
+                <a:spcPct val="0"/>
+              </a:spcBef>
+              <a:spcAft>
+                <a:spcPct val="0"/>
+              </a:spcAft>
+              <a:buClrTx/>
+              <a:buSzTx/>
+              <a:buFont typeface="Wingdings" panose="05000000000000000000" pitchFamily="2" charset="2"/>
+              <a:buChar char="Ø"/>
+              <a:tabLst/>
+            </a:pPr>
+            <a:r>
+              <a:rPr kumimoji="0" lang="en-US" altLang="en-US" sz="1000" b="0" i="0" u="none" strike="noStrike" cap="none" normalizeH="0" baseline="0" dirty="0">
+                <a:ln>
+                  <a:noFill/>
+                </a:ln>
+                <a:solidFill>
+                  <a:srgbClr val="000000"/>
+                </a:solidFill>
+                <a:effectLst/>
+                <a:latin typeface="Lucida Console" panose="020B0609040504020204" pitchFamily="49" charset="0"/>
+              </a:rPr>
+              <a:t>[6] "</a:t>
+            </a:r>
+            <a:r>
+              <a:rPr kumimoji="0" lang="en-US" altLang="en-US" sz="1000" b="0" i="0" u="none" strike="noStrike" cap="none" normalizeH="0" baseline="0" dirty="0" err="1">
+                <a:ln>
+                  <a:noFill/>
+                </a:ln>
+                <a:solidFill>
+                  <a:srgbClr val="000000"/>
+                </a:solidFill>
+                <a:effectLst/>
+                <a:latin typeface="Lucida Console" panose="020B0609040504020204" pitchFamily="49" charset="0"/>
+              </a:rPr>
+              <a:t>DistanceFromHome</a:t>
+            </a:r>
+            <a:r>
+              <a:rPr kumimoji="0" lang="en-US" altLang="en-US" sz="1000" b="0" i="0" u="none" strike="noStrike" cap="none" normalizeH="0" baseline="0" dirty="0">
+                <a:ln>
+                  <a:noFill/>
+                </a:ln>
+                <a:solidFill>
+                  <a:srgbClr val="000000"/>
+                </a:solidFill>
+                <a:effectLst/>
+                <a:latin typeface="Lucida Console" panose="020B0609040504020204" pitchFamily="49" charset="0"/>
+              </a:rPr>
+              <a:t>" "Education" "</a:t>
+            </a:r>
+            <a:r>
+              <a:rPr kumimoji="0" lang="en-US" altLang="en-US" sz="1000" b="0" i="0" u="none" strike="noStrike" cap="none" normalizeH="0" baseline="0" dirty="0" err="1">
+                <a:ln>
+                  <a:noFill/>
+                </a:ln>
+                <a:solidFill>
+                  <a:srgbClr val="000000"/>
+                </a:solidFill>
+                <a:effectLst/>
+                <a:latin typeface="Lucida Console" panose="020B0609040504020204" pitchFamily="49" charset="0"/>
+              </a:rPr>
+              <a:t>EducationField</a:t>
+            </a:r>
+            <a:r>
+              <a:rPr kumimoji="0" lang="en-US" altLang="en-US" sz="1000" b="0" i="0" u="none" strike="noStrike" cap="none" normalizeH="0" baseline="0" dirty="0">
+                <a:ln>
+                  <a:noFill/>
+                </a:ln>
+                <a:solidFill>
+                  <a:srgbClr val="000000"/>
+                </a:solidFill>
+                <a:effectLst/>
+                <a:latin typeface="Lucida Console" panose="020B0609040504020204" pitchFamily="49" charset="0"/>
+              </a:rPr>
+              <a:t>" "</a:t>
+            </a:r>
+            <a:r>
+              <a:rPr kumimoji="0" lang="en-US" altLang="en-US" sz="1000" b="0" i="0" u="none" strike="noStrike" cap="none" normalizeH="0" baseline="0" dirty="0" err="1">
+                <a:ln>
+                  <a:noFill/>
+                </a:ln>
+                <a:solidFill>
+                  <a:srgbClr val="000000"/>
+                </a:solidFill>
+                <a:effectLst/>
+                <a:latin typeface="Lucida Console" panose="020B0609040504020204" pitchFamily="49" charset="0"/>
+              </a:rPr>
+              <a:t>EmployeeCount</a:t>
+            </a:r>
+            <a:r>
+              <a:rPr kumimoji="0" lang="en-US" altLang="en-US" sz="1000" b="0" i="0" u="none" strike="noStrike" cap="none" normalizeH="0" baseline="0" dirty="0">
+                <a:ln>
+                  <a:noFill/>
+                </a:ln>
+                <a:solidFill>
+                  <a:srgbClr val="000000"/>
+                </a:solidFill>
+                <a:effectLst/>
+                <a:latin typeface="Lucida Console" panose="020B0609040504020204" pitchFamily="49" charset="0"/>
+              </a:rPr>
+              <a:t>" "</a:t>
+            </a:r>
+            <a:r>
+              <a:rPr kumimoji="0" lang="en-US" altLang="en-US" sz="1000" b="0" i="0" u="none" strike="noStrike" cap="none" normalizeH="0" baseline="0" dirty="0" err="1">
+                <a:ln>
+                  <a:noFill/>
+                </a:ln>
+                <a:solidFill>
+                  <a:srgbClr val="000000"/>
+                </a:solidFill>
+                <a:effectLst/>
+                <a:latin typeface="Lucida Console" panose="020B0609040504020204" pitchFamily="49" charset="0"/>
+              </a:rPr>
+              <a:t>EmployeeNumber</a:t>
+            </a:r>
+            <a:r>
+              <a:rPr kumimoji="0" lang="en-US" altLang="en-US" sz="1000" b="0" i="0" u="none" strike="noStrike" cap="none" normalizeH="0" baseline="0" dirty="0">
+                <a:ln>
+                  <a:noFill/>
+                </a:ln>
+                <a:solidFill>
+                  <a:srgbClr val="000000"/>
+                </a:solidFill>
+                <a:effectLst/>
+                <a:latin typeface="Lucida Console" panose="020B0609040504020204" pitchFamily="49" charset="0"/>
+              </a:rPr>
+              <a:t>" </a:t>
+            </a:r>
+          </a:p>
+          <a:p>
+            <a:pPr marR="0" lvl="0" algn="l" defTabSz="914400" rtl="0" eaLnBrk="0" fontAlgn="base" latinLnBrk="0" hangingPunct="0">
+              <a:lnSpc>
+                <a:spcPct val="100000"/>
+              </a:lnSpc>
+              <a:spcBef>
+                <a:spcPct val="0"/>
+              </a:spcBef>
+              <a:spcAft>
+                <a:spcPct val="0"/>
+              </a:spcAft>
+              <a:buClrTx/>
+              <a:buSzTx/>
+              <a:buFont typeface="Wingdings" panose="05000000000000000000" pitchFamily="2" charset="2"/>
+              <a:buChar char="Ø"/>
+              <a:tabLst/>
+            </a:pPr>
+            <a:r>
+              <a:rPr kumimoji="0" lang="en-US" altLang="en-US" sz="1000" b="0" i="0" u="none" strike="noStrike" cap="none" normalizeH="0" baseline="0" dirty="0">
+                <a:ln>
+                  <a:noFill/>
+                </a:ln>
+                <a:solidFill>
+                  <a:srgbClr val="000000"/>
+                </a:solidFill>
+                <a:effectLst/>
+                <a:latin typeface="Lucida Console" panose="020B0609040504020204" pitchFamily="49" charset="0"/>
+              </a:rPr>
+              <a:t>[11] "</a:t>
+            </a:r>
+            <a:r>
+              <a:rPr kumimoji="0" lang="en-US" altLang="en-US" sz="1000" b="0" i="0" u="none" strike="noStrike" cap="none" normalizeH="0" baseline="0" dirty="0" err="1">
+                <a:ln>
+                  <a:noFill/>
+                </a:ln>
+                <a:solidFill>
+                  <a:srgbClr val="000000"/>
+                </a:solidFill>
+                <a:effectLst/>
+                <a:latin typeface="Lucida Console" panose="020B0609040504020204" pitchFamily="49" charset="0"/>
+              </a:rPr>
+              <a:t>EnvironmentSatisfaction</a:t>
+            </a:r>
+            <a:r>
+              <a:rPr kumimoji="0" lang="en-US" altLang="en-US" sz="1000" b="0" i="0" u="none" strike="noStrike" cap="none" normalizeH="0" baseline="0" dirty="0">
+                <a:ln>
+                  <a:noFill/>
+                </a:ln>
+                <a:solidFill>
+                  <a:srgbClr val="000000"/>
+                </a:solidFill>
+                <a:effectLst/>
+                <a:latin typeface="Lucida Console" panose="020B0609040504020204" pitchFamily="49" charset="0"/>
+              </a:rPr>
+              <a:t>" "Gender" "</a:t>
+            </a:r>
+            <a:r>
+              <a:rPr kumimoji="0" lang="en-US" altLang="en-US" sz="1000" b="0" i="0" u="none" strike="noStrike" cap="none" normalizeH="0" baseline="0" dirty="0" err="1">
+                <a:ln>
+                  <a:noFill/>
+                </a:ln>
+                <a:solidFill>
+                  <a:srgbClr val="000000"/>
+                </a:solidFill>
+                <a:effectLst/>
+                <a:latin typeface="Lucida Console" panose="020B0609040504020204" pitchFamily="49" charset="0"/>
+              </a:rPr>
+              <a:t>HourlyRate</a:t>
+            </a:r>
+            <a:r>
+              <a:rPr kumimoji="0" lang="en-US" altLang="en-US" sz="1000" b="0" i="0" u="none" strike="noStrike" cap="none" normalizeH="0" baseline="0" dirty="0">
+                <a:ln>
+                  <a:noFill/>
+                </a:ln>
+                <a:solidFill>
+                  <a:srgbClr val="000000"/>
+                </a:solidFill>
+                <a:effectLst/>
+                <a:latin typeface="Lucida Console" panose="020B0609040504020204" pitchFamily="49" charset="0"/>
+              </a:rPr>
+              <a:t>" "</a:t>
+            </a:r>
+            <a:r>
+              <a:rPr kumimoji="0" lang="en-US" altLang="en-US" sz="1000" b="0" i="0" u="none" strike="noStrike" cap="none" normalizeH="0" baseline="0" dirty="0" err="1">
+                <a:ln>
+                  <a:noFill/>
+                </a:ln>
+                <a:solidFill>
+                  <a:srgbClr val="000000"/>
+                </a:solidFill>
+                <a:effectLst/>
+                <a:latin typeface="Lucida Console" panose="020B0609040504020204" pitchFamily="49" charset="0"/>
+              </a:rPr>
+              <a:t>JobInvolvement</a:t>
+            </a:r>
+            <a:r>
+              <a:rPr kumimoji="0" lang="en-US" altLang="en-US" sz="1000" b="0" i="0" u="none" strike="noStrike" cap="none" normalizeH="0" baseline="0" dirty="0">
+                <a:ln>
+                  <a:noFill/>
+                </a:ln>
+                <a:solidFill>
+                  <a:srgbClr val="000000"/>
+                </a:solidFill>
+                <a:effectLst/>
+                <a:latin typeface="Lucida Console" panose="020B0609040504020204" pitchFamily="49" charset="0"/>
+              </a:rPr>
+              <a:t>" "</a:t>
+            </a:r>
+            <a:r>
+              <a:rPr kumimoji="0" lang="en-US" altLang="en-US" sz="1000" b="0" i="0" u="none" strike="noStrike" cap="none" normalizeH="0" baseline="0" dirty="0" err="1">
+                <a:ln>
+                  <a:noFill/>
+                </a:ln>
+                <a:solidFill>
+                  <a:srgbClr val="000000"/>
+                </a:solidFill>
+                <a:effectLst/>
+                <a:latin typeface="Lucida Console" panose="020B0609040504020204" pitchFamily="49" charset="0"/>
+              </a:rPr>
+              <a:t>JobLevel</a:t>
+            </a:r>
+            <a:r>
+              <a:rPr kumimoji="0" lang="en-US" altLang="en-US" sz="1000" b="0" i="0" u="none" strike="noStrike" cap="none" normalizeH="0" baseline="0" dirty="0">
+                <a:ln>
+                  <a:noFill/>
+                </a:ln>
+                <a:solidFill>
+                  <a:srgbClr val="000000"/>
+                </a:solidFill>
+                <a:effectLst/>
+                <a:latin typeface="Lucida Console" panose="020B0609040504020204" pitchFamily="49" charset="0"/>
+              </a:rPr>
+              <a:t>" </a:t>
+            </a:r>
+          </a:p>
+          <a:p>
+            <a:pPr marR="0" lvl="0" algn="l" defTabSz="914400" rtl="0" eaLnBrk="0" fontAlgn="base" latinLnBrk="0" hangingPunct="0">
+              <a:lnSpc>
+                <a:spcPct val="100000"/>
+              </a:lnSpc>
+              <a:spcBef>
+                <a:spcPct val="0"/>
+              </a:spcBef>
+              <a:spcAft>
+                <a:spcPct val="0"/>
+              </a:spcAft>
+              <a:buClrTx/>
+              <a:buSzTx/>
+              <a:buFont typeface="Wingdings" panose="05000000000000000000" pitchFamily="2" charset="2"/>
+              <a:buChar char="Ø"/>
+              <a:tabLst/>
+            </a:pPr>
+            <a:r>
+              <a:rPr kumimoji="0" lang="en-US" altLang="en-US" sz="1000" b="0" i="0" u="none" strike="noStrike" cap="none" normalizeH="0" baseline="0" dirty="0">
+                <a:ln>
+                  <a:noFill/>
+                </a:ln>
+                <a:solidFill>
+                  <a:srgbClr val="000000"/>
+                </a:solidFill>
+                <a:effectLst/>
+                <a:latin typeface="Lucida Console" panose="020B0609040504020204" pitchFamily="49" charset="0"/>
+              </a:rPr>
+              <a:t>[16] "</a:t>
+            </a:r>
+            <a:r>
+              <a:rPr kumimoji="0" lang="en-US" altLang="en-US" sz="1000" b="0" i="0" u="none" strike="noStrike" cap="none" normalizeH="0" baseline="0" dirty="0" err="1">
+                <a:ln>
+                  <a:noFill/>
+                </a:ln>
+                <a:solidFill>
+                  <a:srgbClr val="000000"/>
+                </a:solidFill>
+                <a:effectLst/>
+                <a:latin typeface="Lucida Console" panose="020B0609040504020204" pitchFamily="49" charset="0"/>
+              </a:rPr>
+              <a:t>JobRole</a:t>
+            </a:r>
+            <a:r>
+              <a:rPr kumimoji="0" lang="en-US" altLang="en-US" sz="1000" b="0" i="0" u="none" strike="noStrike" cap="none" normalizeH="0" baseline="0" dirty="0">
+                <a:ln>
+                  <a:noFill/>
+                </a:ln>
+                <a:solidFill>
+                  <a:srgbClr val="000000"/>
+                </a:solidFill>
+                <a:effectLst/>
+                <a:latin typeface="Lucida Console" panose="020B0609040504020204" pitchFamily="49" charset="0"/>
+              </a:rPr>
+              <a:t>" "</a:t>
+            </a:r>
+            <a:r>
+              <a:rPr kumimoji="0" lang="en-US" altLang="en-US" sz="1000" b="0" i="0" u="none" strike="noStrike" cap="none" normalizeH="0" baseline="0" dirty="0" err="1">
+                <a:ln>
+                  <a:noFill/>
+                </a:ln>
+                <a:solidFill>
+                  <a:srgbClr val="000000"/>
+                </a:solidFill>
+                <a:effectLst/>
+                <a:latin typeface="Lucida Console" panose="020B0609040504020204" pitchFamily="49" charset="0"/>
+              </a:rPr>
+              <a:t>JobSatisfaction</a:t>
+            </a:r>
+            <a:r>
+              <a:rPr kumimoji="0" lang="en-US" altLang="en-US" sz="1000" b="0" i="0" u="none" strike="noStrike" cap="none" normalizeH="0" baseline="0" dirty="0">
+                <a:ln>
+                  <a:noFill/>
+                </a:ln>
+                <a:solidFill>
+                  <a:srgbClr val="000000"/>
+                </a:solidFill>
+                <a:effectLst/>
+                <a:latin typeface="Lucida Console" panose="020B0609040504020204" pitchFamily="49" charset="0"/>
+              </a:rPr>
+              <a:t>" "</a:t>
+            </a:r>
+            <a:r>
+              <a:rPr kumimoji="0" lang="en-US" altLang="en-US" sz="1000" b="0" i="0" u="none" strike="noStrike" cap="none" normalizeH="0" baseline="0" dirty="0" err="1">
+                <a:ln>
+                  <a:noFill/>
+                </a:ln>
+                <a:solidFill>
+                  <a:srgbClr val="000000"/>
+                </a:solidFill>
+                <a:effectLst/>
+                <a:latin typeface="Lucida Console" panose="020B0609040504020204" pitchFamily="49" charset="0"/>
+              </a:rPr>
+              <a:t>MaritalStatus</a:t>
+            </a:r>
+            <a:r>
+              <a:rPr kumimoji="0" lang="en-US" altLang="en-US" sz="1000" b="0" i="0" u="none" strike="noStrike" cap="none" normalizeH="0" baseline="0" dirty="0">
+                <a:ln>
+                  <a:noFill/>
+                </a:ln>
+                <a:solidFill>
+                  <a:srgbClr val="000000"/>
+                </a:solidFill>
+                <a:effectLst/>
+                <a:latin typeface="Lucida Console" panose="020B0609040504020204" pitchFamily="49" charset="0"/>
+              </a:rPr>
+              <a:t>" "</a:t>
+            </a:r>
+            <a:r>
+              <a:rPr kumimoji="0" lang="en-US" altLang="en-US" sz="1000" b="0" i="0" u="none" strike="noStrike" cap="none" normalizeH="0" baseline="0" dirty="0" err="1">
+                <a:ln>
+                  <a:noFill/>
+                </a:ln>
+                <a:solidFill>
+                  <a:srgbClr val="000000"/>
+                </a:solidFill>
+                <a:effectLst/>
+                <a:latin typeface="Lucida Console" panose="020B0609040504020204" pitchFamily="49" charset="0"/>
+              </a:rPr>
+              <a:t>MonthlyIncome</a:t>
+            </a:r>
+            <a:r>
+              <a:rPr kumimoji="0" lang="en-US" altLang="en-US" sz="1000" b="0" i="0" u="none" strike="noStrike" cap="none" normalizeH="0" baseline="0" dirty="0">
+                <a:ln>
+                  <a:noFill/>
+                </a:ln>
+                <a:solidFill>
+                  <a:srgbClr val="000000"/>
+                </a:solidFill>
+                <a:effectLst/>
+                <a:latin typeface="Lucida Console" panose="020B0609040504020204" pitchFamily="49" charset="0"/>
+              </a:rPr>
+              <a:t>" "</a:t>
+            </a:r>
+            <a:r>
+              <a:rPr kumimoji="0" lang="en-US" altLang="en-US" sz="1000" b="0" i="0" u="none" strike="noStrike" cap="none" normalizeH="0" baseline="0" dirty="0" err="1">
+                <a:ln>
+                  <a:noFill/>
+                </a:ln>
+                <a:solidFill>
+                  <a:srgbClr val="000000"/>
+                </a:solidFill>
+                <a:effectLst/>
+                <a:latin typeface="Lucida Console" panose="020B0609040504020204" pitchFamily="49" charset="0"/>
+              </a:rPr>
+              <a:t>MonthlyRate</a:t>
+            </a:r>
+            <a:r>
+              <a:rPr kumimoji="0" lang="en-US" altLang="en-US" sz="1000" b="0" i="0" u="none" strike="noStrike" cap="none" normalizeH="0" baseline="0" dirty="0">
+                <a:ln>
+                  <a:noFill/>
+                </a:ln>
+                <a:solidFill>
+                  <a:srgbClr val="000000"/>
+                </a:solidFill>
+                <a:effectLst/>
+                <a:latin typeface="Lucida Console" panose="020B0609040504020204" pitchFamily="49" charset="0"/>
+              </a:rPr>
+              <a:t>" </a:t>
+            </a:r>
+          </a:p>
+          <a:p>
+            <a:pPr marR="0" lvl="0" algn="l" defTabSz="914400" rtl="0" eaLnBrk="0" fontAlgn="base" latinLnBrk="0" hangingPunct="0">
+              <a:lnSpc>
+                <a:spcPct val="100000"/>
+              </a:lnSpc>
+              <a:spcBef>
+                <a:spcPct val="0"/>
+              </a:spcBef>
+              <a:spcAft>
+                <a:spcPct val="0"/>
+              </a:spcAft>
+              <a:buClrTx/>
+              <a:buSzTx/>
+              <a:buFont typeface="Wingdings" panose="05000000000000000000" pitchFamily="2" charset="2"/>
+              <a:buChar char="Ø"/>
+              <a:tabLst/>
+            </a:pPr>
+            <a:r>
+              <a:rPr kumimoji="0" lang="en-US" altLang="en-US" sz="1000" b="0" i="0" u="none" strike="noStrike" cap="none" normalizeH="0" baseline="0" dirty="0">
+                <a:ln>
+                  <a:noFill/>
+                </a:ln>
+                <a:solidFill>
+                  <a:srgbClr val="000000"/>
+                </a:solidFill>
+                <a:effectLst/>
+                <a:latin typeface="Lucida Console" panose="020B0609040504020204" pitchFamily="49" charset="0"/>
+              </a:rPr>
+              <a:t>[21] "</a:t>
+            </a:r>
+            <a:r>
+              <a:rPr kumimoji="0" lang="en-US" altLang="en-US" sz="1000" b="0" i="0" u="none" strike="noStrike" cap="none" normalizeH="0" baseline="0" dirty="0" err="1">
+                <a:ln>
+                  <a:noFill/>
+                </a:ln>
+                <a:solidFill>
+                  <a:srgbClr val="000000"/>
+                </a:solidFill>
+                <a:effectLst/>
+                <a:latin typeface="Lucida Console" panose="020B0609040504020204" pitchFamily="49" charset="0"/>
+              </a:rPr>
+              <a:t>NumCompaniesWorked</a:t>
+            </a:r>
+            <a:r>
+              <a:rPr kumimoji="0" lang="en-US" altLang="en-US" sz="1000" b="0" i="0" u="none" strike="noStrike" cap="none" normalizeH="0" baseline="0" dirty="0">
+                <a:ln>
+                  <a:noFill/>
+                </a:ln>
+                <a:solidFill>
+                  <a:srgbClr val="000000"/>
+                </a:solidFill>
+                <a:effectLst/>
+                <a:latin typeface="Lucida Console" panose="020B0609040504020204" pitchFamily="49" charset="0"/>
+              </a:rPr>
+              <a:t>" "Over18" "</a:t>
+            </a:r>
+            <a:r>
+              <a:rPr kumimoji="0" lang="en-US" altLang="en-US" sz="1000" b="0" i="0" u="none" strike="noStrike" cap="none" normalizeH="0" baseline="0" dirty="0" err="1">
+                <a:ln>
+                  <a:noFill/>
+                </a:ln>
+                <a:solidFill>
+                  <a:srgbClr val="000000"/>
+                </a:solidFill>
+                <a:effectLst/>
+                <a:latin typeface="Lucida Console" panose="020B0609040504020204" pitchFamily="49" charset="0"/>
+              </a:rPr>
+              <a:t>OverTime</a:t>
+            </a:r>
+            <a:r>
+              <a:rPr kumimoji="0" lang="en-US" altLang="en-US" sz="1000" b="0" i="0" u="none" strike="noStrike" cap="none" normalizeH="0" baseline="0" dirty="0">
+                <a:ln>
+                  <a:noFill/>
+                </a:ln>
+                <a:solidFill>
+                  <a:srgbClr val="000000"/>
+                </a:solidFill>
+                <a:effectLst/>
+                <a:latin typeface="Lucida Console" panose="020B0609040504020204" pitchFamily="49" charset="0"/>
+              </a:rPr>
+              <a:t>" "</a:t>
+            </a:r>
+            <a:r>
+              <a:rPr kumimoji="0" lang="en-US" altLang="en-US" sz="1000" b="0" i="0" u="none" strike="noStrike" cap="none" normalizeH="0" baseline="0" dirty="0" err="1">
+                <a:ln>
+                  <a:noFill/>
+                </a:ln>
+                <a:solidFill>
+                  <a:srgbClr val="000000"/>
+                </a:solidFill>
+                <a:effectLst/>
+                <a:latin typeface="Lucida Console" panose="020B0609040504020204" pitchFamily="49" charset="0"/>
+              </a:rPr>
+              <a:t>PercentSalaryHike</a:t>
+            </a:r>
+            <a:r>
+              <a:rPr kumimoji="0" lang="en-US" altLang="en-US" sz="1000" b="0" i="0" u="none" strike="noStrike" cap="none" normalizeH="0" baseline="0" dirty="0">
+                <a:ln>
+                  <a:noFill/>
+                </a:ln>
+                <a:solidFill>
+                  <a:srgbClr val="000000"/>
+                </a:solidFill>
+                <a:effectLst/>
+                <a:latin typeface="Lucida Console" panose="020B0609040504020204" pitchFamily="49" charset="0"/>
+              </a:rPr>
+              <a:t>" "</a:t>
+            </a:r>
+            <a:r>
+              <a:rPr kumimoji="0" lang="en-US" altLang="en-US" sz="1000" b="0" i="0" u="none" strike="noStrike" cap="none" normalizeH="0" baseline="0" dirty="0" err="1">
+                <a:ln>
+                  <a:noFill/>
+                </a:ln>
+                <a:solidFill>
+                  <a:srgbClr val="000000"/>
+                </a:solidFill>
+                <a:effectLst/>
+                <a:latin typeface="Lucida Console" panose="020B0609040504020204" pitchFamily="49" charset="0"/>
+              </a:rPr>
+              <a:t>PerformanceRating</a:t>
+            </a:r>
+            <a:r>
+              <a:rPr kumimoji="0" lang="en-US" altLang="en-US" sz="1000" b="0" i="0" u="none" strike="noStrike" cap="none" normalizeH="0" baseline="0" dirty="0">
+                <a:ln>
+                  <a:noFill/>
+                </a:ln>
+                <a:solidFill>
+                  <a:srgbClr val="000000"/>
+                </a:solidFill>
+                <a:effectLst/>
+                <a:latin typeface="Lucida Console" panose="020B0609040504020204" pitchFamily="49" charset="0"/>
+              </a:rPr>
+              <a:t>" </a:t>
+            </a:r>
+          </a:p>
+          <a:p>
+            <a:pPr marR="0" lvl="0" algn="l" defTabSz="914400" rtl="0" eaLnBrk="0" fontAlgn="base" latinLnBrk="0" hangingPunct="0">
+              <a:lnSpc>
+                <a:spcPct val="100000"/>
+              </a:lnSpc>
+              <a:spcBef>
+                <a:spcPct val="0"/>
+              </a:spcBef>
+              <a:spcAft>
+                <a:spcPct val="0"/>
+              </a:spcAft>
+              <a:buClrTx/>
+              <a:buSzTx/>
+              <a:buFont typeface="Wingdings" panose="05000000000000000000" pitchFamily="2" charset="2"/>
+              <a:buChar char="Ø"/>
+              <a:tabLst/>
+            </a:pPr>
+            <a:r>
+              <a:rPr kumimoji="0" lang="en-US" altLang="en-US" sz="1000" b="0" i="0" u="none" strike="noStrike" cap="none" normalizeH="0" baseline="0" dirty="0">
+                <a:ln>
+                  <a:noFill/>
+                </a:ln>
+                <a:solidFill>
+                  <a:srgbClr val="000000"/>
+                </a:solidFill>
+                <a:effectLst/>
+                <a:latin typeface="Lucida Console" panose="020B0609040504020204" pitchFamily="49" charset="0"/>
+              </a:rPr>
+              <a:t>[26] "</a:t>
+            </a:r>
+            <a:r>
+              <a:rPr kumimoji="0" lang="en-US" altLang="en-US" sz="1000" b="0" i="0" u="none" strike="noStrike" cap="none" normalizeH="0" baseline="0" dirty="0" err="1">
+                <a:ln>
+                  <a:noFill/>
+                </a:ln>
+                <a:solidFill>
+                  <a:srgbClr val="000000"/>
+                </a:solidFill>
+                <a:effectLst/>
+                <a:latin typeface="Lucida Console" panose="020B0609040504020204" pitchFamily="49" charset="0"/>
+              </a:rPr>
+              <a:t>RelationshipSatisfaction</a:t>
+            </a:r>
+            <a:r>
+              <a:rPr kumimoji="0" lang="en-US" altLang="en-US" sz="1000" b="0" i="0" u="none" strike="noStrike" cap="none" normalizeH="0" baseline="0" dirty="0">
+                <a:ln>
+                  <a:noFill/>
+                </a:ln>
+                <a:solidFill>
+                  <a:srgbClr val="000000"/>
+                </a:solidFill>
+                <a:effectLst/>
+                <a:latin typeface="Lucida Console" panose="020B0609040504020204" pitchFamily="49" charset="0"/>
+              </a:rPr>
+              <a:t>" "</a:t>
+            </a:r>
+            <a:r>
+              <a:rPr kumimoji="0" lang="en-US" altLang="en-US" sz="1000" b="0" i="0" u="none" strike="noStrike" cap="none" normalizeH="0" baseline="0" dirty="0" err="1">
+                <a:ln>
+                  <a:noFill/>
+                </a:ln>
+                <a:solidFill>
+                  <a:srgbClr val="000000"/>
+                </a:solidFill>
+                <a:effectLst/>
+                <a:latin typeface="Lucida Console" panose="020B0609040504020204" pitchFamily="49" charset="0"/>
+              </a:rPr>
+              <a:t>StandardHours</a:t>
+            </a:r>
+            <a:r>
+              <a:rPr kumimoji="0" lang="en-US" altLang="en-US" sz="1000" b="0" i="0" u="none" strike="noStrike" cap="none" normalizeH="0" baseline="0" dirty="0">
+                <a:ln>
+                  <a:noFill/>
+                </a:ln>
+                <a:solidFill>
+                  <a:srgbClr val="000000"/>
+                </a:solidFill>
+                <a:effectLst/>
+                <a:latin typeface="Lucida Console" panose="020B0609040504020204" pitchFamily="49" charset="0"/>
+              </a:rPr>
+              <a:t>" "</a:t>
+            </a:r>
+            <a:r>
+              <a:rPr kumimoji="0" lang="en-US" altLang="en-US" sz="1000" b="0" i="0" u="none" strike="noStrike" cap="none" normalizeH="0" baseline="0" dirty="0" err="1">
+                <a:ln>
+                  <a:noFill/>
+                </a:ln>
+                <a:solidFill>
+                  <a:srgbClr val="000000"/>
+                </a:solidFill>
+                <a:effectLst/>
+                <a:latin typeface="Lucida Console" panose="020B0609040504020204" pitchFamily="49" charset="0"/>
+              </a:rPr>
+              <a:t>StockOptionLevel</a:t>
+            </a:r>
+            <a:r>
+              <a:rPr kumimoji="0" lang="en-US" altLang="en-US" sz="1000" b="0" i="0" u="none" strike="noStrike" cap="none" normalizeH="0" baseline="0" dirty="0">
+                <a:ln>
+                  <a:noFill/>
+                </a:ln>
+                <a:solidFill>
+                  <a:srgbClr val="000000"/>
+                </a:solidFill>
+                <a:effectLst/>
+                <a:latin typeface="Lucida Console" panose="020B0609040504020204" pitchFamily="49" charset="0"/>
+              </a:rPr>
+              <a:t>" "</a:t>
+            </a:r>
+            <a:r>
+              <a:rPr kumimoji="0" lang="en-US" altLang="en-US" sz="1000" b="0" i="0" u="none" strike="noStrike" cap="none" normalizeH="0" baseline="0" dirty="0" err="1">
+                <a:ln>
+                  <a:noFill/>
+                </a:ln>
+                <a:solidFill>
+                  <a:srgbClr val="000000"/>
+                </a:solidFill>
+                <a:effectLst/>
+                <a:latin typeface="Lucida Console" panose="020B0609040504020204" pitchFamily="49" charset="0"/>
+              </a:rPr>
+              <a:t>TotalWorkingYears</a:t>
+            </a:r>
+            <a:r>
+              <a:rPr kumimoji="0" lang="en-US" altLang="en-US" sz="1000" b="0" i="0" u="none" strike="noStrike" cap="none" normalizeH="0" baseline="0" dirty="0">
+                <a:ln>
+                  <a:noFill/>
+                </a:ln>
+                <a:solidFill>
+                  <a:srgbClr val="000000"/>
+                </a:solidFill>
+                <a:effectLst/>
+                <a:latin typeface="Lucida Console" panose="020B0609040504020204" pitchFamily="49" charset="0"/>
+              </a:rPr>
+              <a:t>" "</a:t>
+            </a:r>
+            <a:r>
+              <a:rPr kumimoji="0" lang="en-US" altLang="en-US" sz="1000" b="0" i="0" u="none" strike="noStrike" cap="none" normalizeH="0" baseline="0" dirty="0" err="1">
+                <a:ln>
+                  <a:noFill/>
+                </a:ln>
+                <a:solidFill>
+                  <a:srgbClr val="000000"/>
+                </a:solidFill>
+                <a:effectLst/>
+                <a:latin typeface="Lucida Console" panose="020B0609040504020204" pitchFamily="49" charset="0"/>
+              </a:rPr>
+              <a:t>TrainingTimesLastYear</a:t>
+            </a:r>
+            <a:r>
+              <a:rPr kumimoji="0" lang="en-US" altLang="en-US" sz="1000" b="0" i="0" u="none" strike="noStrike" cap="none" normalizeH="0" baseline="0" dirty="0">
+                <a:ln>
+                  <a:noFill/>
+                </a:ln>
+                <a:solidFill>
+                  <a:srgbClr val="000000"/>
+                </a:solidFill>
+                <a:effectLst/>
+                <a:latin typeface="Lucida Console" panose="020B0609040504020204" pitchFamily="49" charset="0"/>
+              </a:rPr>
+              <a:t>" </a:t>
+            </a:r>
+          </a:p>
+          <a:p>
+            <a:pPr marR="0" lvl="0" algn="l" defTabSz="914400" rtl="0" eaLnBrk="0" fontAlgn="base" latinLnBrk="0" hangingPunct="0">
+              <a:lnSpc>
+                <a:spcPct val="100000"/>
+              </a:lnSpc>
+              <a:spcBef>
+                <a:spcPct val="0"/>
+              </a:spcBef>
+              <a:spcAft>
+                <a:spcPct val="0"/>
+              </a:spcAft>
+              <a:buClrTx/>
+              <a:buSzTx/>
+              <a:buFont typeface="Wingdings" panose="05000000000000000000" pitchFamily="2" charset="2"/>
+              <a:buChar char="Ø"/>
+              <a:tabLst/>
+            </a:pPr>
+            <a:r>
+              <a:rPr kumimoji="0" lang="en-US" altLang="en-US" sz="1000" b="0" i="0" u="none" strike="noStrike" cap="none" normalizeH="0" baseline="0" dirty="0">
+                <a:ln>
+                  <a:noFill/>
+                </a:ln>
+                <a:solidFill>
+                  <a:srgbClr val="000000"/>
+                </a:solidFill>
+                <a:effectLst/>
+                <a:latin typeface="Lucida Console" panose="020B0609040504020204" pitchFamily="49" charset="0"/>
+              </a:rPr>
+              <a:t>[31] "</a:t>
+            </a:r>
+            <a:r>
+              <a:rPr kumimoji="0" lang="en-US" altLang="en-US" sz="1000" b="0" i="0" u="none" strike="noStrike" cap="none" normalizeH="0" baseline="0" dirty="0" err="1">
+                <a:ln>
+                  <a:noFill/>
+                </a:ln>
+                <a:solidFill>
+                  <a:srgbClr val="000000"/>
+                </a:solidFill>
+                <a:effectLst/>
+                <a:latin typeface="Lucida Console" panose="020B0609040504020204" pitchFamily="49" charset="0"/>
+              </a:rPr>
+              <a:t>WorkLifeBalance</a:t>
+            </a:r>
+            <a:r>
+              <a:rPr kumimoji="0" lang="en-US" altLang="en-US" sz="1000" b="0" i="0" u="none" strike="noStrike" cap="none" normalizeH="0" baseline="0" dirty="0">
+                <a:ln>
+                  <a:noFill/>
+                </a:ln>
+                <a:solidFill>
+                  <a:srgbClr val="000000"/>
+                </a:solidFill>
+                <a:effectLst/>
+                <a:latin typeface="Lucida Console" panose="020B0609040504020204" pitchFamily="49" charset="0"/>
+              </a:rPr>
+              <a:t>" "</a:t>
+            </a:r>
+            <a:r>
+              <a:rPr kumimoji="0" lang="en-US" altLang="en-US" sz="1000" b="0" i="0" u="none" strike="noStrike" cap="none" normalizeH="0" baseline="0" dirty="0" err="1">
+                <a:ln>
+                  <a:noFill/>
+                </a:ln>
+                <a:solidFill>
+                  <a:srgbClr val="000000"/>
+                </a:solidFill>
+                <a:effectLst/>
+                <a:latin typeface="Lucida Console" panose="020B0609040504020204" pitchFamily="49" charset="0"/>
+              </a:rPr>
+              <a:t>YearsAtCompany</a:t>
+            </a:r>
+            <a:r>
+              <a:rPr kumimoji="0" lang="en-US" altLang="en-US" sz="1000" b="0" i="0" u="none" strike="noStrike" cap="none" normalizeH="0" baseline="0" dirty="0">
+                <a:ln>
+                  <a:noFill/>
+                </a:ln>
+                <a:solidFill>
+                  <a:srgbClr val="000000"/>
+                </a:solidFill>
+                <a:effectLst/>
+                <a:latin typeface="Lucida Console" panose="020B0609040504020204" pitchFamily="49" charset="0"/>
+              </a:rPr>
+              <a:t>" "</a:t>
+            </a:r>
+            <a:r>
+              <a:rPr kumimoji="0" lang="en-US" altLang="en-US" sz="1000" b="0" i="0" u="none" strike="noStrike" cap="none" normalizeH="0" baseline="0" dirty="0" err="1">
+                <a:ln>
+                  <a:noFill/>
+                </a:ln>
+                <a:solidFill>
+                  <a:srgbClr val="000000"/>
+                </a:solidFill>
+                <a:effectLst/>
+                <a:latin typeface="Lucida Console" panose="020B0609040504020204" pitchFamily="49" charset="0"/>
+              </a:rPr>
+              <a:t>YearsInCurrentRole</a:t>
+            </a:r>
+            <a:r>
+              <a:rPr kumimoji="0" lang="en-US" altLang="en-US" sz="1000" b="0" i="0" u="none" strike="noStrike" cap="none" normalizeH="0" baseline="0" dirty="0">
+                <a:ln>
+                  <a:noFill/>
+                </a:ln>
+                <a:solidFill>
+                  <a:srgbClr val="000000"/>
+                </a:solidFill>
+                <a:effectLst/>
+                <a:latin typeface="Lucida Console" panose="020B0609040504020204" pitchFamily="49" charset="0"/>
+              </a:rPr>
+              <a:t>" "</a:t>
+            </a:r>
+            <a:r>
+              <a:rPr kumimoji="0" lang="en-US" altLang="en-US" sz="1000" b="0" i="0" u="none" strike="noStrike" cap="none" normalizeH="0" baseline="0" dirty="0" err="1">
+                <a:ln>
+                  <a:noFill/>
+                </a:ln>
+                <a:solidFill>
+                  <a:srgbClr val="000000"/>
+                </a:solidFill>
+                <a:effectLst/>
+                <a:latin typeface="Lucida Console" panose="020B0609040504020204" pitchFamily="49" charset="0"/>
+              </a:rPr>
+              <a:t>YearsSinceLastPromotion</a:t>
+            </a:r>
+            <a:r>
+              <a:rPr kumimoji="0" lang="en-US" altLang="en-US" sz="1000" b="0" i="0" u="none" strike="noStrike" cap="none" normalizeH="0" baseline="0" dirty="0">
+                <a:ln>
+                  <a:noFill/>
+                </a:ln>
+                <a:solidFill>
+                  <a:srgbClr val="000000"/>
+                </a:solidFill>
+                <a:effectLst/>
+                <a:latin typeface="Lucida Console" panose="020B0609040504020204" pitchFamily="49" charset="0"/>
+              </a:rPr>
+              <a:t>" "</a:t>
+            </a:r>
+            <a:r>
+              <a:rPr kumimoji="0" lang="en-US" altLang="en-US" sz="1000" b="0" i="0" u="none" strike="noStrike" cap="none" normalizeH="0" baseline="0" dirty="0" err="1">
+                <a:ln>
+                  <a:noFill/>
+                </a:ln>
+                <a:solidFill>
+                  <a:srgbClr val="000000"/>
+                </a:solidFill>
+                <a:effectLst/>
+                <a:latin typeface="Lucida Console" panose="020B0609040504020204" pitchFamily="49" charset="0"/>
+              </a:rPr>
+              <a:t>YearsWithCurrManager</a:t>
+            </a:r>
+            <a:r>
+              <a:rPr kumimoji="0" lang="en-US" altLang="en-US" sz="1000" b="0" i="0" u="none" strike="noStrike" cap="none" normalizeH="0" baseline="0" dirty="0">
+                <a:ln>
+                  <a:noFill/>
+                </a:ln>
+                <a:solidFill>
+                  <a:srgbClr val="000000"/>
+                </a:solidFill>
+                <a:effectLst/>
+                <a:latin typeface="Lucida Console" panose="020B0609040504020204" pitchFamily="49" charset="0"/>
+              </a:rPr>
+              <a:t>" </a:t>
+            </a:r>
+            <a:endParaRPr kumimoji="0" lang="en-US" altLang="en-US" sz="1800" b="0" i="0" u="none" strike="noStrike" cap="none" normalizeH="0" baseline="0" dirty="0">
+              <a:ln>
+                <a:noFill/>
+              </a:ln>
+              <a:solidFill>
+                <a:schemeClr val="tx1"/>
+              </a:solidFill>
+              <a:effectLst/>
+              <a:latin typeface="Arial" panose="020B0604020202020204" pitchFamily="34" charset="0"/>
+            </a:endParaRPr>
+          </a:p>
+        </p:txBody>
+      </p:sp>
+    </p:spTree>
+    <p:extLst>
+      <p:ext uri="{BB962C8B-B14F-4D97-AF65-F5344CB8AC3E}">
+        <p14:creationId xmlns:p14="http://schemas.microsoft.com/office/powerpoint/2010/main" val="2852773575"/>
+      </p:ext>
+    </p:extLst>
+  </p:cSld>
+  <p:clrMapOvr>
+    <a:masterClrMapping/>
+  </p:clrMapOvr>
+</p:sld>
+</file>
+
+<file path=ppt/slides/slide9.xml><?xml version="1.0" encoding="utf-8"?>
+<p:sld xmlns:a="http://schemas.openxmlformats.org/drawingml/2006/main" xmlns:r="http://schemas.openxmlformats.org/officeDocument/2006/relationships" xmlns:p="http://schemas.openxmlformats.org/presentationml/2006/main">
+  <p:cSld>
+    <p:spTree>
+      <p:nvGrpSpPr>
+        <p:cNvPr id="1" name=""/>
+        <p:cNvGrpSpPr/>
+        <p:nvPr/>
+      </p:nvGrpSpPr>
+      <p:grpSpPr>
+        <a:xfrm>
+          <a:off x="0" y="0"/>
+          <a:ext cx="0" cy="0"/>
+          <a:chOff x="0" y="0"/>
+          <a:chExt cx="0" cy="0"/>
+        </a:xfrm>
+      </p:grpSpPr>
+      <p:pic>
+        <p:nvPicPr>
+          <p:cNvPr id="4" name="Picture 3">
+            <a:extLst>
+              <a:ext uri="{FF2B5EF4-FFF2-40B4-BE49-F238E27FC236}">
+                <a16:creationId xmlns:a16="http://schemas.microsoft.com/office/drawing/2014/main" id="{6A0C16AB-AA18-41FA-839F-5D893CE2A644}"/>
+              </a:ext>
+            </a:extLst>
+          </p:cNvPr>
+          <p:cNvPicPr>
+            <a:picLocks noChangeAspect="1"/>
+          </p:cNvPicPr>
+          <p:nvPr/>
+        </p:nvPicPr>
+        <p:blipFill>
+          <a:blip r:embed="rId2"/>
+          <a:stretch>
+            <a:fillRect/>
+          </a:stretch>
+        </p:blipFill>
+        <p:spPr>
+          <a:xfrm>
+            <a:off x="164795" y="6174"/>
+            <a:ext cx="11862410" cy="6845652"/>
+          </a:xfrm>
+          <a:prstGeom prst="rect">
+            <a:avLst/>
+          </a:prstGeom>
+        </p:spPr>
+      </p:pic>
+    </p:spTree>
+    <p:extLst>
+      <p:ext uri="{BB962C8B-B14F-4D97-AF65-F5344CB8AC3E}">
+        <p14:creationId xmlns:p14="http://schemas.microsoft.com/office/powerpoint/2010/main" val="4042849372"/>
       </p:ext>
     </p:extLst>
   </p:cSld>

</xml_diff>

<commit_message>
generated a bunch of plots. will conduct analysis and cleanup later today.
</commit_message>
<xml_diff>
--- a/case_study_02_presentation.pptx
+++ b/case_study_02_presentation.pptx
@@ -24,6 +24,7 @@
     <p:sldId id="261" r:id="rId18"/>
     <p:sldId id="262" r:id="rId19"/>
     <p:sldId id="263" r:id="rId20"/>
+    <p:sldId id="275" r:id="rId21"/>
   </p:sldIdLst>
   <p:sldSz cx="12192000" cy="6858000"/>
   <p:notesSz cx="6858000" cy="9144000"/>
@@ -158,6 +159,7 @@
             <p14:sldId id="261"/>
             <p14:sldId id="262"/>
             <p14:sldId id="263"/>
+            <p14:sldId id="275"/>
           </p14:sldIdLst>
         </p14:section>
       </p14:sectionLst>
@@ -316,7 +318,7 @@
           <a:p>
             <a:fld id="{08B136E0-DE68-48F8-B9E2-21BBDA41EF35}" type="datetimeFigureOut">
               <a:rPr lang="en-US" smtClean="0"/>
-              <a:t>4/11/2019</a:t>
+              <a:t>4/12/2019</a:t>
             </a:fld>
             <a:endParaRPr lang="en-US"/>
           </a:p>
@@ -514,7 +516,7 @@
           <a:p>
             <a:fld id="{08B136E0-DE68-48F8-B9E2-21BBDA41EF35}" type="datetimeFigureOut">
               <a:rPr lang="en-US" smtClean="0"/>
-              <a:t>4/11/2019</a:t>
+              <a:t>4/12/2019</a:t>
             </a:fld>
             <a:endParaRPr lang="en-US"/>
           </a:p>
@@ -722,7 +724,7 @@
           <a:p>
             <a:fld id="{08B136E0-DE68-48F8-B9E2-21BBDA41EF35}" type="datetimeFigureOut">
               <a:rPr lang="en-US" smtClean="0"/>
-              <a:t>4/11/2019</a:t>
+              <a:t>4/12/2019</a:t>
             </a:fld>
             <a:endParaRPr lang="en-US"/>
           </a:p>
@@ -920,7 +922,7 @@
           <a:p>
             <a:fld id="{08B136E0-DE68-48F8-B9E2-21BBDA41EF35}" type="datetimeFigureOut">
               <a:rPr lang="en-US" smtClean="0"/>
-              <a:t>4/11/2019</a:t>
+              <a:t>4/12/2019</a:t>
             </a:fld>
             <a:endParaRPr lang="en-US"/>
           </a:p>
@@ -1195,7 +1197,7 @@
           <a:p>
             <a:fld id="{08B136E0-DE68-48F8-B9E2-21BBDA41EF35}" type="datetimeFigureOut">
               <a:rPr lang="en-US" smtClean="0"/>
-              <a:t>4/11/2019</a:t>
+              <a:t>4/12/2019</a:t>
             </a:fld>
             <a:endParaRPr lang="en-US"/>
           </a:p>
@@ -1460,7 +1462,7 @@
           <a:p>
             <a:fld id="{08B136E0-DE68-48F8-B9E2-21BBDA41EF35}" type="datetimeFigureOut">
               <a:rPr lang="en-US" smtClean="0"/>
-              <a:t>4/11/2019</a:t>
+              <a:t>4/12/2019</a:t>
             </a:fld>
             <a:endParaRPr lang="en-US"/>
           </a:p>
@@ -1872,7 +1874,7 @@
           <a:p>
             <a:fld id="{08B136E0-DE68-48F8-B9E2-21BBDA41EF35}" type="datetimeFigureOut">
               <a:rPr lang="en-US" smtClean="0"/>
-              <a:t>4/11/2019</a:t>
+              <a:t>4/12/2019</a:t>
             </a:fld>
             <a:endParaRPr lang="en-US"/>
           </a:p>
@@ -2013,7 +2015,7 @@
           <a:p>
             <a:fld id="{08B136E0-DE68-48F8-B9E2-21BBDA41EF35}" type="datetimeFigureOut">
               <a:rPr lang="en-US" smtClean="0"/>
-              <a:t>4/11/2019</a:t>
+              <a:t>4/12/2019</a:t>
             </a:fld>
             <a:endParaRPr lang="en-US"/>
           </a:p>
@@ -2126,7 +2128,7 @@
           <a:p>
             <a:fld id="{08B136E0-DE68-48F8-B9E2-21BBDA41EF35}" type="datetimeFigureOut">
               <a:rPr lang="en-US" smtClean="0"/>
-              <a:t>4/11/2019</a:t>
+              <a:t>4/12/2019</a:t>
             </a:fld>
             <a:endParaRPr lang="en-US"/>
           </a:p>
@@ -2437,7 +2439,7 @@
           <a:p>
             <a:fld id="{08B136E0-DE68-48F8-B9E2-21BBDA41EF35}" type="datetimeFigureOut">
               <a:rPr lang="en-US" smtClean="0"/>
-              <a:t>4/11/2019</a:t>
+              <a:t>4/12/2019</a:t>
             </a:fld>
             <a:endParaRPr lang="en-US"/>
           </a:p>
@@ -2725,7 +2727,7 @@
           <a:p>
             <a:fld id="{08B136E0-DE68-48F8-B9E2-21BBDA41EF35}" type="datetimeFigureOut">
               <a:rPr lang="en-US" smtClean="0"/>
-              <a:t>4/11/2019</a:t>
+              <a:t>4/12/2019</a:t>
             </a:fld>
             <a:endParaRPr lang="en-US"/>
           </a:p>
@@ -2966,7 +2968,7 @@
           <a:p>
             <a:fld id="{08B136E0-DE68-48F8-B9E2-21BBDA41EF35}" type="datetimeFigureOut">
               <a:rPr lang="en-US" smtClean="0"/>
-              <a:t>4/11/2019</a:t>
+              <a:t>4/12/2019</a:t>
             </a:fld>
             <a:endParaRPr lang="en-US"/>
           </a:p>
@@ -4390,6 +4392,66 @@
     <p:extLst>
       <p:ext uri="{BB962C8B-B14F-4D97-AF65-F5344CB8AC3E}">
         <p14:creationId xmlns:p14="http://schemas.microsoft.com/office/powerpoint/2010/main" val="3800497767"/>
+      </p:ext>
+    </p:extLst>
+  </p:cSld>
+  <p:clrMapOvr>
+    <a:masterClrMapping/>
+  </p:clrMapOvr>
+</p:sld>
+</file>
+
+<file path=ppt/slides/slide20.xml><?xml version="1.0" encoding="utf-8"?>
+<p:sld xmlns:a="http://schemas.openxmlformats.org/drawingml/2006/main" xmlns:r="http://schemas.openxmlformats.org/officeDocument/2006/relationships" xmlns:p="http://schemas.openxmlformats.org/presentationml/2006/main">
+  <p:cSld>
+    <p:spTree>
+      <p:nvGrpSpPr>
+        <p:cNvPr id="1" name=""/>
+        <p:cNvGrpSpPr/>
+        <p:nvPr/>
+      </p:nvGrpSpPr>
+      <p:grpSpPr>
+        <a:xfrm>
+          <a:off x="0" y="0"/>
+          <a:ext cx="0" cy="0"/>
+          <a:chOff x="0" y="0"/>
+          <a:chExt cx="0" cy="0"/>
+        </a:xfrm>
+      </p:grpSpPr>
+      <p:pic>
+        <p:nvPicPr>
+          <p:cNvPr id="5" name="Picture 4">
+            <a:extLst>
+              <a:ext uri="{FF2B5EF4-FFF2-40B4-BE49-F238E27FC236}">
+                <a16:creationId xmlns:a16="http://schemas.microsoft.com/office/drawing/2014/main" id="{C790DBBA-10CB-400F-A417-E9E6FD901715}"/>
+              </a:ext>
+            </a:extLst>
+          </p:cNvPr>
+          <p:cNvPicPr>
+            <a:picLocks noChangeAspect="1"/>
+          </p:cNvPicPr>
+          <p:nvPr/>
+        </p:nvPicPr>
+        <p:blipFill>
+          <a:blip r:embed="rId2"/>
+          <a:stretch>
+            <a:fillRect/>
+          </a:stretch>
+        </p:blipFill>
+        <p:spPr>
+          <a:xfrm>
+            <a:off x="0" y="200025"/>
+            <a:ext cx="12192000" cy="6457950"/>
+          </a:xfrm>
+          <a:prstGeom prst="rect">
+            <a:avLst/>
+          </a:prstGeom>
+        </p:spPr>
+      </p:pic>
+    </p:spTree>
+    <p:extLst>
+      <p:ext uri="{BB962C8B-B14F-4D97-AF65-F5344CB8AC3E}">
+        <p14:creationId xmlns:p14="http://schemas.microsoft.com/office/powerpoint/2010/main" val="2433233052"/>
       </p:ext>
     </p:extLst>
   </p:cSld>

</xml_diff>

<commit_message>
updated with ML slides
</commit_message>
<xml_diff>
--- a/case_study_02_presentation.pptx
+++ b/case_study_02_presentation.pptx
@@ -34,7 +34,14 @@
     <p:sldId id="262" r:id="rId28"/>
     <p:sldId id="267" r:id="rId29"/>
     <p:sldId id="263" r:id="rId30"/>
-    <p:sldId id="269" r:id="rId31"/>
+    <p:sldId id="300" r:id="rId31"/>
+    <p:sldId id="301" r:id="rId32"/>
+    <p:sldId id="302" r:id="rId33"/>
+    <p:sldId id="303" r:id="rId34"/>
+    <p:sldId id="304" r:id="rId35"/>
+    <p:sldId id="305" r:id="rId36"/>
+    <p:sldId id="306" r:id="rId37"/>
+    <p:sldId id="269" r:id="rId38"/>
   </p:sldIdLst>
   <p:sldSz cx="12192000" cy="6858000"/>
   <p:notesSz cx="6858000" cy="9144000"/>
@@ -171,6 +178,13 @@
             <p14:sldId id="262"/>
             <p14:sldId id="267"/>
             <p14:sldId id="263"/>
+            <p14:sldId id="300"/>
+            <p14:sldId id="301"/>
+            <p14:sldId id="302"/>
+            <p14:sldId id="303"/>
+            <p14:sldId id="304"/>
+            <p14:sldId id="305"/>
+            <p14:sldId id="306"/>
           </p14:sldIdLst>
         </p14:section>
         <p14:section name="Conclusion" id="{CC523660-F8A3-4597-8458-66C8365C0AE2}">
@@ -373,7 +387,7 @@
           <a:p>
             <a:fld id="{08B136E0-DE68-48F8-B9E2-21BBDA41EF35}" type="datetimeFigureOut">
               <a:rPr lang="en-US" smtClean="0"/>
-              <a:t>4/15/2019</a:t>
+              <a:t>4/16/2019</a:t>
             </a:fld>
             <a:endParaRPr lang="en-US"/>
           </a:p>
@@ -648,7 +662,7 @@
           <a:p>
             <a:fld id="{08B136E0-DE68-48F8-B9E2-21BBDA41EF35}" type="datetimeFigureOut">
               <a:rPr lang="en-US" smtClean="0"/>
-              <a:t>4/15/2019</a:t>
+              <a:t>4/16/2019</a:t>
             </a:fld>
             <a:endParaRPr lang="en-US"/>
           </a:p>
@@ -842,7 +856,7 @@
           <a:p>
             <a:fld id="{08B136E0-DE68-48F8-B9E2-21BBDA41EF35}" type="datetimeFigureOut">
               <a:rPr lang="en-US" smtClean="0"/>
-              <a:t>4/15/2019</a:t>
+              <a:t>4/16/2019</a:t>
             </a:fld>
             <a:endParaRPr lang="en-US"/>
           </a:p>
@@ -1115,7 +1129,7 @@
           <a:p>
             <a:fld id="{08B136E0-DE68-48F8-B9E2-21BBDA41EF35}" type="datetimeFigureOut">
               <a:rPr lang="en-US" smtClean="0"/>
-              <a:t>4/15/2019</a:t>
+              <a:t>4/16/2019</a:t>
             </a:fld>
             <a:endParaRPr lang="en-US"/>
           </a:p>
@@ -1456,7 +1470,7 @@
           <a:p>
             <a:fld id="{08B136E0-DE68-48F8-B9E2-21BBDA41EF35}" type="datetimeFigureOut">
               <a:rPr lang="en-US" smtClean="0"/>
-              <a:t>4/15/2019</a:t>
+              <a:t>4/16/2019</a:t>
             </a:fld>
             <a:endParaRPr lang="en-US"/>
           </a:p>
@@ -2079,7 +2093,7 @@
           <a:p>
             <a:fld id="{08B136E0-DE68-48F8-B9E2-21BBDA41EF35}" type="datetimeFigureOut">
               <a:rPr lang="en-US" smtClean="0"/>
-              <a:t>4/15/2019</a:t>
+              <a:t>4/16/2019</a:t>
             </a:fld>
             <a:endParaRPr lang="en-US"/>
           </a:p>
@@ -2939,7 +2953,7 @@
           <a:p>
             <a:fld id="{08B136E0-DE68-48F8-B9E2-21BBDA41EF35}" type="datetimeFigureOut">
               <a:rPr lang="en-US" smtClean="0"/>
-              <a:t>4/15/2019</a:t>
+              <a:t>4/16/2019</a:t>
             </a:fld>
             <a:endParaRPr lang="en-US"/>
           </a:p>
@@ -3109,7 +3123,7 @@
           <a:p>
             <a:fld id="{08B136E0-DE68-48F8-B9E2-21BBDA41EF35}" type="datetimeFigureOut">
               <a:rPr lang="en-US" smtClean="0"/>
-              <a:t>4/15/2019</a:t>
+              <a:t>4/16/2019</a:t>
             </a:fld>
             <a:endParaRPr lang="en-US"/>
           </a:p>
@@ -3289,7 +3303,7 @@
           <a:p>
             <a:fld id="{08B136E0-DE68-48F8-B9E2-21BBDA41EF35}" type="datetimeFigureOut">
               <a:rPr lang="en-US" smtClean="0"/>
-              <a:t>4/15/2019</a:t>
+              <a:t>4/16/2019</a:t>
             </a:fld>
             <a:endParaRPr lang="en-US"/>
           </a:p>
@@ -3459,7 +3473,7 @@
           <a:p>
             <a:fld id="{08B136E0-DE68-48F8-B9E2-21BBDA41EF35}" type="datetimeFigureOut">
               <a:rPr lang="en-US" smtClean="0"/>
-              <a:t>4/15/2019</a:t>
+              <a:t>4/16/2019</a:t>
             </a:fld>
             <a:endParaRPr lang="en-US"/>
           </a:p>
@@ -3706,7 +3720,7 @@
           <a:p>
             <a:fld id="{08B136E0-DE68-48F8-B9E2-21BBDA41EF35}" type="datetimeFigureOut">
               <a:rPr lang="en-US" smtClean="0"/>
-              <a:t>4/15/2019</a:t>
+              <a:t>4/16/2019</a:t>
             </a:fld>
             <a:endParaRPr lang="en-US"/>
           </a:p>
@@ -3998,7 +4012,7 @@
           <a:p>
             <a:fld id="{08B136E0-DE68-48F8-B9E2-21BBDA41EF35}" type="datetimeFigureOut">
               <a:rPr lang="en-US" smtClean="0"/>
-              <a:t>4/15/2019</a:t>
+              <a:t>4/16/2019</a:t>
             </a:fld>
             <a:endParaRPr lang="en-US"/>
           </a:p>
@@ -4442,7 +4456,7 @@
           <a:p>
             <a:fld id="{08B136E0-DE68-48F8-B9E2-21BBDA41EF35}" type="datetimeFigureOut">
               <a:rPr lang="en-US" smtClean="0"/>
-              <a:t>4/15/2019</a:t>
+              <a:t>4/16/2019</a:t>
             </a:fld>
             <a:endParaRPr lang="en-US"/>
           </a:p>
@@ -4560,7 +4574,7 @@
           <a:p>
             <a:fld id="{08B136E0-DE68-48F8-B9E2-21BBDA41EF35}" type="datetimeFigureOut">
               <a:rPr lang="en-US" smtClean="0"/>
-              <a:t>4/15/2019</a:t>
+              <a:t>4/16/2019</a:t>
             </a:fld>
             <a:endParaRPr lang="en-US"/>
           </a:p>
@@ -4655,7 +4669,7 @@
           <a:p>
             <a:fld id="{08B136E0-DE68-48F8-B9E2-21BBDA41EF35}" type="datetimeFigureOut">
               <a:rPr lang="en-US" smtClean="0"/>
-              <a:t>4/15/2019</a:t>
+              <a:t>4/16/2019</a:t>
             </a:fld>
             <a:endParaRPr lang="en-US"/>
           </a:p>
@@ -4934,7 +4948,7 @@
           <a:p>
             <a:fld id="{08B136E0-DE68-48F8-B9E2-21BBDA41EF35}" type="datetimeFigureOut">
               <a:rPr lang="en-US" smtClean="0"/>
-              <a:t>4/15/2019</a:t>
+              <a:t>4/16/2019</a:t>
             </a:fld>
             <a:endParaRPr lang="en-US"/>
           </a:p>
@@ -5209,7 +5223,7 @@
           <a:p>
             <a:fld id="{08B136E0-DE68-48F8-B9E2-21BBDA41EF35}" type="datetimeFigureOut">
               <a:rPr lang="en-US" smtClean="0"/>
-              <a:t>4/15/2019</a:t>
+              <a:t>4/16/2019</a:t>
             </a:fld>
             <a:endParaRPr lang="en-US"/>
           </a:p>
@@ -5638,7 +5652,7 @@
           <a:p>
             <a:fld id="{08B136E0-DE68-48F8-B9E2-21BBDA41EF35}" type="datetimeFigureOut">
               <a:rPr lang="en-US" smtClean="0"/>
-              <a:t>4/15/2019</a:t>
+              <a:t>4/16/2019</a:t>
             </a:fld>
             <a:endParaRPr lang="en-US"/>
           </a:p>
@@ -15667,6 +15681,978 @@
           <p:cNvPr id="2" name="Title 1">
             <a:extLst>
               <a:ext uri="{FF2B5EF4-FFF2-40B4-BE49-F238E27FC236}">
+                <a16:creationId xmlns:a16="http://schemas.microsoft.com/office/drawing/2014/main" id="{1F4D6129-A062-4306-82BB-EF5C43018106}"/>
+              </a:ext>
+            </a:extLst>
+          </p:cNvPr>
+          <p:cNvSpPr>
+            <a:spLocks noGrp="1"/>
+          </p:cNvSpPr>
+          <p:nvPr>
+            <p:ph type="title"/>
+          </p:nvPr>
+        </p:nvSpPr>
+        <p:spPr>
+          <a:xfrm>
+            <a:off x="378941" y="452718"/>
+            <a:ext cx="9992497" cy="1400530"/>
+          </a:xfrm>
+        </p:spPr>
+        <p:txBody>
+          <a:bodyPr/>
+          <a:lstStyle/>
+          <a:p>
+            <a:r>
+              <a:rPr lang="en-US" dirty="0"/>
+              <a:t>Finally- A machine learning approach</a:t>
+            </a:r>
+          </a:p>
+        </p:txBody>
+      </p:sp>
+      <p:sp>
+        <p:nvSpPr>
+          <p:cNvPr id="3" name="Content Placeholder 2">
+            <a:extLst>
+              <a:ext uri="{FF2B5EF4-FFF2-40B4-BE49-F238E27FC236}">
+                <a16:creationId xmlns:a16="http://schemas.microsoft.com/office/drawing/2014/main" id="{E32DA1AD-3C55-4606-B0C6-BA526507BCB3}"/>
+              </a:ext>
+            </a:extLst>
+          </p:cNvPr>
+          <p:cNvSpPr>
+            <a:spLocks noGrp="1"/>
+          </p:cNvSpPr>
+          <p:nvPr>
+            <p:ph idx="1"/>
+          </p:nvPr>
+        </p:nvSpPr>
+        <p:spPr/>
+        <p:txBody>
+          <a:bodyPr/>
+          <a:lstStyle/>
+          <a:p>
+            <a:r>
+              <a:rPr lang="en-US" dirty="0"/>
+              <a:t>The output- Attrition is a great “label” for machine learning</a:t>
+            </a:r>
+          </a:p>
+          <a:p>
+            <a:r>
+              <a:rPr lang="en-US" dirty="0"/>
+              <a:t>For a more useful measure, probabilities of the labels are output</a:t>
+            </a:r>
+          </a:p>
+          <a:p>
+            <a:r>
+              <a:rPr lang="en-US" dirty="0"/>
+              <a:t>This model found similar results to the above, with a few changes.</a:t>
+            </a:r>
+          </a:p>
+          <a:p>
+            <a:r>
+              <a:rPr lang="en-US" dirty="0"/>
+              <a:t>The end (legal) model can predict attrition with ~84% accuracy</a:t>
+            </a:r>
+          </a:p>
+        </p:txBody>
+      </p:sp>
+    </p:spTree>
+    <p:extLst>
+      <p:ext uri="{BB962C8B-B14F-4D97-AF65-F5344CB8AC3E}">
+        <p14:creationId xmlns:p14="http://schemas.microsoft.com/office/powerpoint/2010/main" val="622335340"/>
+      </p:ext>
+    </p:extLst>
+  </p:cSld>
+  <p:clrMapOvr>
+    <a:masterClrMapping/>
+  </p:clrMapOvr>
+</p:sld>
+</file>
+
+<file path=ppt/slides/slide31.xml><?xml version="1.0" encoding="utf-8"?>
+<p:sld xmlns:a="http://schemas.openxmlformats.org/drawingml/2006/main" xmlns:r="http://schemas.openxmlformats.org/officeDocument/2006/relationships" xmlns:p="http://schemas.openxmlformats.org/presentationml/2006/main">
+  <p:cSld>
+    <p:spTree>
+      <p:nvGrpSpPr>
+        <p:cNvPr id="1" name=""/>
+        <p:cNvGrpSpPr/>
+        <p:nvPr/>
+      </p:nvGrpSpPr>
+      <p:grpSpPr>
+        <a:xfrm>
+          <a:off x="0" y="0"/>
+          <a:ext cx="0" cy="0"/>
+          <a:chOff x="0" y="0"/>
+          <a:chExt cx="0" cy="0"/>
+        </a:xfrm>
+      </p:grpSpPr>
+      <p:pic>
+        <p:nvPicPr>
+          <p:cNvPr id="5" name="Picture 4">
+            <a:extLst>
+              <a:ext uri="{FF2B5EF4-FFF2-40B4-BE49-F238E27FC236}">
+                <a16:creationId xmlns:a16="http://schemas.microsoft.com/office/drawing/2014/main" id="{E5AF578D-A555-4CD1-8F0A-57ED2523A778}"/>
+              </a:ext>
+            </a:extLst>
+          </p:cNvPr>
+          <p:cNvPicPr>
+            <a:picLocks noChangeAspect="1"/>
+          </p:cNvPicPr>
+          <p:nvPr/>
+        </p:nvPicPr>
+        <p:blipFill>
+          <a:blip r:embed="rId2"/>
+          <a:stretch>
+            <a:fillRect/>
+          </a:stretch>
+        </p:blipFill>
+        <p:spPr>
+          <a:xfrm>
+            <a:off x="5576582" y="1711264"/>
+            <a:ext cx="6281716" cy="4486940"/>
+          </a:xfrm>
+          <a:prstGeom prst="rect">
+            <a:avLst/>
+          </a:prstGeom>
+        </p:spPr>
+      </p:pic>
+      <p:sp>
+        <p:nvSpPr>
+          <p:cNvPr id="2" name="Title 1">
+            <a:extLst>
+              <a:ext uri="{FF2B5EF4-FFF2-40B4-BE49-F238E27FC236}">
+                <a16:creationId xmlns:a16="http://schemas.microsoft.com/office/drawing/2014/main" id="{828FE1B7-8A2B-4559-9665-3E60BA2C3F60}"/>
+              </a:ext>
+            </a:extLst>
+          </p:cNvPr>
+          <p:cNvSpPr>
+            <a:spLocks noGrp="1"/>
+          </p:cNvSpPr>
+          <p:nvPr>
+            <p:ph type="title"/>
+          </p:nvPr>
+        </p:nvSpPr>
+        <p:spPr/>
+        <p:txBody>
+          <a:bodyPr/>
+          <a:lstStyle/>
+          <a:p>
+            <a:r>
+              <a:rPr lang="en-US" dirty="0"/>
+              <a:t>Initial Model</a:t>
+            </a:r>
+          </a:p>
+        </p:txBody>
+      </p:sp>
+      <p:sp>
+        <p:nvSpPr>
+          <p:cNvPr id="3" name="Content Placeholder 2">
+            <a:extLst>
+              <a:ext uri="{FF2B5EF4-FFF2-40B4-BE49-F238E27FC236}">
+                <a16:creationId xmlns:a16="http://schemas.microsoft.com/office/drawing/2014/main" id="{52346CD9-A538-435E-BA37-DFAFBAADAF29}"/>
+              </a:ext>
+            </a:extLst>
+          </p:cNvPr>
+          <p:cNvSpPr>
+            <a:spLocks noGrp="1"/>
+          </p:cNvSpPr>
+          <p:nvPr>
+            <p:ph idx="1"/>
+          </p:nvPr>
+        </p:nvSpPr>
+        <p:spPr>
+          <a:xfrm>
+            <a:off x="333703" y="2002723"/>
+            <a:ext cx="5242880" cy="4195481"/>
+          </a:xfrm>
+        </p:spPr>
+        <p:txBody>
+          <a:bodyPr/>
+          <a:lstStyle/>
+          <a:p>
+            <a:r>
+              <a:rPr lang="en-US" dirty="0"/>
+              <a:t>Accuracy hovered around ~84.5%</a:t>
+            </a:r>
+          </a:p>
+          <a:p>
+            <a:r>
+              <a:rPr lang="en-US" dirty="0"/>
+              <a:t>All factors are considered up front</a:t>
+            </a:r>
+          </a:p>
+          <a:p>
+            <a:r>
+              <a:rPr lang="en-US" dirty="0"/>
+              <a:t>No significant “learning curve”</a:t>
+            </a:r>
+          </a:p>
+        </p:txBody>
+      </p:sp>
+    </p:spTree>
+    <p:extLst>
+      <p:ext uri="{BB962C8B-B14F-4D97-AF65-F5344CB8AC3E}">
+        <p14:creationId xmlns:p14="http://schemas.microsoft.com/office/powerpoint/2010/main" val="769008155"/>
+      </p:ext>
+    </p:extLst>
+  </p:cSld>
+  <p:clrMapOvr>
+    <a:masterClrMapping/>
+  </p:clrMapOvr>
+</p:sld>
+</file>
+
+<file path=ppt/slides/slide32.xml><?xml version="1.0" encoding="utf-8"?>
+<p:sld xmlns:a="http://schemas.openxmlformats.org/drawingml/2006/main" xmlns:r="http://schemas.openxmlformats.org/officeDocument/2006/relationships" xmlns:p="http://schemas.openxmlformats.org/presentationml/2006/main">
+  <p:cSld>
+    <p:spTree>
+      <p:nvGrpSpPr>
+        <p:cNvPr id="1" name=""/>
+        <p:cNvGrpSpPr/>
+        <p:nvPr/>
+      </p:nvGrpSpPr>
+      <p:grpSpPr>
+        <a:xfrm>
+          <a:off x="0" y="0"/>
+          <a:ext cx="0" cy="0"/>
+          <a:chOff x="0" y="0"/>
+          <a:chExt cx="0" cy="0"/>
+        </a:xfrm>
+      </p:grpSpPr>
+      <p:sp>
+        <p:nvSpPr>
+          <p:cNvPr id="2" name="Title 1">
+            <a:extLst>
+              <a:ext uri="{FF2B5EF4-FFF2-40B4-BE49-F238E27FC236}">
+                <a16:creationId xmlns:a16="http://schemas.microsoft.com/office/drawing/2014/main" id="{828FE1B7-8A2B-4559-9665-3E60BA2C3F60}"/>
+              </a:ext>
+            </a:extLst>
+          </p:cNvPr>
+          <p:cNvSpPr>
+            <a:spLocks noGrp="1"/>
+          </p:cNvSpPr>
+          <p:nvPr>
+            <p:ph type="title"/>
+          </p:nvPr>
+        </p:nvSpPr>
+        <p:spPr/>
+        <p:txBody>
+          <a:bodyPr/>
+          <a:lstStyle/>
+          <a:p>
+            <a:r>
+              <a:rPr lang="en-US" dirty="0"/>
+              <a:t>Initial Model – Significant Features</a:t>
+            </a:r>
+          </a:p>
+        </p:txBody>
+      </p:sp>
+      <p:sp>
+        <p:nvSpPr>
+          <p:cNvPr id="3" name="Content Placeholder 2">
+            <a:extLst>
+              <a:ext uri="{FF2B5EF4-FFF2-40B4-BE49-F238E27FC236}">
+                <a16:creationId xmlns:a16="http://schemas.microsoft.com/office/drawing/2014/main" id="{52346CD9-A538-435E-BA37-DFAFBAADAF29}"/>
+              </a:ext>
+            </a:extLst>
+          </p:cNvPr>
+          <p:cNvSpPr>
+            <a:spLocks noGrp="1"/>
+          </p:cNvSpPr>
+          <p:nvPr>
+            <p:ph idx="1"/>
+          </p:nvPr>
+        </p:nvSpPr>
+        <p:spPr>
+          <a:xfrm>
+            <a:off x="333703" y="2002723"/>
+            <a:ext cx="5242880" cy="4195481"/>
+          </a:xfrm>
+        </p:spPr>
+        <p:txBody>
+          <a:bodyPr/>
+          <a:lstStyle/>
+          <a:p>
+            <a:r>
+              <a:rPr lang="en-US" dirty="0" err="1"/>
+              <a:t>Information.gain</a:t>
+            </a:r>
+            <a:r>
+              <a:rPr lang="en-US" dirty="0"/>
+              <a:t> measures the ability of a variable to be used to make a decision on data…</a:t>
+            </a:r>
+          </a:p>
+          <a:p>
+            <a:r>
+              <a:rPr lang="en-US" dirty="0"/>
+              <a:t>Used to build decision trees, but gives us a decent measure of what is important</a:t>
+            </a:r>
+          </a:p>
+          <a:p>
+            <a:r>
+              <a:rPr lang="en-US" dirty="0"/>
+              <a:t>Overtime, Job Role, Job Level top 3 indicators</a:t>
+            </a:r>
+          </a:p>
+          <a:p>
+            <a:r>
+              <a:rPr lang="en-US" dirty="0"/>
+              <a:t>Chi-squared reinforces the </a:t>
+            </a:r>
+            <a:r>
+              <a:rPr lang="en-US" dirty="0" err="1"/>
+              <a:t>information.gain</a:t>
+            </a:r>
+            <a:r>
+              <a:rPr lang="en-US" dirty="0"/>
+              <a:t> measure</a:t>
+            </a:r>
+          </a:p>
+        </p:txBody>
+      </p:sp>
+      <p:pic>
+        <p:nvPicPr>
+          <p:cNvPr id="1026" name="Picture 2">
+            <a:extLst>
+              <a:ext uri="{FF2B5EF4-FFF2-40B4-BE49-F238E27FC236}">
+                <a16:creationId xmlns:a16="http://schemas.microsoft.com/office/drawing/2014/main" id="{01B9B78B-5377-4152-8B33-6F95D81ADAEA}"/>
+              </a:ext>
+            </a:extLst>
+          </p:cNvPr>
+          <p:cNvPicPr>
+            <a:picLocks noChangeAspect="1" noChangeArrowheads="1"/>
+          </p:cNvPicPr>
+          <p:nvPr/>
+        </p:nvPicPr>
+        <p:blipFill>
+          <a:blip r:embed="rId2">
+            <a:extLst>
+              <a:ext uri="{28A0092B-C50C-407E-A947-70E740481C1C}">
+                <a14:useLocalDpi xmlns:a14="http://schemas.microsoft.com/office/drawing/2010/main" val="0"/>
+              </a:ext>
+            </a:extLst>
+          </a:blip>
+          <a:srcRect/>
+          <a:stretch>
+            <a:fillRect/>
+          </a:stretch>
+        </p:blipFill>
+        <p:spPr bwMode="auto">
+          <a:xfrm>
+            <a:off x="5647678" y="1152983"/>
+            <a:ext cx="6400800" cy="4572000"/>
+          </a:xfrm>
+          <a:prstGeom prst="rect">
+            <a:avLst/>
+          </a:prstGeom>
+          <a:noFill/>
+          <a:extLst>
+            <a:ext uri="{909E8E84-426E-40DD-AFC4-6F175D3DCCD1}">
+              <a14:hiddenFill xmlns:a14="http://schemas.microsoft.com/office/drawing/2010/main">
+                <a:solidFill>
+                  <a:srgbClr val="FFFFFF"/>
+                </a:solidFill>
+              </a14:hiddenFill>
+            </a:ext>
+          </a:extLst>
+        </p:spPr>
+      </p:pic>
+    </p:spTree>
+    <p:extLst>
+      <p:ext uri="{BB962C8B-B14F-4D97-AF65-F5344CB8AC3E}">
+        <p14:creationId xmlns:p14="http://schemas.microsoft.com/office/powerpoint/2010/main" val="1029623956"/>
+      </p:ext>
+    </p:extLst>
+  </p:cSld>
+  <p:clrMapOvr>
+    <a:masterClrMapping/>
+  </p:clrMapOvr>
+</p:sld>
+</file>
+
+<file path=ppt/slides/slide33.xml><?xml version="1.0" encoding="utf-8"?>
+<p:sld xmlns:a="http://schemas.openxmlformats.org/drawingml/2006/main" xmlns:r="http://schemas.openxmlformats.org/officeDocument/2006/relationships" xmlns:p="http://schemas.openxmlformats.org/presentationml/2006/main">
+  <p:cSld>
+    <p:spTree>
+      <p:nvGrpSpPr>
+        <p:cNvPr id="1" name=""/>
+        <p:cNvGrpSpPr/>
+        <p:nvPr/>
+      </p:nvGrpSpPr>
+      <p:grpSpPr>
+        <a:xfrm>
+          <a:off x="0" y="0"/>
+          <a:ext cx="0" cy="0"/>
+          <a:chOff x="0" y="0"/>
+          <a:chExt cx="0" cy="0"/>
+        </a:xfrm>
+      </p:grpSpPr>
+      <p:sp>
+        <p:nvSpPr>
+          <p:cNvPr id="2" name="Title 1">
+            <a:extLst>
+              <a:ext uri="{FF2B5EF4-FFF2-40B4-BE49-F238E27FC236}">
+                <a16:creationId xmlns:a16="http://schemas.microsoft.com/office/drawing/2014/main" id="{828FE1B7-8A2B-4559-9665-3E60BA2C3F60}"/>
+              </a:ext>
+            </a:extLst>
+          </p:cNvPr>
+          <p:cNvSpPr>
+            <a:spLocks noGrp="1"/>
+          </p:cNvSpPr>
+          <p:nvPr>
+            <p:ph type="title"/>
+          </p:nvPr>
+        </p:nvSpPr>
+        <p:spPr/>
+        <p:txBody>
+          <a:bodyPr/>
+          <a:lstStyle/>
+          <a:p>
+            <a:r>
+              <a:rPr lang="en-US" dirty="0"/>
+              <a:t>Reduced Model</a:t>
+            </a:r>
+          </a:p>
+        </p:txBody>
+      </p:sp>
+      <p:sp>
+        <p:nvSpPr>
+          <p:cNvPr id="3" name="Content Placeholder 2">
+            <a:extLst>
+              <a:ext uri="{FF2B5EF4-FFF2-40B4-BE49-F238E27FC236}">
+                <a16:creationId xmlns:a16="http://schemas.microsoft.com/office/drawing/2014/main" id="{52346CD9-A538-435E-BA37-DFAFBAADAF29}"/>
+              </a:ext>
+            </a:extLst>
+          </p:cNvPr>
+          <p:cNvSpPr>
+            <a:spLocks noGrp="1"/>
+          </p:cNvSpPr>
+          <p:nvPr>
+            <p:ph idx="1"/>
+          </p:nvPr>
+        </p:nvSpPr>
+        <p:spPr>
+          <a:xfrm>
+            <a:off x="333703" y="2002723"/>
+            <a:ext cx="5242880" cy="4195481"/>
+          </a:xfrm>
+        </p:spPr>
+        <p:txBody>
+          <a:bodyPr/>
+          <a:lstStyle/>
+          <a:p>
+            <a:r>
+              <a:rPr lang="en-US" dirty="0"/>
+              <a:t>Illegal discriminators removed</a:t>
+            </a:r>
+          </a:p>
+          <a:p>
+            <a:pPr lvl="1"/>
+            <a:r>
+              <a:rPr lang="en-US" dirty="0"/>
+              <a:t>Gender, Age, Marital Status</a:t>
+            </a:r>
+          </a:p>
+          <a:p>
+            <a:r>
+              <a:rPr lang="en-US" dirty="0"/>
+              <a:t>Accuracy hovered around ~82%</a:t>
+            </a:r>
+          </a:p>
+          <a:p>
+            <a:r>
+              <a:rPr lang="en-US" dirty="0"/>
+              <a:t>Fewer factors means lower accuracy</a:t>
+            </a:r>
+          </a:p>
+          <a:p>
+            <a:r>
+              <a:rPr lang="en-US" dirty="0"/>
+              <a:t>However, no lawsuits!</a:t>
+            </a:r>
+          </a:p>
+        </p:txBody>
+      </p:sp>
+      <p:pic>
+        <p:nvPicPr>
+          <p:cNvPr id="2050" name="Picture 2">
+            <a:extLst>
+              <a:ext uri="{FF2B5EF4-FFF2-40B4-BE49-F238E27FC236}">
+                <a16:creationId xmlns:a16="http://schemas.microsoft.com/office/drawing/2014/main" id="{45C8D068-0C83-4BD5-98E8-117E40F97C7F}"/>
+              </a:ext>
+            </a:extLst>
+          </p:cNvPr>
+          <p:cNvPicPr>
+            <a:picLocks noChangeAspect="1" noChangeArrowheads="1"/>
+          </p:cNvPicPr>
+          <p:nvPr/>
+        </p:nvPicPr>
+        <p:blipFill>
+          <a:blip r:embed="rId2">
+            <a:extLst>
+              <a:ext uri="{28A0092B-C50C-407E-A947-70E740481C1C}">
+                <a14:useLocalDpi xmlns:a14="http://schemas.microsoft.com/office/drawing/2010/main" val="0"/>
+              </a:ext>
+            </a:extLst>
+          </a:blip>
+          <a:srcRect/>
+          <a:stretch>
+            <a:fillRect/>
+          </a:stretch>
+        </p:blipFill>
+        <p:spPr bwMode="auto">
+          <a:xfrm>
+            <a:off x="5739340" y="1143000"/>
+            <a:ext cx="6400800" cy="4572000"/>
+          </a:xfrm>
+          <a:prstGeom prst="rect">
+            <a:avLst/>
+          </a:prstGeom>
+          <a:noFill/>
+          <a:extLst>
+            <a:ext uri="{909E8E84-426E-40DD-AFC4-6F175D3DCCD1}">
+              <a14:hiddenFill xmlns:a14="http://schemas.microsoft.com/office/drawing/2010/main">
+                <a:solidFill>
+                  <a:srgbClr val="FFFFFF"/>
+                </a:solidFill>
+              </a14:hiddenFill>
+            </a:ext>
+          </a:extLst>
+        </p:spPr>
+      </p:pic>
+    </p:spTree>
+    <p:extLst>
+      <p:ext uri="{BB962C8B-B14F-4D97-AF65-F5344CB8AC3E}">
+        <p14:creationId xmlns:p14="http://schemas.microsoft.com/office/powerpoint/2010/main" val="1059364484"/>
+      </p:ext>
+    </p:extLst>
+  </p:cSld>
+  <p:clrMapOvr>
+    <a:masterClrMapping/>
+  </p:clrMapOvr>
+</p:sld>
+</file>
+
+<file path=ppt/slides/slide34.xml><?xml version="1.0" encoding="utf-8"?>
+<p:sld xmlns:a="http://schemas.openxmlformats.org/drawingml/2006/main" xmlns:r="http://schemas.openxmlformats.org/officeDocument/2006/relationships" xmlns:p="http://schemas.openxmlformats.org/presentationml/2006/main">
+  <p:cSld>
+    <p:spTree>
+      <p:nvGrpSpPr>
+        <p:cNvPr id="1" name=""/>
+        <p:cNvGrpSpPr/>
+        <p:nvPr/>
+      </p:nvGrpSpPr>
+      <p:grpSpPr>
+        <a:xfrm>
+          <a:off x="0" y="0"/>
+          <a:ext cx="0" cy="0"/>
+          <a:chOff x="0" y="0"/>
+          <a:chExt cx="0" cy="0"/>
+        </a:xfrm>
+      </p:grpSpPr>
+      <p:sp>
+        <p:nvSpPr>
+          <p:cNvPr id="2" name="Title 1">
+            <a:extLst>
+              <a:ext uri="{FF2B5EF4-FFF2-40B4-BE49-F238E27FC236}">
+                <a16:creationId xmlns:a16="http://schemas.microsoft.com/office/drawing/2014/main" id="{828FE1B7-8A2B-4559-9665-3E60BA2C3F60}"/>
+              </a:ext>
+            </a:extLst>
+          </p:cNvPr>
+          <p:cNvSpPr>
+            <a:spLocks noGrp="1"/>
+          </p:cNvSpPr>
+          <p:nvPr>
+            <p:ph type="title"/>
+          </p:nvPr>
+        </p:nvSpPr>
+        <p:spPr>
+          <a:xfrm>
+            <a:off x="561439" y="230776"/>
+            <a:ext cx="10030288" cy="1400530"/>
+          </a:xfrm>
+        </p:spPr>
+        <p:txBody>
+          <a:bodyPr/>
+          <a:lstStyle/>
+          <a:p>
+            <a:r>
+              <a:rPr lang="en-US" dirty="0"/>
+              <a:t>Reduced Model – Significant Features</a:t>
+            </a:r>
+          </a:p>
+        </p:txBody>
+      </p:sp>
+      <p:sp>
+        <p:nvSpPr>
+          <p:cNvPr id="3" name="Content Placeholder 2">
+            <a:extLst>
+              <a:ext uri="{FF2B5EF4-FFF2-40B4-BE49-F238E27FC236}">
+                <a16:creationId xmlns:a16="http://schemas.microsoft.com/office/drawing/2014/main" id="{52346CD9-A538-435E-BA37-DFAFBAADAF29}"/>
+              </a:ext>
+            </a:extLst>
+          </p:cNvPr>
+          <p:cNvSpPr>
+            <a:spLocks noGrp="1"/>
+          </p:cNvSpPr>
+          <p:nvPr>
+            <p:ph idx="1"/>
+          </p:nvPr>
+        </p:nvSpPr>
+        <p:spPr>
+          <a:xfrm>
+            <a:off x="333703" y="2002723"/>
+            <a:ext cx="5242880" cy="4195481"/>
+          </a:xfrm>
+        </p:spPr>
+        <p:txBody>
+          <a:bodyPr/>
+          <a:lstStyle/>
+          <a:p>
+            <a:r>
+              <a:rPr lang="en-US" dirty="0"/>
+              <a:t>Overtime, Job Role, Job Level Top 3</a:t>
+            </a:r>
+          </a:p>
+          <a:p>
+            <a:pPr marL="0" indent="0">
+              <a:buNone/>
+            </a:pPr>
+            <a:endParaRPr lang="en-US" dirty="0"/>
+          </a:p>
+        </p:txBody>
+      </p:sp>
+      <p:pic>
+        <p:nvPicPr>
+          <p:cNvPr id="1026" name="Picture 2">
+            <a:extLst>
+              <a:ext uri="{FF2B5EF4-FFF2-40B4-BE49-F238E27FC236}">
+                <a16:creationId xmlns:a16="http://schemas.microsoft.com/office/drawing/2014/main" id="{01B9B78B-5377-4152-8B33-6F95D81ADAEA}"/>
+              </a:ext>
+            </a:extLst>
+          </p:cNvPr>
+          <p:cNvPicPr>
+            <a:picLocks noChangeAspect="1" noChangeArrowheads="1"/>
+          </p:cNvPicPr>
+          <p:nvPr/>
+        </p:nvPicPr>
+        <p:blipFill>
+          <a:blip r:embed="rId2">
+            <a:extLst>
+              <a:ext uri="{28A0092B-C50C-407E-A947-70E740481C1C}">
+                <a14:useLocalDpi xmlns:a14="http://schemas.microsoft.com/office/drawing/2010/main" val="0"/>
+              </a:ext>
+            </a:extLst>
+          </a:blip>
+          <a:srcRect/>
+          <a:stretch>
+            <a:fillRect/>
+          </a:stretch>
+        </p:blipFill>
+        <p:spPr bwMode="auto">
+          <a:xfrm>
+            <a:off x="5647678" y="1152983"/>
+            <a:ext cx="6400800" cy="4572000"/>
+          </a:xfrm>
+          <a:prstGeom prst="rect">
+            <a:avLst/>
+          </a:prstGeom>
+          <a:noFill/>
+          <a:extLst>
+            <a:ext uri="{909E8E84-426E-40DD-AFC4-6F175D3DCCD1}">
+              <a14:hiddenFill xmlns:a14="http://schemas.microsoft.com/office/drawing/2010/main">
+                <a:solidFill>
+                  <a:srgbClr val="FFFFFF"/>
+                </a:solidFill>
+              </a14:hiddenFill>
+            </a:ext>
+          </a:extLst>
+        </p:spPr>
+      </p:pic>
+    </p:spTree>
+    <p:extLst>
+      <p:ext uri="{BB962C8B-B14F-4D97-AF65-F5344CB8AC3E}">
+        <p14:creationId xmlns:p14="http://schemas.microsoft.com/office/powerpoint/2010/main" val="1718878852"/>
+      </p:ext>
+    </p:extLst>
+  </p:cSld>
+  <p:clrMapOvr>
+    <a:masterClrMapping/>
+  </p:clrMapOvr>
+</p:sld>
+</file>
+
+<file path=ppt/slides/slide35.xml><?xml version="1.0" encoding="utf-8"?>
+<p:sld xmlns:a="http://schemas.openxmlformats.org/drawingml/2006/main" xmlns:r="http://schemas.openxmlformats.org/officeDocument/2006/relationships" xmlns:p="http://schemas.openxmlformats.org/presentationml/2006/main">
+  <p:cSld>
+    <p:spTree>
+      <p:nvGrpSpPr>
+        <p:cNvPr id="1" name=""/>
+        <p:cNvGrpSpPr/>
+        <p:nvPr/>
+      </p:nvGrpSpPr>
+      <p:grpSpPr>
+        <a:xfrm>
+          <a:off x="0" y="0"/>
+          <a:ext cx="0" cy="0"/>
+          <a:chOff x="0" y="0"/>
+          <a:chExt cx="0" cy="0"/>
+        </a:xfrm>
+      </p:grpSpPr>
+      <p:sp>
+        <p:nvSpPr>
+          <p:cNvPr id="2" name="Title 1">
+            <a:extLst>
+              <a:ext uri="{FF2B5EF4-FFF2-40B4-BE49-F238E27FC236}">
+                <a16:creationId xmlns:a16="http://schemas.microsoft.com/office/drawing/2014/main" id="{7CF40EF8-74CE-4DC5-86EF-C46C083D7AC3}"/>
+              </a:ext>
+            </a:extLst>
+          </p:cNvPr>
+          <p:cNvSpPr>
+            <a:spLocks noGrp="1"/>
+          </p:cNvSpPr>
+          <p:nvPr>
+            <p:ph type="title"/>
+          </p:nvPr>
+        </p:nvSpPr>
+        <p:spPr/>
+        <p:txBody>
+          <a:bodyPr/>
+          <a:lstStyle/>
+          <a:p>
+            <a:r>
+              <a:rPr lang="en-US" dirty="0"/>
+              <a:t>Why does it matter?</a:t>
+            </a:r>
+          </a:p>
+        </p:txBody>
+      </p:sp>
+      <p:sp>
+        <p:nvSpPr>
+          <p:cNvPr id="3" name="Content Placeholder 2">
+            <a:extLst>
+              <a:ext uri="{FF2B5EF4-FFF2-40B4-BE49-F238E27FC236}">
+                <a16:creationId xmlns:a16="http://schemas.microsoft.com/office/drawing/2014/main" id="{21BBDF00-CD61-4D76-A6C8-84AE11A71EB0}"/>
+              </a:ext>
+            </a:extLst>
+          </p:cNvPr>
+          <p:cNvSpPr>
+            <a:spLocks noGrp="1"/>
+          </p:cNvSpPr>
+          <p:nvPr>
+            <p:ph idx="1"/>
+          </p:nvPr>
+        </p:nvSpPr>
+        <p:spPr/>
+        <p:txBody>
+          <a:bodyPr/>
+          <a:lstStyle/>
+          <a:p>
+            <a:r>
+              <a:rPr lang="en-US" dirty="0"/>
+              <a:t>Applicants and current employees can be screened before action!</a:t>
+            </a:r>
+          </a:p>
+          <a:p>
+            <a:r>
+              <a:rPr lang="en-US" dirty="0"/>
+              <a:t>Would you promote an employee you determined is likely to quit?</a:t>
+            </a:r>
+          </a:p>
+          <a:p>
+            <a:r>
+              <a:rPr lang="en-US" dirty="0"/>
+              <a:t>Would you hire an employee that is not likely to stay?</a:t>
+            </a:r>
+          </a:p>
+          <a:p>
+            <a:r>
+              <a:rPr lang="en-US" dirty="0"/>
+              <a:t>We can model retention rate, given questions!</a:t>
+            </a:r>
+          </a:p>
+        </p:txBody>
+      </p:sp>
+    </p:spTree>
+    <p:extLst>
+      <p:ext uri="{BB962C8B-B14F-4D97-AF65-F5344CB8AC3E}">
+        <p14:creationId xmlns:p14="http://schemas.microsoft.com/office/powerpoint/2010/main" val="553990375"/>
+      </p:ext>
+    </p:extLst>
+  </p:cSld>
+  <p:clrMapOvr>
+    <a:masterClrMapping/>
+  </p:clrMapOvr>
+</p:sld>
+</file>
+
+<file path=ppt/slides/slide36.xml><?xml version="1.0" encoding="utf-8"?>
+<p:sld xmlns:a="http://schemas.openxmlformats.org/drawingml/2006/main" xmlns:r="http://schemas.openxmlformats.org/officeDocument/2006/relationships" xmlns:p="http://schemas.openxmlformats.org/presentationml/2006/main">
+  <p:cSld>
+    <p:spTree>
+      <p:nvGrpSpPr>
+        <p:cNvPr id="1" name=""/>
+        <p:cNvGrpSpPr/>
+        <p:nvPr/>
+      </p:nvGrpSpPr>
+      <p:grpSpPr>
+        <a:xfrm>
+          <a:off x="0" y="0"/>
+          <a:ext cx="0" cy="0"/>
+          <a:chOff x="0" y="0"/>
+          <a:chExt cx="0" cy="0"/>
+        </a:xfrm>
+      </p:grpSpPr>
+      <p:sp>
+        <p:nvSpPr>
+          <p:cNvPr id="2" name="Title 1">
+            <a:extLst>
+              <a:ext uri="{FF2B5EF4-FFF2-40B4-BE49-F238E27FC236}">
+                <a16:creationId xmlns:a16="http://schemas.microsoft.com/office/drawing/2014/main" id="{F605ED45-8F46-419F-9A5B-4DCD53D5B9E3}"/>
+              </a:ext>
+            </a:extLst>
+          </p:cNvPr>
+          <p:cNvSpPr>
+            <a:spLocks noGrp="1"/>
+          </p:cNvSpPr>
+          <p:nvPr>
+            <p:ph type="title"/>
+          </p:nvPr>
+        </p:nvSpPr>
+        <p:spPr/>
+        <p:txBody>
+          <a:bodyPr/>
+          <a:lstStyle/>
+          <a:p>
+            <a:r>
+              <a:rPr lang="en-US" dirty="0"/>
+              <a:t>Why does it matter?</a:t>
+            </a:r>
+          </a:p>
+        </p:txBody>
+      </p:sp>
+      <p:sp>
+        <p:nvSpPr>
+          <p:cNvPr id="3" name="Content Placeholder 2">
+            <a:extLst>
+              <a:ext uri="{FF2B5EF4-FFF2-40B4-BE49-F238E27FC236}">
+                <a16:creationId xmlns:a16="http://schemas.microsoft.com/office/drawing/2014/main" id="{5D8640A0-11FF-47A4-97B3-F49185650694}"/>
+              </a:ext>
+            </a:extLst>
+          </p:cNvPr>
+          <p:cNvSpPr>
+            <a:spLocks noGrp="1"/>
+          </p:cNvSpPr>
+          <p:nvPr>
+            <p:ph idx="1"/>
+          </p:nvPr>
+        </p:nvSpPr>
+        <p:spPr/>
+        <p:txBody>
+          <a:bodyPr/>
+          <a:lstStyle/>
+          <a:p>
+            <a:r>
+              <a:rPr lang="en-US" dirty="0"/>
+              <a:t>The model produces probabilities of retention, given answers:</a:t>
+            </a:r>
+          </a:p>
+          <a:p>
+            <a:endParaRPr lang="en-US" dirty="0"/>
+          </a:p>
+          <a:p>
+            <a:endParaRPr lang="en-US" dirty="0"/>
+          </a:p>
+          <a:p>
+            <a:endParaRPr lang="en-US" dirty="0"/>
+          </a:p>
+          <a:p>
+            <a:endParaRPr lang="en-US" dirty="0"/>
+          </a:p>
+          <a:p>
+            <a:endParaRPr lang="en-US" dirty="0"/>
+          </a:p>
+          <a:p>
+            <a:endParaRPr lang="en-US" dirty="0"/>
+          </a:p>
+          <a:p>
+            <a:endParaRPr lang="en-US" dirty="0"/>
+          </a:p>
+          <a:p>
+            <a:r>
+              <a:rPr lang="en-US" dirty="0"/>
+              <a:t>These questions could be a part of employee feedback, or the job application process, saving money!</a:t>
+            </a:r>
+          </a:p>
+          <a:p>
+            <a:endParaRPr lang="en-US" dirty="0"/>
+          </a:p>
+        </p:txBody>
+      </p:sp>
+      <p:pic>
+        <p:nvPicPr>
+          <p:cNvPr id="4" name="Picture 3">
+            <a:extLst>
+              <a:ext uri="{FF2B5EF4-FFF2-40B4-BE49-F238E27FC236}">
+                <a16:creationId xmlns:a16="http://schemas.microsoft.com/office/drawing/2014/main" id="{FE17C5FE-BBC9-48B0-BEC4-25E5C96062E4}"/>
+              </a:ext>
+            </a:extLst>
+          </p:cNvPr>
+          <p:cNvPicPr>
+            <a:picLocks noChangeAspect="1"/>
+          </p:cNvPicPr>
+          <p:nvPr/>
+        </p:nvPicPr>
+        <p:blipFill>
+          <a:blip r:embed="rId2"/>
+          <a:stretch>
+            <a:fillRect/>
+          </a:stretch>
+        </p:blipFill>
+        <p:spPr>
+          <a:xfrm>
+            <a:off x="1933206" y="2587100"/>
+            <a:ext cx="6252006" cy="2825765"/>
+          </a:xfrm>
+          <a:prstGeom prst="rect">
+            <a:avLst/>
+          </a:prstGeom>
+        </p:spPr>
+      </p:pic>
+    </p:spTree>
+    <p:extLst>
+      <p:ext uri="{BB962C8B-B14F-4D97-AF65-F5344CB8AC3E}">
+        <p14:creationId xmlns:p14="http://schemas.microsoft.com/office/powerpoint/2010/main" val="2902394015"/>
+      </p:ext>
+    </p:extLst>
+  </p:cSld>
+  <p:clrMapOvr>
+    <a:masterClrMapping/>
+  </p:clrMapOvr>
+</p:sld>
+</file>
+
+<file path=ppt/slides/slide37.xml><?xml version="1.0" encoding="utf-8"?>
+<p:sld xmlns:a="http://schemas.openxmlformats.org/drawingml/2006/main" xmlns:r="http://schemas.openxmlformats.org/officeDocument/2006/relationships" xmlns:p="http://schemas.openxmlformats.org/presentationml/2006/main">
+  <p:cSld>
+    <p:spTree>
+      <p:nvGrpSpPr>
+        <p:cNvPr id="1" name=""/>
+        <p:cNvGrpSpPr/>
+        <p:nvPr/>
+      </p:nvGrpSpPr>
+      <p:grpSpPr>
+        <a:xfrm>
+          <a:off x="0" y="0"/>
+          <a:ext cx="0" cy="0"/>
+          <a:chOff x="0" y="0"/>
+          <a:chExt cx="0" cy="0"/>
+        </a:xfrm>
+      </p:grpSpPr>
+      <p:sp>
+        <p:nvSpPr>
+          <p:cNvPr id="2" name="Title 1">
+            <a:extLst>
+              <a:ext uri="{FF2B5EF4-FFF2-40B4-BE49-F238E27FC236}">
                 <a16:creationId xmlns:a16="http://schemas.microsoft.com/office/drawing/2014/main" id="{E1832BE2-B24E-4D87-82AE-E0A24F19B9CA}"/>
               </a:ext>
             </a:extLst>

</xml_diff>